<commit_message>
Added the cancel order command
</commit_message>
<xml_diff>
--- a/SagaMasterClass.pptx
+++ b/SagaMasterClass.pptx
@@ -9,11 +9,16 @@
     <p:sldId id="257" r:id="rId3"/>
     <p:sldId id="258" r:id="rId4"/>
     <p:sldId id="259" r:id="rId5"/>
-    <p:sldId id="260" r:id="rId6"/>
-    <p:sldId id="262" r:id="rId7"/>
-    <p:sldId id="261" r:id="rId8"/>
-    <p:sldId id="263" r:id="rId9"/>
-    <p:sldId id="264" r:id="rId10"/>
+    <p:sldId id="266" r:id="rId6"/>
+    <p:sldId id="265" r:id="rId7"/>
+    <p:sldId id="267" r:id="rId8"/>
+    <p:sldId id="268" r:id="rId9"/>
+    <p:sldId id="269" r:id="rId10"/>
+    <p:sldId id="270" r:id="rId11"/>
+    <p:sldId id="262" r:id="rId12"/>
+    <p:sldId id="261" r:id="rId13"/>
+    <p:sldId id="263" r:id="rId14"/>
+    <p:sldId id="264" r:id="rId15"/>
   </p:sldIdLst>
   <p:sldSz cx="12192000" cy="6858000"/>
   <p:notesSz cx="6858000" cy="9144000"/>
@@ -121,7 +126,12 @@
             <p14:sldId id="257"/>
             <p14:sldId id="258"/>
             <p14:sldId id="259"/>
-            <p14:sldId id="260"/>
+            <p14:sldId id="266"/>
+            <p14:sldId id="265"/>
+            <p14:sldId id="267"/>
+            <p14:sldId id="268"/>
+            <p14:sldId id="269"/>
+            <p14:sldId id="270"/>
             <p14:sldId id="262"/>
             <p14:sldId id="261"/>
             <p14:sldId id="263"/>
@@ -3067,6 +3077,492 @@
 </p:sld>
 </file>
 
+<file path=ppt/slides/slide10.xml><?xml version="1.0" encoding="utf-8"?>
+<p:sld xmlns:a="http://schemas.openxmlformats.org/drawingml/2006/main" xmlns:r="http://schemas.openxmlformats.org/officeDocument/2006/relationships" xmlns:p="http://schemas.openxmlformats.org/presentationml/2006/main">
+  <p:cSld>
+    <p:spTree>
+      <p:nvGrpSpPr>
+        <p:cNvPr id="1" name=""/>
+        <p:cNvGrpSpPr/>
+        <p:nvPr/>
+      </p:nvGrpSpPr>
+      <p:grpSpPr>
+        <a:xfrm>
+          <a:off x="0" y="0"/>
+          <a:ext cx="0" cy="0"/>
+          <a:chOff x="0" y="0"/>
+          <a:chExt cx="0" cy="0"/>
+        </a:xfrm>
+      </p:grpSpPr>
+      <p:sp>
+        <p:nvSpPr>
+          <p:cNvPr id="2" name="Title 1"/>
+          <p:cNvSpPr>
+            <a:spLocks noGrp="1"/>
+          </p:cNvSpPr>
+          <p:nvPr>
+            <p:ph type="title"/>
+          </p:nvPr>
+        </p:nvSpPr>
+        <p:spPr/>
+        <p:txBody>
+          <a:bodyPr/>
+          <a:lstStyle/>
+          <a:p>
+            <a:r>
+              <a:rPr lang="en-GB" dirty="0" smtClean="0"/>
+              <a:t>Emitting messages</a:t>
+            </a:r>
+            <a:endParaRPr lang="sv-SE" dirty="0"/>
+          </a:p>
+        </p:txBody>
+      </p:sp>
+      <p:sp>
+        <p:nvSpPr>
+          <p:cNvPr id="3" name="Content Placeholder 2"/>
+          <p:cNvSpPr>
+            <a:spLocks noGrp="1"/>
+          </p:cNvSpPr>
+          <p:nvPr>
+            <p:ph idx="1"/>
+          </p:nvPr>
+        </p:nvSpPr>
+        <p:spPr/>
+        <p:txBody>
+          <a:bodyPr/>
+          <a:lstStyle/>
+          <a:p>
+            <a:endParaRPr lang="sv-SE"/>
+          </a:p>
+        </p:txBody>
+      </p:sp>
+    </p:spTree>
+    <p:extLst>
+      <p:ext uri="{BB962C8B-B14F-4D97-AF65-F5344CB8AC3E}">
+        <p14:creationId xmlns:p14="http://schemas.microsoft.com/office/powerpoint/2010/main" val="203048942"/>
+      </p:ext>
+    </p:extLst>
+  </p:cSld>
+  <p:clrMapOvr>
+    <a:masterClrMapping/>
+  </p:clrMapOvr>
+</p:sld>
+</file>
+
+<file path=ppt/slides/slide11.xml><?xml version="1.0" encoding="utf-8"?>
+<p:sld xmlns:a="http://schemas.openxmlformats.org/drawingml/2006/main" xmlns:r="http://schemas.openxmlformats.org/officeDocument/2006/relationships" xmlns:p="http://schemas.openxmlformats.org/presentationml/2006/main">
+  <p:cSld>
+    <p:spTree>
+      <p:nvGrpSpPr>
+        <p:cNvPr id="1" name=""/>
+        <p:cNvGrpSpPr/>
+        <p:nvPr/>
+      </p:nvGrpSpPr>
+      <p:grpSpPr>
+        <a:xfrm>
+          <a:off x="0" y="0"/>
+          <a:ext cx="0" cy="0"/>
+          <a:chOff x="0" y="0"/>
+          <a:chExt cx="0" cy="0"/>
+        </a:xfrm>
+      </p:grpSpPr>
+      <p:sp>
+        <p:nvSpPr>
+          <p:cNvPr id="2" name="Title 1"/>
+          <p:cNvSpPr>
+            <a:spLocks noGrp="1"/>
+          </p:cNvSpPr>
+          <p:nvPr>
+            <p:ph type="title"/>
+          </p:nvPr>
+        </p:nvSpPr>
+        <p:spPr/>
+        <p:txBody>
+          <a:bodyPr/>
+          <a:lstStyle/>
+          <a:p>
+            <a:r>
+              <a:rPr lang="en-GB" dirty="0" smtClean="0"/>
+              <a:t>Sample domain walkthrough</a:t>
+            </a:r>
+            <a:endParaRPr lang="sv-SE" dirty="0"/>
+          </a:p>
+        </p:txBody>
+      </p:sp>
+      <p:sp>
+        <p:nvSpPr>
+          <p:cNvPr id="3" name="Content Placeholder 2"/>
+          <p:cNvSpPr>
+            <a:spLocks noGrp="1"/>
+          </p:cNvSpPr>
+          <p:nvPr>
+            <p:ph idx="1"/>
+          </p:nvPr>
+        </p:nvSpPr>
+        <p:spPr/>
+        <p:txBody>
+          <a:bodyPr/>
+          <a:lstStyle/>
+          <a:p>
+            <a:r>
+              <a:rPr lang="en-GB" dirty="0" smtClean="0"/>
+              <a:t>Shop</a:t>
+            </a:r>
+          </a:p>
+          <a:p>
+            <a:r>
+              <a:rPr lang="en-GB" dirty="0" smtClean="0"/>
+              <a:t>Sales</a:t>
+            </a:r>
+          </a:p>
+          <a:p>
+            <a:r>
+              <a:rPr lang="en-GB" dirty="0" smtClean="0"/>
+              <a:t>Billing</a:t>
+            </a:r>
+          </a:p>
+          <a:p>
+            <a:r>
+              <a:rPr lang="en-GB" dirty="0" smtClean="0"/>
+              <a:t>Shipping</a:t>
+            </a:r>
+          </a:p>
+          <a:p>
+            <a:r>
+              <a:rPr lang="en-GB" dirty="0" smtClean="0"/>
+              <a:t>Customer care</a:t>
+            </a:r>
+          </a:p>
+          <a:p>
+            <a:endParaRPr lang="sv-SE" dirty="0"/>
+          </a:p>
+        </p:txBody>
+      </p:sp>
+    </p:spTree>
+    <p:extLst>
+      <p:ext uri="{BB962C8B-B14F-4D97-AF65-F5344CB8AC3E}">
+        <p14:creationId xmlns:p14="http://schemas.microsoft.com/office/powerpoint/2010/main" val="327253573"/>
+      </p:ext>
+    </p:extLst>
+  </p:cSld>
+  <p:clrMapOvr>
+    <a:masterClrMapping/>
+  </p:clrMapOvr>
+</p:sld>
+</file>
+
+<file path=ppt/slides/slide12.xml><?xml version="1.0" encoding="utf-8"?>
+<p:sld xmlns:a="http://schemas.openxmlformats.org/drawingml/2006/main" xmlns:r="http://schemas.openxmlformats.org/officeDocument/2006/relationships" xmlns:p="http://schemas.openxmlformats.org/presentationml/2006/main">
+  <p:cSld>
+    <p:spTree>
+      <p:nvGrpSpPr>
+        <p:cNvPr id="1" name=""/>
+        <p:cNvGrpSpPr/>
+        <p:nvPr/>
+      </p:nvGrpSpPr>
+      <p:grpSpPr>
+        <a:xfrm>
+          <a:off x="0" y="0"/>
+          <a:ext cx="0" cy="0"/>
+          <a:chOff x="0" y="0"/>
+          <a:chExt cx="0" cy="0"/>
+        </a:xfrm>
+      </p:grpSpPr>
+      <p:sp>
+        <p:nvSpPr>
+          <p:cNvPr id="2" name="Title 1"/>
+          <p:cNvSpPr>
+            <a:spLocks noGrp="1"/>
+          </p:cNvSpPr>
+          <p:nvPr>
+            <p:ph type="title"/>
+          </p:nvPr>
+        </p:nvSpPr>
+        <p:spPr/>
+        <p:txBody>
+          <a:bodyPr/>
+          <a:lstStyle/>
+          <a:p>
+            <a:r>
+              <a:rPr lang="en-GB" dirty="0" smtClean="0"/>
+              <a:t>Exercise </a:t>
+            </a:r>
+            <a:r>
+              <a:rPr lang="en-GB" dirty="0" smtClean="0"/>
+              <a:t>1 – Order Policy saga</a:t>
+            </a:r>
+            <a:endParaRPr lang="sv-SE" dirty="0"/>
+          </a:p>
+        </p:txBody>
+      </p:sp>
+      <p:sp>
+        <p:nvSpPr>
+          <p:cNvPr id="3" name="Content Placeholder 2"/>
+          <p:cNvSpPr>
+            <a:spLocks noGrp="1"/>
+          </p:cNvSpPr>
+          <p:nvPr>
+            <p:ph idx="1"/>
+          </p:nvPr>
+        </p:nvSpPr>
+        <p:spPr/>
+        <p:txBody>
+          <a:bodyPr>
+            <a:normAutofit/>
+          </a:bodyPr>
+          <a:lstStyle/>
+          <a:p>
+            <a:r>
+              <a:rPr lang="en-GB" dirty="0" smtClean="0"/>
+              <a:t>State changes</a:t>
+            </a:r>
+          </a:p>
+          <a:p>
+            <a:pPr lvl="1"/>
+            <a:r>
+              <a:rPr lang="en-GB" dirty="0" err="1" smtClean="0"/>
+              <a:t>StartOrder</a:t>
+            </a:r>
+            <a:r>
+              <a:rPr lang="en-GB" dirty="0" smtClean="0"/>
+              <a:t> (Command)</a:t>
+            </a:r>
+            <a:endParaRPr lang="en-GB" dirty="0" smtClean="0"/>
+          </a:p>
+          <a:p>
+            <a:pPr lvl="1"/>
+            <a:r>
+              <a:rPr lang="en-GB" dirty="0" err="1" smtClean="0"/>
+              <a:t>PlaceOrder</a:t>
+            </a:r>
+            <a:r>
+              <a:rPr lang="en-GB" dirty="0" smtClean="0"/>
+              <a:t> (Command)</a:t>
+            </a:r>
+          </a:p>
+          <a:p>
+            <a:pPr lvl="1"/>
+            <a:r>
+              <a:rPr lang="en-GB" dirty="0" err="1" smtClean="0"/>
+              <a:t>CancelOrder</a:t>
+            </a:r>
+            <a:r>
+              <a:rPr lang="en-GB" dirty="0" smtClean="0"/>
+              <a:t> (Command)</a:t>
+            </a:r>
+          </a:p>
+          <a:p>
+            <a:pPr lvl="1"/>
+            <a:r>
+              <a:rPr lang="en-GB" dirty="0" err="1" smtClean="0"/>
+              <a:t>OrderAbandoned</a:t>
+            </a:r>
+            <a:r>
+              <a:rPr lang="en-GB" dirty="0" smtClean="0"/>
+              <a:t> (Event)</a:t>
+            </a:r>
+          </a:p>
+          <a:p>
+            <a:r>
+              <a:rPr lang="en-GB" dirty="0" smtClean="0"/>
+              <a:t>Business </a:t>
+            </a:r>
+            <a:r>
+              <a:rPr lang="en-GB" dirty="0" smtClean="0"/>
+              <a:t>rules:</a:t>
+            </a:r>
+            <a:endParaRPr lang="en-GB" dirty="0" smtClean="0"/>
+          </a:p>
+          <a:p>
+            <a:pPr lvl="1"/>
+            <a:r>
+              <a:rPr lang="en-GB" dirty="0" smtClean="0"/>
+              <a:t>An order is abandoned if not </a:t>
+            </a:r>
+            <a:r>
+              <a:rPr lang="en-GB" dirty="0" smtClean="0"/>
+              <a:t>cancelled </a:t>
+            </a:r>
+            <a:r>
+              <a:rPr lang="en-GB" dirty="0" smtClean="0"/>
+              <a:t>or placed within 20 </a:t>
+            </a:r>
+            <a:r>
+              <a:rPr lang="en-GB" dirty="0" smtClean="0"/>
+              <a:t>seconds</a:t>
+            </a:r>
+          </a:p>
+          <a:p>
+            <a:pPr lvl="1"/>
+            <a:r>
+              <a:rPr lang="en-GB" dirty="0" smtClean="0"/>
+              <a:t>Events should be emitted for each relevant state change</a:t>
+            </a:r>
+            <a:endParaRPr lang="en-GB" dirty="0" smtClean="0"/>
+          </a:p>
+        </p:txBody>
+      </p:sp>
+    </p:spTree>
+    <p:extLst>
+      <p:ext uri="{BB962C8B-B14F-4D97-AF65-F5344CB8AC3E}">
+        <p14:creationId xmlns:p14="http://schemas.microsoft.com/office/powerpoint/2010/main" val="613529079"/>
+      </p:ext>
+    </p:extLst>
+  </p:cSld>
+  <p:clrMapOvr>
+    <a:masterClrMapping/>
+  </p:clrMapOvr>
+</p:sld>
+</file>
+
+<file path=ppt/slides/slide13.xml><?xml version="1.0" encoding="utf-8"?>
+<p:sld xmlns:a="http://schemas.openxmlformats.org/drawingml/2006/main" xmlns:r="http://schemas.openxmlformats.org/officeDocument/2006/relationships" xmlns:p="http://schemas.openxmlformats.org/presentationml/2006/main">
+  <p:cSld>
+    <p:spTree>
+      <p:nvGrpSpPr>
+        <p:cNvPr id="1" name=""/>
+        <p:cNvGrpSpPr/>
+        <p:nvPr/>
+      </p:nvGrpSpPr>
+      <p:grpSpPr>
+        <a:xfrm>
+          <a:off x="0" y="0"/>
+          <a:ext cx="0" cy="0"/>
+          <a:chOff x="0" y="0"/>
+          <a:chExt cx="0" cy="0"/>
+        </a:xfrm>
+      </p:grpSpPr>
+      <p:sp>
+        <p:nvSpPr>
+          <p:cNvPr id="2" name="Title 1"/>
+          <p:cNvSpPr>
+            <a:spLocks noGrp="1"/>
+          </p:cNvSpPr>
+          <p:nvPr>
+            <p:ph type="title"/>
+          </p:nvPr>
+        </p:nvSpPr>
+        <p:spPr/>
+        <p:txBody>
+          <a:bodyPr/>
+          <a:lstStyle/>
+          <a:p>
+            <a:r>
+              <a:rPr lang="en-GB" dirty="0" smtClean="0"/>
+              <a:t>Walkthrough</a:t>
+            </a:r>
+            <a:endParaRPr lang="sv-SE" dirty="0"/>
+          </a:p>
+        </p:txBody>
+      </p:sp>
+      <p:sp>
+        <p:nvSpPr>
+          <p:cNvPr id="4" name="Text Placeholder 3"/>
+          <p:cNvSpPr>
+            <a:spLocks noGrp="1"/>
+          </p:cNvSpPr>
+          <p:nvPr>
+            <p:ph type="body" idx="1"/>
+          </p:nvPr>
+        </p:nvSpPr>
+        <p:spPr/>
+        <p:txBody>
+          <a:bodyPr/>
+          <a:lstStyle/>
+          <a:p>
+            <a:r>
+              <a:rPr lang="en-GB" dirty="0"/>
+              <a:t>Exercise 1</a:t>
+            </a:r>
+            <a:endParaRPr lang="sv-SE" dirty="0"/>
+          </a:p>
+        </p:txBody>
+      </p:sp>
+    </p:spTree>
+    <p:extLst>
+      <p:ext uri="{BB962C8B-B14F-4D97-AF65-F5344CB8AC3E}">
+        <p14:creationId xmlns:p14="http://schemas.microsoft.com/office/powerpoint/2010/main" val="68556685"/>
+      </p:ext>
+    </p:extLst>
+  </p:cSld>
+  <p:clrMapOvr>
+    <a:masterClrMapping/>
+  </p:clrMapOvr>
+</p:sld>
+</file>
+
+<file path=ppt/slides/slide14.xml><?xml version="1.0" encoding="utf-8"?>
+<p:sld xmlns:a="http://schemas.openxmlformats.org/drawingml/2006/main" xmlns:r="http://schemas.openxmlformats.org/officeDocument/2006/relationships" xmlns:p="http://schemas.openxmlformats.org/presentationml/2006/main">
+  <p:cSld>
+    <p:spTree>
+      <p:nvGrpSpPr>
+        <p:cNvPr id="1" name=""/>
+        <p:cNvGrpSpPr/>
+        <p:nvPr/>
+      </p:nvGrpSpPr>
+      <p:grpSpPr>
+        <a:xfrm>
+          <a:off x="0" y="0"/>
+          <a:ext cx="0" cy="0"/>
+          <a:chOff x="0" y="0"/>
+          <a:chExt cx="0" cy="0"/>
+        </a:xfrm>
+      </p:grpSpPr>
+      <p:sp>
+        <p:nvSpPr>
+          <p:cNvPr id="2" name="Title 1"/>
+          <p:cNvSpPr>
+            <a:spLocks noGrp="1"/>
+          </p:cNvSpPr>
+          <p:nvPr>
+            <p:ph type="title"/>
+          </p:nvPr>
+        </p:nvSpPr>
+        <p:spPr/>
+        <p:txBody>
+          <a:bodyPr/>
+          <a:lstStyle/>
+          <a:p>
+            <a:r>
+              <a:rPr lang="en-GB" dirty="0" smtClean="0"/>
+              <a:t>Upcoming saga changes in v6</a:t>
+            </a:r>
+            <a:endParaRPr lang="sv-SE" dirty="0"/>
+          </a:p>
+        </p:txBody>
+      </p:sp>
+      <p:sp>
+        <p:nvSpPr>
+          <p:cNvPr id="3" name="Content Placeholder 2"/>
+          <p:cNvSpPr>
+            <a:spLocks noGrp="1"/>
+          </p:cNvSpPr>
+          <p:nvPr>
+            <p:ph idx="1"/>
+          </p:nvPr>
+        </p:nvSpPr>
+        <p:spPr/>
+        <p:txBody>
+          <a:bodyPr/>
+          <a:lstStyle/>
+          <a:p>
+            <a:endParaRPr lang="sv-SE" dirty="0"/>
+          </a:p>
+        </p:txBody>
+      </p:sp>
+    </p:spTree>
+    <p:extLst>
+      <p:ext uri="{BB962C8B-B14F-4D97-AF65-F5344CB8AC3E}">
+        <p14:creationId xmlns:p14="http://schemas.microsoft.com/office/powerpoint/2010/main" val="3057996759"/>
+      </p:ext>
+    </p:extLst>
+  </p:cSld>
+  <p:clrMapOvr>
+    <a:masterClrMapping/>
+  </p:clrMapOvr>
+</p:sld>
+</file>
+
 <file path=ppt/slides/slide2.xml><?xml version="1.0" encoding="utf-8"?>
 <p:sld xmlns:a="http://schemas.openxmlformats.org/drawingml/2006/main" xmlns:r="http://schemas.openxmlformats.org/officeDocument/2006/relationships" xmlns:p="http://schemas.openxmlformats.org/presentationml/2006/main">
   <p:cSld>
@@ -3280,7 +3776,26 @@
             </a:pPr>
             <a:r>
               <a:rPr lang="en-US" dirty="0" smtClean="0"/>
-              <a:t>A saga is pattern for implementing long-lived transaction by using a series of shorter transactions</a:t>
+              <a:t>A saga is pattern for implementing long-lived transaction by using a series of shorter </a:t>
+            </a:r>
+            <a:r>
+              <a:rPr lang="en-US" dirty="0" smtClean="0"/>
+              <a:t>transactions</a:t>
+            </a:r>
+          </a:p>
+          <a:p>
+            <a:pPr marL="0" indent="0">
+              <a:buNone/>
+            </a:pPr>
+            <a:endParaRPr lang="en-US" dirty="0"/>
+          </a:p>
+          <a:p>
+            <a:pPr marL="0" indent="0">
+              <a:buNone/>
+            </a:pPr>
+            <a:r>
+              <a:rPr lang="en-GB" dirty="0"/>
+              <a:t>Sagas = message driven state machines</a:t>
             </a:r>
             <a:endParaRPr lang="sv-SE" dirty="0"/>
           </a:p>
@@ -3333,7 +3848,7 @@
           <a:p>
             <a:r>
               <a:rPr lang="en-GB" dirty="0" smtClean="0"/>
-              <a:t>Sagas = message driven state machines</a:t>
+              <a:t>Handling messages</a:t>
             </a:r>
             <a:endParaRPr lang="sv-SE" dirty="0"/>
           </a:p>
@@ -3354,21 +3869,14 @@
           <a:bodyPr/>
           <a:lstStyle/>
           <a:p>
-            <a:pPr marL="0" indent="0">
-              <a:buNone/>
-            </a:pPr>
-            <a:r>
-              <a:rPr lang="en-GB" dirty="0" smtClean="0"/>
-              <a:t>* </a:t>
-            </a:r>
-            <a:endParaRPr lang="sv-SE" dirty="0"/>
+            <a:endParaRPr lang="sv-SE"/>
           </a:p>
         </p:txBody>
       </p:sp>
     </p:spTree>
     <p:extLst>
       <p:ext uri="{BB962C8B-B14F-4D97-AF65-F5344CB8AC3E}">
-        <p14:creationId xmlns:p14="http://schemas.microsoft.com/office/powerpoint/2010/main" val="1317758497"/>
+        <p14:creationId xmlns:p14="http://schemas.microsoft.com/office/powerpoint/2010/main" val="2546748312"/>
       </p:ext>
     </p:extLst>
   </p:cSld>
@@ -3412,7 +3920,7 @@
           <a:p>
             <a:r>
               <a:rPr lang="en-GB" dirty="0" smtClean="0"/>
-              <a:t>Sample domain walkthrough</a:t>
+              <a:t>Starting sagas</a:t>
             </a:r>
             <a:endParaRPr lang="sv-SE" dirty="0"/>
           </a:p>
@@ -3433,44 +3941,14 @@
           <a:bodyPr/>
           <a:lstStyle/>
           <a:p>
-            <a:r>
-              <a:rPr lang="en-GB" dirty="0" smtClean="0"/>
-              <a:t>Shop</a:t>
-            </a:r>
-          </a:p>
-          <a:p>
-            <a:r>
-              <a:rPr lang="en-GB" dirty="0" smtClean="0"/>
-              <a:t>Sales</a:t>
-            </a:r>
-          </a:p>
-          <a:p>
-            <a:r>
-              <a:rPr lang="en-GB" dirty="0" smtClean="0"/>
-              <a:t>Billing</a:t>
-            </a:r>
-          </a:p>
-          <a:p>
-            <a:r>
-              <a:rPr lang="en-GB" dirty="0" smtClean="0"/>
-              <a:t>Shipping</a:t>
-            </a:r>
-          </a:p>
-          <a:p>
-            <a:r>
-              <a:rPr lang="en-GB" dirty="0" smtClean="0"/>
-              <a:t>Customer care</a:t>
-            </a:r>
-          </a:p>
-          <a:p>
-            <a:endParaRPr lang="sv-SE" dirty="0"/>
+            <a:endParaRPr lang="sv-SE"/>
           </a:p>
         </p:txBody>
       </p:sp>
     </p:spTree>
     <p:extLst>
       <p:ext uri="{BB962C8B-B14F-4D97-AF65-F5344CB8AC3E}">
-        <p14:creationId xmlns:p14="http://schemas.microsoft.com/office/powerpoint/2010/main" val="327253573"/>
+        <p14:creationId xmlns:p14="http://schemas.microsoft.com/office/powerpoint/2010/main" val="3569026885"/>
       </p:ext>
     </p:extLst>
   </p:cSld>
@@ -3514,7 +3992,7 @@
           <a:p>
             <a:r>
               <a:rPr lang="en-GB" dirty="0" smtClean="0"/>
-              <a:t>Exercise 1</a:t>
+              <a:t>Storing state</a:t>
             </a:r>
             <a:endParaRPr lang="sv-SE" dirty="0"/>
           </a:p>
@@ -3535,92 +4013,14 @@
           <a:bodyPr/>
           <a:lstStyle/>
           <a:p>
-            <a:r>
-              <a:rPr lang="en-GB" dirty="0" smtClean="0"/>
-              <a:t>Create the order policy saga in the sales service</a:t>
-            </a:r>
-          </a:p>
-          <a:p>
-            <a:r>
-              <a:rPr lang="en-GB" dirty="0" smtClean="0"/>
-              <a:t>Starts with the </a:t>
-            </a:r>
-            <a:r>
-              <a:rPr lang="en-GB" dirty="0" err="1" smtClean="0"/>
-              <a:t>StartOrder</a:t>
-            </a:r>
-            <a:r>
-              <a:rPr lang="en-GB" dirty="0" smtClean="0"/>
-              <a:t> command</a:t>
-            </a:r>
-            <a:endParaRPr lang="sv-SE" dirty="0" smtClean="0"/>
-          </a:p>
-          <a:p>
-            <a:r>
-              <a:rPr lang="en-GB" dirty="0" smtClean="0"/>
-              <a:t>State changes</a:t>
-            </a:r>
-          </a:p>
-          <a:p>
-            <a:pPr lvl="1"/>
-            <a:r>
-              <a:rPr lang="en-GB" dirty="0" err="1" smtClean="0"/>
-              <a:t>PlaceOrder</a:t>
-            </a:r>
-            <a:r>
-              <a:rPr lang="en-GB" dirty="0" smtClean="0"/>
-              <a:t> (Command)</a:t>
-            </a:r>
-          </a:p>
-          <a:p>
-            <a:pPr lvl="1"/>
-            <a:r>
-              <a:rPr lang="en-GB" dirty="0" err="1" smtClean="0"/>
-              <a:t>CancelOrder</a:t>
-            </a:r>
-            <a:r>
-              <a:rPr lang="en-GB" dirty="0" smtClean="0"/>
-              <a:t> (Command)</a:t>
-            </a:r>
-          </a:p>
-          <a:p>
-            <a:pPr lvl="1"/>
-            <a:r>
-              <a:rPr lang="en-GB" dirty="0" err="1" smtClean="0"/>
-              <a:t>OrderAbandoned</a:t>
-            </a:r>
-            <a:r>
-              <a:rPr lang="en-GB" dirty="0" smtClean="0"/>
-              <a:t> (Event)</a:t>
-            </a:r>
-          </a:p>
-          <a:p>
-            <a:r>
-              <a:rPr lang="en-GB" dirty="0" smtClean="0"/>
-              <a:t>Business rule:</a:t>
-            </a:r>
-          </a:p>
-          <a:p>
-            <a:pPr lvl="1"/>
-            <a:r>
-              <a:rPr lang="en-GB" dirty="0" smtClean="0"/>
-              <a:t>An order is abandoned if not </a:t>
-            </a:r>
-            <a:r>
-              <a:rPr lang="en-GB" dirty="0" err="1" smtClean="0"/>
-              <a:t>canceled</a:t>
-            </a:r>
-            <a:r>
-              <a:rPr lang="en-GB" dirty="0" smtClean="0"/>
-              <a:t> or placed within 20 seconds</a:t>
-            </a:r>
+            <a:endParaRPr lang="sv-SE"/>
           </a:p>
         </p:txBody>
       </p:sp>
     </p:spTree>
     <p:extLst>
       <p:ext uri="{BB962C8B-B14F-4D97-AF65-F5344CB8AC3E}">
-        <p14:creationId xmlns:p14="http://schemas.microsoft.com/office/powerpoint/2010/main" val="613529079"/>
+        <p14:creationId xmlns:p14="http://schemas.microsoft.com/office/powerpoint/2010/main" val="1423839945"/>
       </p:ext>
     </p:extLst>
   </p:cSld>
@@ -3664,7 +4064,7 @@
           <a:p>
             <a:r>
               <a:rPr lang="en-GB" dirty="0" smtClean="0"/>
-              <a:t>Walkthrough – Exercise 1</a:t>
+              <a:t>Mapping messages to sagas</a:t>
             </a:r>
             <a:endParaRPr lang="sv-SE" dirty="0"/>
           </a:p>
@@ -3672,27 +4072,27 @@
       </p:sp>
       <p:sp>
         <p:nvSpPr>
-          <p:cNvPr id="4" name="Text Placeholder 3"/>
-          <p:cNvSpPr>
-            <a:spLocks noGrp="1"/>
-          </p:cNvSpPr>
-          <p:nvPr>
-            <p:ph type="body" idx="1"/>
-          </p:nvPr>
-        </p:nvSpPr>
-        <p:spPr/>
-        <p:txBody>
-          <a:bodyPr/>
-          <a:lstStyle/>
-          <a:p>
-            <a:endParaRPr lang="sv-SE"/>
+          <p:cNvPr id="3" name="Content Placeholder 2"/>
+          <p:cNvSpPr>
+            <a:spLocks noGrp="1"/>
+          </p:cNvSpPr>
+          <p:nvPr>
+            <p:ph idx="1"/>
+          </p:nvPr>
+        </p:nvSpPr>
+        <p:spPr/>
+        <p:txBody>
+          <a:bodyPr/>
+          <a:lstStyle/>
+          <a:p>
+            <a:endParaRPr lang="sv-SE" dirty="0"/>
           </a:p>
         </p:txBody>
       </p:sp>
     </p:spTree>
     <p:extLst>
       <p:ext uri="{BB962C8B-B14F-4D97-AF65-F5344CB8AC3E}">
-        <p14:creationId xmlns:p14="http://schemas.microsoft.com/office/powerpoint/2010/main" val="68556685"/>
+        <p14:creationId xmlns:p14="http://schemas.microsoft.com/office/powerpoint/2010/main" val="1134505641"/>
       </p:ext>
     </p:extLst>
   </p:cSld>
@@ -3736,7 +4136,7 @@
           <a:p>
             <a:r>
               <a:rPr lang="en-GB" dirty="0" smtClean="0"/>
-              <a:t>Upcoming saga changes in v6</a:t>
+              <a:t>Requesting timeouts</a:t>
             </a:r>
             <a:endParaRPr lang="sv-SE" dirty="0"/>
           </a:p>
@@ -3757,14 +4157,14 @@
           <a:bodyPr/>
           <a:lstStyle/>
           <a:p>
-            <a:endParaRPr lang="sv-SE" dirty="0"/>
+            <a:endParaRPr lang="sv-SE"/>
           </a:p>
         </p:txBody>
       </p:sp>
     </p:spTree>
     <p:extLst>
       <p:ext uri="{BB962C8B-B14F-4D97-AF65-F5344CB8AC3E}">
-        <p14:creationId xmlns:p14="http://schemas.microsoft.com/office/powerpoint/2010/main" val="3057996759"/>
+        <p14:creationId xmlns:p14="http://schemas.microsoft.com/office/powerpoint/2010/main" val="2370430415"/>
       </p:ext>
     </p:extLst>
   </p:cSld>

</xml_diff>

<commit_message>
Adding saga audit plugin
</commit_message>
<xml_diff>
--- a/SagaMasterClass.pptx
+++ b/SagaMasterClass.pptx
@@ -3574,11 +3574,7 @@
           <a:p>
             <a:r>
               <a:rPr lang="en-GB" dirty="0" smtClean="0"/>
-              <a:t>Where </a:t>
-            </a:r>
-            <a:r>
-              <a:rPr lang="en-GB" smtClean="0"/>
-              <a:t>sagas rule…</a:t>
+              <a:t>Where sagas rule…		</a:t>
             </a:r>
             <a:endParaRPr lang="sv-SE" dirty="0"/>
           </a:p>
@@ -8746,29 +8742,53 @@
           <a:lstStyle/>
           <a:p>
             <a:r>
+              <a:rPr lang="en-GB" smtClean="0"/>
+              <a:t>Prerequisites</a:t>
+            </a:r>
+            <a:endParaRPr lang="sv-SE" dirty="0"/>
+          </a:p>
+        </p:txBody>
+      </p:sp>
+      <p:sp>
+        <p:nvSpPr>
+          <p:cNvPr id="3" name="Content Placeholder 2"/>
+          <p:cNvSpPr>
+            <a:spLocks noGrp="1"/>
+          </p:cNvSpPr>
+          <p:nvPr>
+            <p:ph idx="1"/>
+          </p:nvPr>
+        </p:nvSpPr>
+        <p:spPr/>
+        <p:txBody>
+          <a:bodyPr/>
+          <a:lstStyle/>
+          <a:p>
+            <a:r>
               <a:rPr lang="en-GB" dirty="0" smtClean="0"/>
-              <a:t>Pre requisites</a:t>
-            </a:r>
-            <a:endParaRPr lang="sv-SE" dirty="0"/>
-          </a:p>
-        </p:txBody>
-      </p:sp>
-      <p:sp>
-        <p:nvSpPr>
-          <p:cNvPr id="3" name="Content Placeholder 2"/>
-          <p:cNvSpPr>
-            <a:spLocks noGrp="1"/>
-          </p:cNvSpPr>
-          <p:nvPr>
-            <p:ph idx="1"/>
-          </p:nvPr>
-        </p:nvSpPr>
-        <p:spPr/>
-        <p:txBody>
-          <a:bodyPr/>
-          <a:lstStyle/>
-          <a:p>
-            <a:endParaRPr lang="sv-SE"/>
+              <a:t>Latest Particular Platform</a:t>
+            </a:r>
+          </a:p>
+          <a:p>
+            <a:r>
+              <a:rPr lang="en-GB" dirty="0" smtClean="0"/>
+              <a:t>MSMQ</a:t>
+            </a:r>
+          </a:p>
+          <a:p>
+            <a:r>
+              <a:rPr lang="en-GB" dirty="0" smtClean="0"/>
+              <a:t>SQL Server</a:t>
+            </a:r>
+            <a:r>
+              <a:rPr lang="sv-SE" dirty="0"/>
+              <a:t> </a:t>
+            </a:r>
+            <a:r>
+              <a:rPr lang="sv-SE" dirty="0" smtClean="0"/>
+              <a:t>+ Management tools</a:t>
+            </a:r>
+            <a:endParaRPr lang="en-GB" dirty="0" smtClean="0"/>
           </a:p>
         </p:txBody>
       </p:sp>

</xml_diff>

<commit_message>
Instructions for concurrency exercise
</commit_message>
<xml_diff>
--- a/SagaMasterClass.pptx
+++ b/SagaMasterClass.pptx
@@ -10387,7 +10387,7 @@
             <a:endParaRPr lang="sv-SE" dirty="0"/>
           </a:p>
           <a:p>
-            <a:endParaRPr lang="sv-SE"/>
+            <a:endParaRPr lang="sv-SE" dirty="0"/>
           </a:p>
           <a:p>
             <a:pPr marL="0" indent="0">
@@ -10462,13 +10462,99 @@
         </p:nvSpPr>
         <p:spPr/>
         <p:txBody>
-          <a:bodyPr/>
-          <a:lstStyle/>
-          <a:p>
-            <a:pPr marL="0" indent="0">
-              <a:buNone/>
-            </a:pPr>
-            <a:endParaRPr lang="sv-SE" dirty="0"/>
+          <a:bodyPr>
+            <a:normAutofit fontScale="92500" lnSpcReduction="10000"/>
+          </a:bodyPr>
+          <a:lstStyle/>
+          <a:p>
+            <a:r>
+              <a:rPr lang="en-GB" dirty="0" smtClean="0"/>
+              <a:t>Pessimistic locking</a:t>
+            </a:r>
+          </a:p>
+          <a:p>
+            <a:pPr lvl="1"/>
+            <a:r>
+              <a:rPr lang="en-GB" dirty="0" smtClean="0"/>
+              <a:t>Upgrade locks</a:t>
+            </a:r>
+          </a:p>
+          <a:p>
+            <a:pPr lvl="1"/>
+            <a:r>
+              <a:rPr lang="en-GB" dirty="0" smtClean="0"/>
+              <a:t>Ok since its just locking a single saga instance</a:t>
+            </a:r>
+          </a:p>
+          <a:p>
+            <a:pPr lvl="1"/>
+            <a:r>
+              <a:rPr lang="en-GB" dirty="0" smtClean="0"/>
+              <a:t>All messages updates saga state (usually)</a:t>
+            </a:r>
+          </a:p>
+          <a:p>
+            <a:r>
+              <a:rPr lang="en-US" dirty="0"/>
+              <a:t>exec </a:t>
+            </a:r>
+            <a:r>
+              <a:rPr lang="en-US" dirty="0" err="1"/>
+              <a:t>sp_executesql</a:t>
+            </a:r>
+            <a:r>
+              <a:rPr lang="en-US" dirty="0"/>
+              <a:t> N'UPDATE </a:t>
+            </a:r>
+            <a:r>
+              <a:rPr lang="en-US" dirty="0" err="1"/>
+              <a:t>ShippingPolicy</a:t>
+            </a:r>
+            <a:r>
+              <a:rPr lang="en-US" dirty="0"/>
+              <a:t> SET Billed = @p0 WHERE Id = @p1 AND Originator = @p2 AND </a:t>
+            </a:r>
+            <a:r>
+              <a:rPr lang="en-US" dirty="0" err="1"/>
+              <a:t>OriginalMessageId</a:t>
+            </a:r>
+            <a:r>
+              <a:rPr lang="en-US" dirty="0"/>
+              <a:t> = @p3 AND </a:t>
+            </a:r>
+            <a:r>
+              <a:rPr lang="en-US" dirty="0" err="1"/>
+              <a:t>OrderId</a:t>
+            </a:r>
+            <a:r>
+              <a:rPr lang="en-US" dirty="0"/>
+              <a:t> = @p4 AND Placed = @p5 AND Billed = @p6',N'@p0 bit,@p1 uniqueidentifier,@p2 </a:t>
+            </a:r>
+            <a:r>
+              <a:rPr lang="en-US" dirty="0" err="1"/>
+              <a:t>nvarchar</a:t>
+            </a:r>
+            <a:r>
+              <a:rPr lang="en-US" dirty="0"/>
+              <a:t>(4000),@p3 </a:t>
+            </a:r>
+            <a:r>
+              <a:rPr lang="en-US" dirty="0" err="1"/>
+              <a:t>nvarchar</a:t>
+            </a:r>
+            <a:r>
+              <a:rPr lang="en-US" dirty="0"/>
+              <a:t>(4000),@p4 </a:t>
+            </a:r>
+            <a:r>
+              <a:rPr lang="en-US" dirty="0" err="1"/>
+              <a:t>nvarchar</a:t>
+            </a:r>
+            <a:r>
+              <a:rPr lang="en-US"/>
+              <a:t>(4000),@p5 bit,@p6 bit',@p0=1,@p1='870D112B-44D1-4206-A4DB-A55B015DA80A',@p2=N'Sales@ANDREAS2015',@p3=N'baf9b6bb-a0da-41b9-8a81-a55b015d7a05',@p4=N'a23a2438-3af6-4c0a-a108-7f8e72d12083',@p5=1,@p6=0</a:t>
+            </a:r>
+            <a:endParaRPr lang="en-GB" dirty="0" smtClean="0"/>
           </a:p>
         </p:txBody>
       </p:sp>
@@ -10776,42 +10862,47 @@
           <a:p>
             <a:r>
               <a:rPr lang="en-GB" dirty="0" smtClean="0"/>
-              <a:t>Include the Billing and Shipping projects</a:t>
-            </a:r>
-          </a:p>
-          <a:p>
+              <a:t>Mak</a:t>
+            </a:r>
             <a:r>
               <a:rPr lang="en-GB" dirty="0" smtClean="0"/>
-              <a:t>Create a event handler in Billing that emits the `</a:t>
+              <a:t>e sure that the billing endpoint is stopped</a:t>
+            </a:r>
+          </a:p>
+          <a:p>
+            <a:r>
+              <a:rPr lang="en-GB" dirty="0" smtClean="0"/>
+              <a:t>Place a new order</a:t>
+            </a:r>
+          </a:p>
+          <a:p>
+            <a:r>
+              <a:rPr lang="en-GB" dirty="0" smtClean="0"/>
+              <a:t>Notice the concurrency exception </a:t>
+            </a:r>
+          </a:p>
+          <a:p>
+            <a:pPr lvl="1"/>
+            <a:r>
+              <a:rPr lang="en-GB" dirty="0" smtClean="0"/>
+              <a:t>In the </a:t>
             </a:r>
             <a:r>
               <a:rPr lang="en-GB" dirty="0" err="1" smtClean="0"/>
-              <a:t>OrderBilled</a:t>
+              <a:t>logfile</a:t>
             </a:r>
             <a:r>
               <a:rPr lang="en-GB" dirty="0" smtClean="0"/>
-              <a:t>` Event</a:t>
-            </a:r>
-          </a:p>
-          <a:p>
+              <a:t> in /bin/debug</a:t>
+            </a:r>
+          </a:p>
+          <a:p>
+            <a:pPr lvl="1"/>
             <a:r>
               <a:rPr lang="en-GB" dirty="0" smtClean="0"/>
-              <a:t>Create a Shipping saga that</a:t>
-            </a:r>
-          </a:p>
-          <a:p>
-            <a:pPr lvl="1"/>
-            <a:r>
-              <a:rPr lang="en-GB" dirty="0" smtClean="0"/>
-              <a:t>Starts a ship order sub process when the order has been accepted and billed</a:t>
-            </a:r>
-          </a:p>
-          <a:p>
-            <a:pPr lvl="1"/>
-            <a:r>
-              <a:rPr lang="en-GB" dirty="0" smtClean="0"/>
-              <a:t>For now just make the sub process a message handler</a:t>
-            </a:r>
+              <a:t>Or </a:t>
+            </a:r>
+            <a:endParaRPr lang="en-GB" dirty="0" smtClean="0"/>
           </a:p>
         </p:txBody>
       </p:sp>

</xml_diff>

<commit_message>
Exercise 4 & spelling
</commit_message>
<xml_diff>
--- a/SagaMasterClass.pptx
+++ b/SagaMasterClass.pptx
@@ -26217,8 +26217,61 @@
           <a:p>
             <a:r>
               <a:rPr lang="en-GB" dirty="0" smtClean="0"/>
-              <a:t>TBD - Daniel</a:t>
-            </a:r>
+              <a:t>Create a </a:t>
+            </a:r>
+            <a:r>
+              <a:rPr lang="en-GB" dirty="0" err="1" smtClean="0"/>
+              <a:t>ShipOrder</a:t>
+            </a:r>
+            <a:r>
+              <a:rPr lang="en-GB" dirty="0" smtClean="0"/>
+              <a:t> Policy</a:t>
+            </a:r>
+            <a:endParaRPr lang="en-GB" dirty="0" smtClean="0"/>
+          </a:p>
+          <a:p>
+            <a:r>
+              <a:rPr lang="en-GB" dirty="0" smtClean="0"/>
+              <a:t>Create a </a:t>
+            </a:r>
+            <a:r>
+              <a:rPr lang="en-GB" dirty="0" err="1" smtClean="0"/>
+              <a:t>Fedex.Gateway</a:t>
+            </a:r>
+            <a:endParaRPr lang="en-GB" dirty="0" smtClean="0"/>
+          </a:p>
+          <a:p>
+            <a:r>
+              <a:rPr lang="en-GB" dirty="0" smtClean="0"/>
+              <a:t>Create a </a:t>
+            </a:r>
+            <a:r>
+              <a:rPr lang="en-GB" dirty="0" err="1" smtClean="0"/>
+              <a:t>Ups.Gateway</a:t>
+            </a:r>
+            <a:endParaRPr lang="en-GB" dirty="0" smtClean="0"/>
+          </a:p>
+          <a:p>
+            <a:r>
+              <a:rPr lang="en-GB" dirty="0" smtClean="0"/>
+              <a:t>Use the provided </a:t>
+            </a:r>
+            <a:r>
+              <a:rPr lang="en-GB" dirty="0" err="1" smtClean="0"/>
+              <a:t>Fedex.Simulator</a:t>
+            </a:r>
+            <a:r>
+              <a:rPr lang="en-GB" dirty="0" smtClean="0"/>
+              <a:t> </a:t>
+            </a:r>
+            <a:br>
+              <a:rPr lang="en-GB" dirty="0" smtClean="0"/>
+            </a:br>
+            <a:r>
+              <a:rPr lang="en-GB" dirty="0" smtClean="0"/>
+              <a:t>GET http://localhost:8888/fedex/shipit</a:t>
+            </a:r>
+            <a:endParaRPr lang="en-GB" dirty="0" smtClean="0"/>
           </a:p>
         </p:txBody>
       </p:sp>
@@ -26480,7 +26533,11 @@
             </a:r>
             <a:r>
               <a:rPr lang="en-US" dirty="0" smtClean="0"/>
-              <a:t> do returns?</a:t>
+              <a:t> </a:t>
+            </a:r>
+            <a:r>
+              <a:rPr lang="en-US" dirty="0" smtClean="0"/>
+              <a:t>does return?</a:t>
             </a:r>
             <a:endParaRPr lang="en-US" dirty="0"/>
           </a:p>
@@ -39161,10 +39218,6 @@
               </a:rPr>
               <a:t> {</a:t>
             </a:r>
-            <a:endParaRPr lang="en-GB" dirty="0" smtClean="0">
-              <a:latin typeface="Consolas" panose="020B0609020204030204" pitchFamily="49" charset="0"/>
-              <a:cs typeface="Consolas" panose="020B0609020204030204" pitchFamily="49" charset="0"/>
-            </a:endParaRPr>
           </a:p>
           <a:p>
             <a:pPr marL="0" indent="0">

</xml_diff>

<commit_message>
Spelling -> Coquin to Cogin
</commit_message>
<xml_diff>
--- a/SagaMasterClass.pptx
+++ b/SagaMasterClass.pptx
@@ -377,7 +377,7 @@
           <a:p>
             <a:fld id="{058A98C1-2963-45B6-8396-F9770A549EA4}" type="datetimeFigureOut">
               <a:rPr lang="sv-SE" smtClean="0"/>
-              <a:t>2015-11-27</a:t>
+              <a:t>2015-11-28</a:t>
             </a:fld>
             <a:endParaRPr lang="sv-SE"/>
           </a:p>
@@ -3991,7 +3991,7 @@
           <a:p>
             <a:fld id="{117CE5AD-8B70-46AB-83FD-10724A794102}" type="datetimeFigureOut">
               <a:rPr lang="sv-SE" smtClean="0"/>
-              <a:t>2015-11-27</a:t>
+              <a:t>2015-11-28</a:t>
             </a:fld>
             <a:endParaRPr lang="sv-SE"/>
           </a:p>
@@ -4161,7 +4161,7 @@
           <a:p>
             <a:fld id="{117CE5AD-8B70-46AB-83FD-10724A794102}" type="datetimeFigureOut">
               <a:rPr lang="sv-SE" smtClean="0"/>
-              <a:t>2015-11-27</a:t>
+              <a:t>2015-11-28</a:t>
             </a:fld>
             <a:endParaRPr lang="sv-SE"/>
           </a:p>
@@ -4341,7 +4341,7 @@
           <a:p>
             <a:fld id="{117CE5AD-8B70-46AB-83FD-10724A794102}" type="datetimeFigureOut">
               <a:rPr lang="sv-SE" smtClean="0"/>
-              <a:t>2015-11-27</a:t>
+              <a:t>2015-11-28</a:t>
             </a:fld>
             <a:endParaRPr lang="sv-SE"/>
           </a:p>
@@ -4511,7 +4511,7 @@
           <a:p>
             <a:fld id="{117CE5AD-8B70-46AB-83FD-10724A794102}" type="datetimeFigureOut">
               <a:rPr lang="sv-SE" smtClean="0"/>
-              <a:t>2015-11-27</a:t>
+              <a:t>2015-11-28</a:t>
             </a:fld>
             <a:endParaRPr lang="sv-SE"/>
           </a:p>
@@ -4757,7 +4757,7 @@
           <a:p>
             <a:fld id="{117CE5AD-8B70-46AB-83FD-10724A794102}" type="datetimeFigureOut">
               <a:rPr lang="sv-SE" smtClean="0"/>
-              <a:t>2015-11-27</a:t>
+              <a:t>2015-11-28</a:t>
             </a:fld>
             <a:endParaRPr lang="sv-SE"/>
           </a:p>
@@ -4989,7 +4989,7 @@
           <a:p>
             <a:fld id="{117CE5AD-8B70-46AB-83FD-10724A794102}" type="datetimeFigureOut">
               <a:rPr lang="sv-SE" smtClean="0"/>
-              <a:t>2015-11-27</a:t>
+              <a:t>2015-11-28</a:t>
             </a:fld>
             <a:endParaRPr lang="sv-SE"/>
           </a:p>
@@ -5356,7 +5356,7 @@
           <a:p>
             <a:fld id="{117CE5AD-8B70-46AB-83FD-10724A794102}" type="datetimeFigureOut">
               <a:rPr lang="sv-SE" smtClean="0"/>
-              <a:t>2015-11-27</a:t>
+              <a:t>2015-11-28</a:t>
             </a:fld>
             <a:endParaRPr lang="sv-SE"/>
           </a:p>
@@ -5474,7 +5474,7 @@
           <a:p>
             <a:fld id="{117CE5AD-8B70-46AB-83FD-10724A794102}" type="datetimeFigureOut">
               <a:rPr lang="sv-SE" smtClean="0"/>
-              <a:t>2015-11-27</a:t>
+              <a:t>2015-11-28</a:t>
             </a:fld>
             <a:endParaRPr lang="sv-SE"/>
           </a:p>
@@ -5569,7 +5569,7 @@
           <a:p>
             <a:fld id="{117CE5AD-8B70-46AB-83FD-10724A794102}" type="datetimeFigureOut">
               <a:rPr lang="sv-SE" smtClean="0"/>
-              <a:t>2015-11-27</a:t>
+              <a:t>2015-11-28</a:t>
             </a:fld>
             <a:endParaRPr lang="sv-SE"/>
           </a:p>
@@ -5846,7 +5846,7 @@
           <a:p>
             <a:fld id="{117CE5AD-8B70-46AB-83FD-10724A794102}" type="datetimeFigureOut">
               <a:rPr lang="sv-SE" smtClean="0"/>
-              <a:t>2015-11-27</a:t>
+              <a:t>2015-11-28</a:t>
             </a:fld>
             <a:endParaRPr lang="sv-SE"/>
           </a:p>
@@ -6099,7 +6099,7 @@
           <a:p>
             <a:fld id="{117CE5AD-8B70-46AB-83FD-10724A794102}" type="datetimeFigureOut">
               <a:rPr lang="sv-SE" smtClean="0"/>
-              <a:t>2015-11-27</a:t>
+              <a:t>2015-11-28</a:t>
             </a:fld>
             <a:endParaRPr lang="sv-SE"/>
           </a:p>
@@ -6312,7 +6312,7 @@
           <a:p>
             <a:fld id="{117CE5AD-8B70-46AB-83FD-10724A794102}" type="datetimeFigureOut">
               <a:rPr lang="sv-SE" smtClean="0"/>
-              <a:t>2015-11-27</a:t>
+              <a:t>2015-11-28</a:t>
             </a:fld>
             <a:endParaRPr lang="sv-SE"/>
           </a:p>
@@ -6773,6 +6773,13 @@
   <p:clrMapOvr>
     <a:masterClrMapping/>
   </p:clrMapOvr>
+  <p:timing>
+    <p:tnLst>
+      <p:par>
+        <p:cTn id="1" dur="indefinite" restart="never" nodeType="tmRoot"/>
+      </p:par>
+    </p:tnLst>
+  </p:timing>
 </p:sld>
 </file>
 
@@ -12497,6 +12504,13 @@
   <p:clrMapOvr>
     <a:masterClrMapping/>
   </p:clrMapOvr>
+  <p:timing>
+    <p:tnLst>
+      <p:par>
+        <p:cTn id="1" dur="indefinite" restart="never" nodeType="tmRoot"/>
+      </p:par>
+    </p:tnLst>
+  </p:timing>
 </p:sld>
 </file>
 
@@ -17454,11 +17468,15 @@
             <a:pPr lvl="1"/>
             <a:r>
               <a:rPr lang="en-GB" dirty="0" err="1" smtClean="0"/>
-              <a:t>Coquin</a:t>
+              <a:t>Cogin</a:t>
             </a:r>
             <a:r>
               <a:rPr lang="en-GB" dirty="0" smtClean="0"/>
-              <a:t> Queue </a:t>
+              <a:t> </a:t>
+            </a:r>
+            <a:r>
+              <a:rPr lang="en-GB" dirty="0" smtClean="0"/>
+              <a:t>Queue </a:t>
             </a:r>
             <a:r>
               <a:rPr lang="en-GB" dirty="0"/>
@@ -17485,6 +17503,13 @@
   <p:clrMapOvr>
     <a:masterClrMapping/>
   </p:clrMapOvr>
+  <p:timing>
+    <p:tnLst>
+      <p:par>
+        <p:cTn id="1" dur="indefinite" restart="never" nodeType="tmRoot"/>
+      </p:par>
+    </p:tnLst>
+  </p:timing>
 </p:sld>
 </file>
 
@@ -26227,7 +26252,6 @@
               <a:rPr lang="en-GB" dirty="0" smtClean="0"/>
               <a:t> Policy</a:t>
             </a:r>
-            <a:endParaRPr lang="en-GB" dirty="0" smtClean="0"/>
           </a:p>
           <a:p>
             <a:r>
@@ -26271,7 +26295,6 @@
               <a:rPr lang="en-GB" dirty="0" smtClean="0"/>
               <a:t>GET http://localhost:8888/fedex/shipit</a:t>
             </a:r>
-            <a:endParaRPr lang="en-GB" dirty="0" smtClean="0"/>
           </a:p>
         </p:txBody>
       </p:sp>
@@ -26390,6 +26413,13 @@
   <p:clrMapOvr>
     <a:masterClrMapping/>
   </p:clrMapOvr>
+  <p:timing>
+    <p:tnLst>
+      <p:par>
+        <p:cTn id="1" dur="indefinite" restart="never" nodeType="tmRoot"/>
+      </p:par>
+    </p:tnLst>
+  </p:timing>
 </p:sld>
 </file>
 
@@ -26533,11 +26563,7 @@
             </a:r>
             <a:r>
               <a:rPr lang="en-US" dirty="0" smtClean="0"/>
-              <a:t> </a:t>
-            </a:r>
-            <a:r>
-              <a:rPr lang="en-US" dirty="0" smtClean="0"/>
-              <a:t>does return?</a:t>
+              <a:t> does return?</a:t>
             </a:r>
             <a:endParaRPr lang="en-US" dirty="0"/>
           </a:p>
@@ -34681,11 +34707,11 @@
   <p:clrMapOvr>
     <a:masterClrMapping/>
   </p:clrMapOvr>
-  <mc:AlternateContent xmlns:mc="http://schemas.openxmlformats.org/markup-compatibility/2006" xmlns:p14="http://schemas.microsoft.com/office/powerpoint/2010/main">
-    <mc:Choice Requires="p14">
+  <mc:AlternateContent xmlns:mc="http://schemas.openxmlformats.org/markup-compatibility/2006">
+    <mc:Choice xmlns:p14="http://schemas.microsoft.com/office/powerpoint/2010/main" Requires="p14">
       <p:transition spd="slow" p14:dur="2000"/>
     </mc:Choice>
-    <mc:Fallback xmlns="">
+    <mc:Fallback>
       <p:transition spd="slow"/>
     </mc:Fallback>
   </mc:AlternateContent>
@@ -34859,11 +34885,11 @@
   <p:clrMapOvr>
     <a:masterClrMapping/>
   </p:clrMapOvr>
-  <mc:AlternateContent xmlns:mc="http://schemas.openxmlformats.org/markup-compatibility/2006" xmlns:p14="http://schemas.microsoft.com/office/powerpoint/2010/main">
-    <mc:Choice Requires="p14">
+  <mc:AlternateContent xmlns:mc="http://schemas.openxmlformats.org/markup-compatibility/2006">
+    <mc:Choice xmlns:p14="http://schemas.microsoft.com/office/powerpoint/2010/main" Requires="p14">
       <p:transition spd="slow" p14:dur="2000"/>
     </mc:Choice>
-    <mc:Fallback xmlns="">
+    <mc:Fallback>
       <p:transition spd="slow"/>
     </mc:Fallback>
   </mc:AlternateContent>
@@ -35226,11 +35252,11 @@
   <p:clrMapOvr>
     <a:masterClrMapping/>
   </p:clrMapOvr>
-  <mc:AlternateContent xmlns:mc="http://schemas.openxmlformats.org/markup-compatibility/2006" xmlns:p14="http://schemas.microsoft.com/office/powerpoint/2010/main">
-    <mc:Choice Requires="p14">
+  <mc:AlternateContent xmlns:mc="http://schemas.openxmlformats.org/markup-compatibility/2006">
+    <mc:Choice xmlns:p14="http://schemas.microsoft.com/office/powerpoint/2010/main" Requires="p14">
       <p:transition spd="slow" p14:dur="2000"/>
     </mc:Choice>
-    <mc:Fallback xmlns="">
+    <mc:Fallback>
       <p:transition spd="slow"/>
     </mc:Fallback>
   </mc:AlternateContent>
@@ -35398,11 +35424,11 @@
   <p:clrMapOvr>
     <a:masterClrMapping/>
   </p:clrMapOvr>
-  <mc:AlternateContent xmlns:mc="http://schemas.openxmlformats.org/markup-compatibility/2006" xmlns:p14="http://schemas.microsoft.com/office/powerpoint/2010/main">
-    <mc:Choice Requires="p14">
+  <mc:AlternateContent xmlns:mc="http://schemas.openxmlformats.org/markup-compatibility/2006">
+    <mc:Choice xmlns:p14="http://schemas.microsoft.com/office/powerpoint/2010/main" Requires="p14">
       <p:transition spd="slow" p14:dur="2000"/>
     </mc:Choice>
-    <mc:Fallback xmlns="">
+    <mc:Fallback>
       <p:transition spd="slow"/>
     </mc:Fallback>
   </mc:AlternateContent>

</xml_diff>

<commit_message>
Comments and small changes
</commit_message>
<xml_diff>
--- a/SagaMasterClass.pptx
+++ b/SagaMasterClass.pptx
@@ -293,6 +293,263 @@
     </p:ext>
   </p:extLst>
 </p:presentation>
+</file>
+
+<file path=ppt/commentAuthors.xml><?xml version="1.0" encoding="utf-8"?>
+<p:cmAuthorLst xmlns:a="http://schemas.openxmlformats.org/drawingml/2006/main" xmlns:r="http://schemas.openxmlformats.org/officeDocument/2006/relationships" xmlns:p="http://schemas.openxmlformats.org/presentationml/2006/main">
+  <p:cmAuthor id="7" name="David Boike" initials="djb [7]" lastIdx="1" clrIdx="6">
+    <p:extLst>
+      <p:ext uri="{19B8F6BF-5375-455C-9EA6-DF929625EA0E}">
+        <p15:presenceInfo xmlns:p15="http://schemas.microsoft.com/office/powerpoint/2012/main" userId="" providerId=""/>
+      </p:ext>
+    </p:extLst>
+  </p:cmAuthor>
+  <p:cmAuthor id="1" name="David Boike" initials="djb" lastIdx="1" clrIdx="0">
+    <p:extLst>
+      <p:ext uri="{19B8F6BF-5375-455C-9EA6-DF929625EA0E}">
+        <p15:presenceInfo xmlns:p15="http://schemas.microsoft.com/office/powerpoint/2012/main" userId="" providerId=""/>
+      </p:ext>
+    </p:extLst>
+  </p:cmAuthor>
+  <p:cmAuthor id="8" name="David Boike" initials="djb [8]" lastIdx="1" clrIdx="7">
+    <p:extLst>
+      <p:ext uri="{19B8F6BF-5375-455C-9EA6-DF929625EA0E}">
+        <p15:presenceInfo xmlns:p15="http://schemas.microsoft.com/office/powerpoint/2012/main" userId="" providerId=""/>
+      </p:ext>
+    </p:extLst>
+  </p:cmAuthor>
+  <p:cmAuthor id="2" name="David Boike" initials="djb [2]" lastIdx="1" clrIdx="1">
+    <p:extLst>
+      <p:ext uri="{19B8F6BF-5375-455C-9EA6-DF929625EA0E}">
+        <p15:presenceInfo xmlns:p15="http://schemas.microsoft.com/office/powerpoint/2012/main" userId="" providerId=""/>
+      </p:ext>
+    </p:extLst>
+  </p:cmAuthor>
+  <p:cmAuthor id="9" name="David Boike" initials="djb [9]" lastIdx="1" clrIdx="8">
+    <p:extLst>
+      <p:ext uri="{19B8F6BF-5375-455C-9EA6-DF929625EA0E}">
+        <p15:presenceInfo xmlns:p15="http://schemas.microsoft.com/office/powerpoint/2012/main" userId="" providerId=""/>
+      </p:ext>
+    </p:extLst>
+  </p:cmAuthor>
+  <p:cmAuthor id="3" name="David Boike" initials="djb [3]" lastIdx="1" clrIdx="2">
+    <p:extLst>
+      <p:ext uri="{19B8F6BF-5375-455C-9EA6-DF929625EA0E}">
+        <p15:presenceInfo xmlns:p15="http://schemas.microsoft.com/office/powerpoint/2012/main" userId="" providerId=""/>
+      </p:ext>
+    </p:extLst>
+  </p:cmAuthor>
+  <p:cmAuthor id="10" name="David Boike" initials="djb [10]" lastIdx="1" clrIdx="9">
+    <p:extLst>
+      <p:ext uri="{19B8F6BF-5375-455C-9EA6-DF929625EA0E}">
+        <p15:presenceInfo xmlns:p15="http://schemas.microsoft.com/office/powerpoint/2012/main" userId="" providerId=""/>
+      </p:ext>
+    </p:extLst>
+  </p:cmAuthor>
+  <p:cmAuthor id="4" name="David Boike" initials="djb [4]" lastIdx="1" clrIdx="3">
+    <p:extLst>
+      <p:ext uri="{19B8F6BF-5375-455C-9EA6-DF929625EA0E}">
+        <p15:presenceInfo xmlns:p15="http://schemas.microsoft.com/office/powerpoint/2012/main" userId="" providerId=""/>
+      </p:ext>
+    </p:extLst>
+  </p:cmAuthor>
+  <p:cmAuthor id="11" name="David Boike" initials="djb [11]" lastIdx="1" clrIdx="10">
+    <p:extLst>
+      <p:ext uri="{19B8F6BF-5375-455C-9EA6-DF929625EA0E}">
+        <p15:presenceInfo xmlns:p15="http://schemas.microsoft.com/office/powerpoint/2012/main" userId="" providerId=""/>
+      </p:ext>
+    </p:extLst>
+  </p:cmAuthor>
+  <p:cmAuthor id="5" name="David Boike" initials="djb [5]" lastIdx="1" clrIdx="4">
+    <p:extLst>
+      <p:ext uri="{19B8F6BF-5375-455C-9EA6-DF929625EA0E}">
+        <p15:presenceInfo xmlns:p15="http://schemas.microsoft.com/office/powerpoint/2012/main" userId="" providerId=""/>
+      </p:ext>
+    </p:extLst>
+  </p:cmAuthor>
+  <p:cmAuthor id="12" name="David Boike" initials="djb [12]" lastIdx="1" clrIdx="11">
+    <p:extLst>
+      <p:ext uri="{19B8F6BF-5375-455C-9EA6-DF929625EA0E}">
+        <p15:presenceInfo xmlns:p15="http://schemas.microsoft.com/office/powerpoint/2012/main" userId="" providerId=""/>
+      </p:ext>
+    </p:extLst>
+  </p:cmAuthor>
+  <p:cmAuthor id="6" name="David Boike" initials="djb [6]" lastIdx="1" clrIdx="5">
+    <p:extLst>
+      <p:ext uri="{19B8F6BF-5375-455C-9EA6-DF929625EA0E}">
+        <p15:presenceInfo xmlns:p15="http://schemas.microsoft.com/office/powerpoint/2012/main" userId="" providerId=""/>
+      </p:ext>
+    </p:extLst>
+  </p:cmAuthor>
+</p:cmAuthorLst>
+</file>
+
+<file path=ppt/comments/comment1.xml><?xml version="1.0" encoding="utf-8"?>
+<p:cmLst xmlns:a="http://schemas.openxmlformats.org/drawingml/2006/main" xmlns:r="http://schemas.openxmlformats.org/officeDocument/2006/relationships" xmlns:p="http://schemas.openxmlformats.org/presentationml/2006/main">
+  <p:cm authorId="1" dt="2015-11-28T22:00:30.722" idx="1">
+    <p:pos x="2864" y="1175"/>
+    <p:text>Picture needed</p:text>
+    <p:extLst>
+      <p:ext uri="{C676402C-5697-4E1C-873F-D02D1690AC5C}">
+        <p15:threadingInfo xmlns:p15="http://schemas.microsoft.com/office/powerpoint/2012/main" timeZoneBias="360"/>
+      </p:ext>
+    </p:extLst>
+  </p:cm>
+</p:cmLst>
+</file>
+
+<file path=ppt/comments/comment10.xml><?xml version="1.0" encoding="utf-8"?>
+<p:cmLst xmlns:a="http://schemas.openxmlformats.org/drawingml/2006/main" xmlns:r="http://schemas.openxmlformats.org/officeDocument/2006/relationships" xmlns:p="http://schemas.openxmlformats.org/presentationml/2006/main">
+  <p:cm authorId="10" dt="2015-11-28T22:20:12.652" idx="1">
+    <p:pos x="3456" y="2803"/>
+    <p:text>You mean the running total is only valid for 20 seconds? That could be quick to test.</p:text>
+    <p:extLst>
+      <p:ext uri="{C676402C-5697-4E1C-873F-D02D1690AC5C}">
+        <p15:threadingInfo xmlns:p15="http://schemas.microsoft.com/office/powerpoint/2012/main" timeZoneBias="360"/>
+      </p:ext>
+    </p:extLst>
+  </p:cm>
+</p:cmLst>
+</file>
+
+<file path=ppt/comments/comment11.xml><?xml version="1.0" encoding="utf-8"?>
+<p:cmLst xmlns:a="http://schemas.openxmlformats.org/drawingml/2006/main" xmlns:r="http://schemas.openxmlformats.org/officeDocument/2006/relationships" xmlns:p="http://schemas.openxmlformats.org/presentationml/2006/main">
+  <p:cm authorId="11" dt="2015-11-28T22:20:58.104" idx="1">
+    <p:pos x="10" y="10"/>
+    <p:text>Code missing</p:text>
+    <p:extLst>
+      <p:ext uri="{C676402C-5697-4E1C-873F-D02D1690AC5C}">
+        <p15:threadingInfo xmlns:p15="http://schemas.microsoft.com/office/powerpoint/2012/main" timeZoneBias="360"/>
+      </p:ext>
+    </p:extLst>
+  </p:cm>
+</p:cmLst>
+</file>
+
+<file path=ppt/comments/comment12.xml><?xml version="1.0" encoding="utf-8"?>
+<p:cmLst xmlns:a="http://schemas.openxmlformats.org/drawingml/2006/main" xmlns:r="http://schemas.openxmlformats.org/officeDocument/2006/relationships" xmlns:p="http://schemas.openxmlformats.org/presentationml/2006/main">
+  <p:cm authorId="12" dt="2015-11-28T22:24:07.803" idx="1">
+    <p:pos x="10" y="10"/>
+    <p:text>Buyers Remorse Exercise still TBD</p:text>
+    <p:extLst>
+      <p:ext uri="{C676402C-5697-4E1C-873F-D02D1690AC5C}">
+        <p15:threadingInfo xmlns:p15="http://schemas.microsoft.com/office/powerpoint/2012/main" timeZoneBias="360"/>
+      </p:ext>
+    </p:extLst>
+  </p:cm>
+</p:cmLst>
+</file>
+
+<file path=ppt/comments/comment2.xml><?xml version="1.0" encoding="utf-8"?>
+<p:cmLst xmlns:a="http://schemas.openxmlformats.org/drawingml/2006/main" xmlns:r="http://schemas.openxmlformats.org/officeDocument/2006/relationships" xmlns:p="http://schemas.openxmlformats.org/presentationml/2006/main">
+  <p:cm authorId="2" dt="2015-11-28T22:01:00.322" idx="1">
+    <p:pos x="4231" y="2629"/>
+    <p:text>Daniel bytearray timestamp trick?</p:text>
+    <p:extLst>
+      <p:ext uri="{C676402C-5697-4E1C-873F-D02D1690AC5C}">
+        <p15:threadingInfo xmlns:p15="http://schemas.microsoft.com/office/powerpoint/2012/main" timeZoneBias="360"/>
+      </p:ext>
+    </p:extLst>
+  </p:cm>
+</p:cmLst>
+</file>
+
+<file path=ppt/comments/comment3.xml><?xml version="1.0" encoding="utf-8"?>
+<p:cmLst xmlns:a="http://schemas.openxmlformats.org/drawingml/2006/main" xmlns:r="http://schemas.openxmlformats.org/officeDocument/2006/relationships" xmlns:p="http://schemas.openxmlformats.org/presentationml/2006/main">
+  <p:cm authorId="3" dt="2015-11-28T22:02:07.394" idx="1">
+    <p:pos x="3927" y="1917"/>
+    <p:text>This slide is about NHibernate. Why is it mentioning RavenDB? Should there be a RavenDB slide?</p:text>
+    <p:extLst>
+      <p:ext uri="{C676402C-5697-4E1C-873F-D02D1690AC5C}">
+        <p15:threadingInfo xmlns:p15="http://schemas.microsoft.com/office/powerpoint/2012/main" timeZoneBias="360"/>
+      </p:ext>
+    </p:extLst>
+  </p:cm>
+</p:cmLst>
+</file>
+
+<file path=ppt/comments/comment4.xml><?xml version="1.0" encoding="utf-8"?>
+<p:cmLst xmlns:a="http://schemas.openxmlformats.org/drawingml/2006/main" xmlns:r="http://schemas.openxmlformats.org/officeDocument/2006/relationships" xmlns:p="http://schemas.openxmlformats.org/presentationml/2006/main">
+  <p:cm authorId="4" dt="2015-11-28T22:02:37.166" idx="1">
+    <p:pos x="2786" y="1173"/>
+    <p:text>Storage mechanics diagram needed</p:text>
+    <p:extLst>
+      <p:ext uri="{C676402C-5697-4E1C-873F-D02D1690AC5C}">
+        <p15:threadingInfo xmlns:p15="http://schemas.microsoft.com/office/powerpoint/2012/main" timeZoneBias="360"/>
+      </p:ext>
+    </p:extLst>
+  </p:cm>
+</p:cmLst>
+</file>
+
+<file path=ppt/comments/comment5.xml><?xml version="1.0" encoding="utf-8"?>
+<p:cmLst xmlns:a="http://schemas.openxmlformats.org/drawingml/2006/main" xmlns:r="http://schemas.openxmlformats.org/officeDocument/2006/relationships" xmlns:p="http://schemas.openxmlformats.org/presentationml/2006/main">
+  <p:cm authorId="5" dt="2015-11-28T22:06:52.015" idx="1">
+    <p:pos x="3142" y="1382"/>
+    <p:text>between?</p:text>
+    <p:extLst>
+      <p:ext uri="{C676402C-5697-4E1C-873F-D02D1690AC5C}">
+        <p15:threadingInfo xmlns:p15="http://schemas.microsoft.com/office/powerpoint/2012/main" timeZoneBias="360"/>
+      </p:ext>
+    </p:extLst>
+  </p:cm>
+</p:cmLst>
+</file>
+
+<file path=ppt/comments/comment6.xml><?xml version="1.0" encoding="utf-8"?>
+<p:cmLst xmlns:a="http://schemas.openxmlformats.org/drawingml/2006/main" xmlns:r="http://schemas.openxmlformats.org/officeDocument/2006/relationships" xmlns:p="http://schemas.openxmlformats.org/presentationml/2006/main">
+  <p:cm authorId="6" dt="2015-11-28T22:08:07.600" idx="1">
+    <p:pos x="10" y="10"/>
+    <p:text>Yellow highlight for me is on "ing SomeS" and "ate.SomeS" ... Is this just because I'm using PowerPoint for Mac?</p:text>
+    <p:extLst>
+      <p:ext uri="{C676402C-5697-4E1C-873F-D02D1690AC5C}">
+        <p15:threadingInfo xmlns:p15="http://schemas.microsoft.com/office/powerpoint/2012/main" timeZoneBias="360"/>
+      </p:ext>
+    </p:extLst>
+  </p:cm>
+</p:cmLst>
+</file>
+
+<file path=ppt/comments/comment7.xml><?xml version="1.0" encoding="utf-8"?>
+<p:cmLst xmlns:a="http://schemas.openxmlformats.org/drawingml/2006/main" xmlns:r="http://schemas.openxmlformats.org/officeDocument/2006/relationships" xmlns:p="http://schemas.openxmlformats.org/presentationml/2006/main">
+  <p:cm authorId="7" dt="2015-11-28T22:11:22.325" idx="1">
+    <p:pos x="10" y="10"/>
+    <p:text>UPS gateway and UPS logo missing?</p:text>
+    <p:extLst>
+      <p:ext uri="{C676402C-5697-4E1C-873F-D02D1690AC5C}">
+        <p15:threadingInfo xmlns:p15="http://schemas.microsoft.com/office/powerpoint/2012/main" timeZoneBias="360"/>
+      </p:ext>
+    </p:extLst>
+  </p:cm>
+</p:cmLst>
+</file>
+
+<file path=ppt/comments/comment8.xml><?xml version="1.0" encoding="utf-8"?>
+<p:cmLst xmlns:a="http://schemas.openxmlformats.org/drawingml/2006/main" xmlns:r="http://schemas.openxmlformats.org/officeDocument/2006/relationships" xmlns:p="http://schemas.openxmlformats.org/presentationml/2006/main">
+  <p:cm authorId="8" dt="2015-11-28T22:12:58.581" idx="1">
+    <p:pos x="10" y="10"/>
+    <p:text>The text here looks like an absolute mess for me.</p:text>
+    <p:extLst>
+      <p:ext uri="{C676402C-5697-4E1C-873F-D02D1690AC5C}">
+        <p15:threadingInfo xmlns:p15="http://schemas.microsoft.com/office/powerpoint/2012/main" timeZoneBias="360"/>
+      </p:ext>
+    </p:extLst>
+  </p:cm>
+</p:cmLst>
+</file>
+
+<file path=ppt/comments/comment9.xml><?xml version="1.0" encoding="utf-8"?>
+<p:cmLst xmlns:a="http://schemas.openxmlformats.org/drawingml/2006/main" xmlns:r="http://schemas.openxmlformats.org/officeDocument/2006/relationships" xmlns:p="http://schemas.openxmlformats.org/presentationml/2006/main">
+  <p:cm authorId="9" dt="2015-11-28T22:14:10.089" idx="1">
+    <p:pos x="10" y="10"/>
+    <p:text>A bit lost on this slide. And notes in German?</p:text>
+    <p:extLst>
+      <p:ext uri="{C676402C-5697-4E1C-873F-D02D1690AC5C}">
+        <p15:threadingInfo xmlns:p15="http://schemas.microsoft.com/office/powerpoint/2012/main" timeZoneBias="360"/>
+      </p:ext>
+    </p:extLst>
+  </p:cm>
+</p:cmLst>
 </file>
 
 <file path=ppt/notesMasters/notesMaster1.xml><?xml version="1.0" encoding="utf-8"?>
@@ -17108,7 +17365,6 @@
               <a:rPr lang="en-GB" dirty="0" smtClean="0"/>
               <a:t>usually)</a:t>
             </a:r>
-            <a:endParaRPr lang="en-GB" dirty="0" smtClean="0"/>
           </a:p>
           <a:p>
             <a:r>
@@ -17480,11 +17736,7 @@
             </a:r>
             <a:r>
               <a:rPr lang="en-GB" dirty="0" smtClean="0"/>
-              <a:t> </a:t>
-            </a:r>
-            <a:r>
-              <a:rPr lang="en-GB" dirty="0" smtClean="0"/>
-              <a:t>Queue </a:t>
+              <a:t> Queue </a:t>
             </a:r>
             <a:r>
               <a:rPr lang="en-GB" dirty="0"/>
@@ -17757,6 +18009,13 @@
   <p:clrMapOvr>
     <a:masterClrMapping/>
   </p:clrMapOvr>
+  <p:timing>
+    <p:tnLst>
+      <p:par>
+        <p:cTn id="1" dur="indefinite" restart="never" nodeType="tmRoot"/>
+      </p:par>
+    </p:tnLst>
+  </p:timing>
 </p:sld>
 </file>
 
@@ -18214,7 +18473,15 @@
           <a:p>
             <a:r>
               <a:rPr lang="en-GB" dirty="0" smtClean="0"/>
-              <a:t>Dealing with non transactional resources</a:t>
+              <a:t>Dealing with </a:t>
+            </a:r>
+            <a:r>
+              <a:rPr lang="en-GB" dirty="0" smtClean="0"/>
+              <a:t>non-transactional </a:t>
+            </a:r>
+            <a:r>
+              <a:rPr lang="en-GB" dirty="0" smtClean="0"/>
+              <a:t>resources</a:t>
             </a:r>
             <a:endParaRPr lang="sv-SE" dirty="0"/>
           </a:p>
@@ -29845,6 +30112,13 @@
   <p:clrMapOvr>
     <a:masterClrMapping/>
   </p:clrMapOvr>
+  <p:timing>
+    <p:tnLst>
+      <p:par>
+        <p:cTn id="1" dur="indefinite" restart="never" nodeType="tmRoot"/>
+      </p:par>
+    </p:tnLst>
+  </p:timing>
 </p:sld>
 </file>
 
@@ -35453,6 +35727,14 @@
 <file path=ppt/slides/slide58.xml><?xml version="1.0" encoding="utf-8"?>
 <p:sld xmlns:a="http://schemas.openxmlformats.org/drawingml/2006/main" xmlns:r="http://schemas.openxmlformats.org/officeDocument/2006/relationships" xmlns:p="http://schemas.openxmlformats.org/presentationml/2006/main">
   <p:cSld>
+    <p:bg>
+      <p:bgPr>
+        <a:solidFill>
+          <a:schemeClr val="tx1"/>
+        </a:solidFill>
+        <a:effectLst/>
+      </p:bgPr>
+    </p:bg>
     <p:spTree>
       <p:nvGrpSpPr>
         <p:cNvPr id="1" name=""/>
@@ -36554,6 +36836,14 @@
 <file path=ppt/slides/slide59.xml><?xml version="1.0" encoding="utf-8"?>
 <p:sld xmlns:a="http://schemas.openxmlformats.org/drawingml/2006/main" xmlns:r="http://schemas.openxmlformats.org/officeDocument/2006/relationships" xmlns:p="http://schemas.openxmlformats.org/presentationml/2006/main">
   <p:cSld>
+    <p:bg>
+      <p:bgPr>
+        <a:solidFill>
+          <a:schemeClr val="tx1"/>
+        </a:solidFill>
+        <a:effectLst/>
+      </p:bgPr>
+    </p:bg>
     <p:spTree>
       <p:nvGrpSpPr>
         <p:cNvPr id="1" name=""/>
@@ -36904,6 +37194,14 @@
 <file path=ppt/slides/slide60.xml><?xml version="1.0" encoding="utf-8"?>
 <p:sld xmlns:a="http://schemas.openxmlformats.org/drawingml/2006/main" xmlns:r="http://schemas.openxmlformats.org/officeDocument/2006/relationships" xmlns:p="http://schemas.openxmlformats.org/presentationml/2006/main">
   <p:cSld>
+    <p:bg>
+      <p:bgPr>
+        <a:solidFill>
+          <a:schemeClr val="tx1"/>
+        </a:solidFill>
+        <a:effectLst/>
+      </p:bgPr>
+    </p:bg>
     <p:spTree>
       <p:nvGrpSpPr>
         <p:cNvPr id="1" name=""/>
@@ -37066,6 +37364,14 @@
 <file path=ppt/slides/slide61.xml><?xml version="1.0" encoding="utf-8"?>
 <p:sld xmlns:a="http://schemas.openxmlformats.org/drawingml/2006/main" xmlns:r="http://schemas.openxmlformats.org/officeDocument/2006/relationships" xmlns:p="http://schemas.openxmlformats.org/presentationml/2006/main">
   <p:cSld>
+    <p:bg>
+      <p:bgPr>
+        <a:solidFill>
+          <a:schemeClr val="tx1"/>
+        </a:solidFill>
+        <a:effectLst/>
+      </p:bgPr>
+    </p:bg>
     <p:spTree>
       <p:nvGrpSpPr>
         <p:cNvPr id="1" name=""/>
@@ -38431,7 +38737,15 @@
             <a:pPr lvl="1"/>
             <a:r>
               <a:rPr lang="en-GB" dirty="0" smtClean="0"/>
-              <a:t>Customers with a running total above 5000$ is considered preferred</a:t>
+              <a:t>Customers with a running total above </a:t>
+            </a:r>
+            <a:r>
+              <a:rPr lang="en-GB" dirty="0" smtClean="0"/>
+              <a:t>$5000 </a:t>
+            </a:r>
+            <a:r>
+              <a:rPr lang="en-GB" dirty="0" smtClean="0"/>
+              <a:t>is considered preferred</a:t>
             </a:r>
           </a:p>
           <a:p>
@@ -38445,13 +38759,8 @@
             </a:r>
             <a:r>
               <a:rPr lang="en-GB" dirty="0" smtClean="0"/>
-              <a:t> {amount}` in the shop application </a:t>
-            </a:r>
-            <a:r>
-              <a:rPr lang="en-GB" smtClean="0"/>
-              <a:t>to test</a:t>
-            </a:r>
-            <a:endParaRPr lang="en-GB" dirty="0" smtClean="0"/>
+              <a:t> {amount}` in the shop application to test</a:t>
+            </a:r>
           </a:p>
           <a:p>
             <a:endParaRPr lang="en-GB" dirty="0" smtClean="0"/>

</xml_diff>

<commit_message>
Few changes, removed resolved notes.
</commit_message>
<xml_diff>
--- a/SagaMasterClass.pptx
+++ b/SagaMasterClass.pptx
@@ -336,11 +336,7 @@
     <p:extLst/>
   </p:cmAuthor>
   <p:cmAuthor id="13" name="andreas.ohlund" initials="a" lastIdx="5" clrIdx="12">
-    <p:extLst>
-      <p:ext uri="{19B8F6BF-5375-455C-9EA6-DF929625EA0E}">
-        <p15:presenceInfo xmlns:p15="http://schemas.microsoft.com/office/powerpoint/2012/main" userId="andreas.ohlund" providerId="None"/>
-      </p:ext>
-    </p:extLst>
+    <p:extLst/>
   </p:cmAuthor>
 </p:cmAuthorLst>
 </file>
@@ -367,81 +363,6 @@
     <p:extLst>
       <p:ext uri="{C676402C-5697-4E1C-873F-D02D1690AC5C}">
         <p15:threadingInfo xmlns:p15="http://schemas.microsoft.com/office/powerpoint/2012/main" timeZoneBias="360"/>
-      </p:ext>
-    </p:extLst>
-  </p:cm>
-</p:cmLst>
-</file>
-
-<file path=ppt/comments/comment3.xml><?xml version="1.0" encoding="utf-8"?>
-<p:cmLst xmlns:a="http://schemas.openxmlformats.org/drawingml/2006/main" xmlns:r="http://schemas.openxmlformats.org/officeDocument/2006/relationships" xmlns:p="http://schemas.openxmlformats.org/presentationml/2006/main">
-  <p:cm authorId="10" dt="2015-11-28T22:20:12.652" idx="1">
-    <p:pos x="3456" y="2803"/>
-    <p:text>You mean the running total is only valid for 20 seconds? That could be quick to test.</p:text>
-    <p:extLst>
-      <p:ext uri="{C676402C-5697-4E1C-873F-D02D1690AC5C}">
-        <p15:threadingInfo xmlns:p15="http://schemas.microsoft.com/office/powerpoint/2012/main" timeZoneBias="360"/>
-      </p:ext>
-    </p:extLst>
-  </p:cm>
-  <p:cm authorId="13" dt="2015-11-30T10:08:36.430" idx="3">
-    <p:pos x="3456" y="2939"/>
-    <p:text>reworded</p:text>
-    <p:extLst>
-      <p:ext uri="{C676402C-5697-4E1C-873F-D02D1690AC5C}">
-        <p15:threadingInfo xmlns:p15="http://schemas.microsoft.com/office/powerpoint/2012/main" timeZoneBias="-60">
-          <p15:parentCm authorId="10" idx="1"/>
-        </p15:threadingInfo>
-      </p:ext>
-    </p:extLst>
-  </p:cm>
-</p:cmLst>
-</file>
-
-<file path=ppt/comments/comment4.xml><?xml version="1.0" encoding="utf-8"?>
-<p:cmLst xmlns:a="http://schemas.openxmlformats.org/drawingml/2006/main" xmlns:r="http://schemas.openxmlformats.org/officeDocument/2006/relationships" xmlns:p="http://schemas.openxmlformats.org/presentationml/2006/main">
-  <p:cm authorId="11" dt="2015-11-28T22:20:58.104" idx="1">
-    <p:pos x="10" y="10"/>
-    <p:text>Code missing</p:text>
-    <p:extLst>
-      <p:ext uri="{C676402C-5697-4E1C-873F-D02D1690AC5C}">
-        <p15:threadingInfo xmlns:p15="http://schemas.microsoft.com/office/powerpoint/2012/main" timeZoneBias="360"/>
-      </p:ext>
-    </p:extLst>
-  </p:cm>
-  <p:cm authorId="13" dt="2015-11-30T10:13:54.682" idx="4">
-    <p:pos x="10" y="146"/>
-    <p:text>Code added</p:text>
-    <p:extLst>
-      <p:ext uri="{C676402C-5697-4E1C-873F-D02D1690AC5C}">
-        <p15:threadingInfo xmlns:p15="http://schemas.microsoft.com/office/powerpoint/2012/main" timeZoneBias="-60">
-          <p15:parentCm authorId="11" idx="1"/>
-        </p15:threadingInfo>
-      </p:ext>
-    </p:extLst>
-  </p:cm>
-</p:cmLst>
-</file>
-
-<file path=ppt/comments/comment5.xml><?xml version="1.0" encoding="utf-8"?>
-<p:cmLst xmlns:a="http://schemas.openxmlformats.org/drawingml/2006/main" xmlns:r="http://schemas.openxmlformats.org/officeDocument/2006/relationships" xmlns:p="http://schemas.openxmlformats.org/presentationml/2006/main">
-  <p:cm authorId="12" dt="2015-11-28T22:24:07.803" idx="1">
-    <p:pos x="10" y="10"/>
-    <p:text>Buyers Remorse Exercise still TBD</p:text>
-    <p:extLst>
-      <p:ext uri="{C676402C-5697-4E1C-873F-D02D1690AC5C}">
-        <p15:threadingInfo xmlns:p15="http://schemas.microsoft.com/office/powerpoint/2012/main" timeZoneBias="360"/>
-      </p:ext>
-    </p:extLst>
-  </p:cm>
-  <p:cm authorId="13" dt="2015-11-30T10:16:00.231" idx="5">
-    <p:pos x="10" y="146"/>
-    <p:text>Added instructions, no code yet. Not sure we need it</p:text>
-    <p:extLst>
-      <p:ext uri="{C676402C-5697-4E1C-873F-D02D1690AC5C}">
-        <p15:threadingInfo xmlns:p15="http://schemas.microsoft.com/office/powerpoint/2012/main" timeZoneBias="-60">
-          <p15:parentCm authorId="12" idx="1"/>
-        </p15:threadingInfo>
       </p:ext>
     </p:extLst>
   </p:cm>
@@ -17472,17 +17393,8 @@
             <a:pPr lvl="1"/>
             <a:r>
               <a:rPr lang="en-GB" dirty="0" smtClean="0"/>
-              <a:t>Consider </a:t>
-            </a:r>
-            <a:r>
-              <a:rPr lang="en-GB" dirty="0" smtClean="0"/>
-              <a:t>using a row version property to avoid the above </a:t>
-            </a:r>
-            <a:r>
-              <a:rPr lang="en-GB" dirty="0" smtClean="0"/>
-              <a:t>issues</a:t>
-            </a:r>
-            <a:endParaRPr lang="en-GB" dirty="0" smtClean="0"/>
+              <a:t>Consider using a row version property to avoid the above issues</a:t>
+            </a:r>
           </a:p>
           <a:p>
             <a:pPr marL="914400" lvl="2" indent="0">
@@ -17512,11 +17424,7 @@
             </a:r>
             <a:r>
               <a:rPr lang="en-GB" dirty="0" smtClean="0"/>
-              <a:t> Version{ get; set; </a:t>
-            </a:r>
-            <a:r>
-              <a:rPr lang="en-GB" dirty="0" smtClean="0"/>
-              <a:t>} </a:t>
+              <a:t> Version{ get; set; } </a:t>
             </a:r>
           </a:p>
           <a:p>
@@ -37137,11 +37045,11 @@
   <p:clrMapOvr>
     <a:masterClrMapping/>
   </p:clrMapOvr>
-  <mc:AlternateContent xmlns:mc="http://schemas.openxmlformats.org/markup-compatibility/2006" xmlns:p14="http://schemas.microsoft.com/office/powerpoint/2010/main">
-    <mc:Choice Requires="p14">
+  <mc:AlternateContent xmlns:mc="http://schemas.openxmlformats.org/markup-compatibility/2006">
+    <mc:Choice xmlns:p14="http://schemas.microsoft.com/office/powerpoint/2010/main" Requires="p14">
       <p:transition spd="slow" p14:dur="2000"/>
     </mc:Choice>
-    <mc:Fallback xmlns="">
+    <mc:Fallback>
       <p:transition spd="slow"/>
     </mc:Fallback>
   </mc:AlternateContent>
@@ -37315,11 +37223,11 @@
   <p:clrMapOvr>
     <a:masterClrMapping/>
   </p:clrMapOvr>
-  <mc:AlternateContent xmlns:mc="http://schemas.openxmlformats.org/markup-compatibility/2006" xmlns:p14="http://schemas.microsoft.com/office/powerpoint/2010/main">
-    <mc:Choice Requires="p14">
+  <mc:AlternateContent xmlns:mc="http://schemas.openxmlformats.org/markup-compatibility/2006">
+    <mc:Choice xmlns:p14="http://schemas.microsoft.com/office/powerpoint/2010/main" Requires="p14">
       <p:transition spd="slow" p14:dur="2000"/>
     </mc:Choice>
-    <mc:Fallback xmlns="">
+    <mc:Fallback>
       <p:transition spd="slow"/>
     </mc:Fallback>
   </mc:AlternateContent>
@@ -37682,11 +37590,11 @@
   <p:clrMapOvr>
     <a:masterClrMapping/>
   </p:clrMapOvr>
-  <mc:AlternateContent xmlns:mc="http://schemas.openxmlformats.org/markup-compatibility/2006" xmlns:p14="http://schemas.microsoft.com/office/powerpoint/2010/main">
-    <mc:Choice Requires="p14">
+  <mc:AlternateContent xmlns:mc="http://schemas.openxmlformats.org/markup-compatibility/2006">
+    <mc:Choice xmlns:p14="http://schemas.microsoft.com/office/powerpoint/2010/main" Requires="p14">
       <p:transition spd="slow" p14:dur="2000"/>
     </mc:Choice>
-    <mc:Fallback xmlns="">
+    <mc:Fallback>
       <p:transition spd="slow"/>
     </mc:Fallback>
   </mc:AlternateContent>
@@ -37854,11 +37762,11 @@
   <p:clrMapOvr>
     <a:masterClrMapping/>
   </p:clrMapOvr>
-  <mc:AlternateContent xmlns:mc="http://schemas.openxmlformats.org/markup-compatibility/2006" xmlns:p14="http://schemas.microsoft.com/office/powerpoint/2010/main">
-    <mc:Choice Requires="p14">
+  <mc:AlternateContent xmlns:mc="http://schemas.openxmlformats.org/markup-compatibility/2006">
+    <mc:Choice xmlns:p14="http://schemas.microsoft.com/office/powerpoint/2010/main" Requires="p14">
       <p:transition spd="slow" p14:dur="2000"/>
     </mc:Choice>
-    <mc:Fallback xmlns="">
+    <mc:Fallback>
       <p:transition spd="slow"/>
     </mc:Fallback>
   </mc:AlternateContent>
@@ -41314,21 +41222,28 @@
               <a:t>	WHERE </a:t>
             </a:r>
             <a:r>
+              <a:rPr lang="sv-SE" dirty="0" err="1">
+                <a:latin typeface="Consolas" panose="020B0609020204030204" pitchFamily="49" charset="0"/>
+                <a:cs typeface="Consolas" panose="020B0609020204030204" pitchFamily="49" charset="0"/>
+              </a:rPr>
+              <a:t>parsed.StringValue</a:t>
+            </a:r>
+            <a:r>
               <a:rPr lang="sv-SE" dirty="0">
                 <a:latin typeface="Consolas" panose="020B0609020204030204" pitchFamily="49" charset="0"/>
                 <a:cs typeface="Consolas" panose="020B0609020204030204" pitchFamily="49" charset="0"/>
               </a:rPr>
-              <a:t>parsed.StringValue </a:t>
+              <a:t> </a:t>
             </a:r>
             <a:r>
               <a:rPr lang="sv-SE" dirty="0" smtClean="0">
                 <a:latin typeface="Consolas" panose="020B0609020204030204" pitchFamily="49" charset="0"/>
                 <a:cs typeface="Consolas" panose="020B0609020204030204" pitchFamily="49" charset="0"/>
               </a:rPr>
-              <a:t>LIKE’%</a:t>
-            </a:r>
-            <a:r>
-              <a:rPr lang="sv-SE" b="1" dirty="0" smtClean="0">
+              <a:t>LIKE '%</a:t>
+            </a:r>
+            <a:r>
+              <a:rPr lang="sv-SE" b="1" dirty="0" err="1" smtClean="0">
                 <a:latin typeface="Consolas" panose="020B0609020204030204" pitchFamily="49" charset="0"/>
                 <a:cs typeface="Consolas" panose="020B0609020204030204" pitchFamily="49" charset="0"/>
               </a:rPr>
@@ -44910,24 +44825,37 @@
           <a:p>
             <a:r>
               <a:rPr lang="en-GB" dirty="0" smtClean="0"/>
-              <a:t>Emit a `</a:t>
-            </a:r>
-            <a:r>
-              <a:rPr lang="en-GB" dirty="0" err="1" smtClean="0"/>
+              <a:t>Emit a </a:t>
+            </a:r>
+            <a:r>
+              <a:rPr lang="en-GB" dirty="0" err="1" smtClean="0">
+                <a:latin typeface="Consolas" charset="0"/>
+                <a:ea typeface="Consolas" charset="0"/>
+                <a:cs typeface="Consolas" charset="0"/>
+              </a:rPr>
               <a:t>OrderAccepted</a:t>
             </a:r>
             <a:r>
               <a:rPr lang="en-GB" dirty="0" smtClean="0"/>
-              <a:t>` event in addition to `</a:t>
-            </a:r>
-            <a:r>
-              <a:rPr lang="en-GB" dirty="0" err="1" smtClean="0"/>
+              <a:t> </a:t>
+            </a:r>
+            <a:r>
+              <a:rPr lang="en-GB" dirty="0" smtClean="0"/>
+              <a:t>event in addition to </a:t>
+            </a:r>
+            <a:r>
+              <a:rPr lang="en-GB" dirty="0" err="1" smtClean="0">
+                <a:latin typeface="Consolas" charset="0"/>
+                <a:ea typeface="Consolas" charset="0"/>
+                <a:cs typeface="Consolas" charset="0"/>
+              </a:rPr>
               <a:t>OrderPlaced</a:t>
             </a:r>
-            <a:r>
-              <a:rPr lang="en-GB" dirty="0" smtClean="0"/>
-              <a:t>`</a:t>
-            </a:r>
+            <a:endParaRPr lang="en-GB" dirty="0" smtClean="0">
+              <a:latin typeface="Consolas" charset="0"/>
+              <a:ea typeface="Consolas" charset="0"/>
+              <a:cs typeface="Consolas" charset="0"/>
+            </a:endParaRPr>
           </a:p>
           <a:p>
             <a:r>

</xml_diff>

<commit_message>
Added log to the first slide
</commit_message>
<xml_diff>
--- a/SagaMasterClass.pptx
+++ b/SagaMasterClass.pptx
@@ -841,8 +841,46 @@
           <a:p>
             <a:r>
               <a:rPr lang="sv-SE" dirty="0" smtClean="0"/>
-              <a:t>ActiveMq: Uses it’s own SLR mechanism</a:t>
-            </a:r>
+              <a:t>ActiveMq: Uses it’s own SLR </a:t>
+            </a:r>
+            <a:r>
+              <a:rPr lang="sv-SE" dirty="0" smtClean="0"/>
+              <a:t>mechanism</a:t>
+            </a:r>
+          </a:p>
+          <a:p>
+            <a:endParaRPr lang="en-GB" dirty="0" smtClean="0"/>
+          </a:p>
+          <a:p>
+            <a:r>
+              <a:rPr lang="en-GB" dirty="0" smtClean="0"/>
+              <a:t>Ask the users if they would like to go back and reconsider</a:t>
+            </a:r>
+            <a:r>
+              <a:rPr lang="en-GB" baseline="0" dirty="0" smtClean="0"/>
+              <a:t> what messages should really start a saga? (</a:t>
+            </a:r>
+            <a:r>
+              <a:rPr lang="en-GB" baseline="0" dirty="0" err="1" smtClean="0"/>
+              <a:t>eg</a:t>
+            </a:r>
+            <a:r>
+              <a:rPr lang="en-GB" baseline="0" dirty="0" smtClean="0"/>
+              <a:t>. </a:t>
+            </a:r>
+            <a:r>
+              <a:rPr lang="en-GB" baseline="0" dirty="0" err="1" smtClean="0"/>
+              <a:t>Startorder</a:t>
+            </a:r>
+            <a:r>
+              <a:rPr lang="en-GB" baseline="0" dirty="0" smtClean="0"/>
+              <a:t> could be in the error queue while place </a:t>
+            </a:r>
+            <a:r>
+              <a:rPr lang="en-GB" baseline="0" smtClean="0"/>
+              <a:t>order arrives)</a:t>
+            </a:r>
+            <a:endParaRPr lang="sv-SE" dirty="0" smtClean="0"/>
           </a:p>
           <a:p>
             <a:endParaRPr lang="sv-SE" dirty="0" smtClean="0"/>
@@ -935,31 +973,14 @@
           <a:p>
             <a:r>
               <a:rPr lang="en-GB" dirty="0" smtClean="0"/>
-              <a:t>You are exposed to concurrency when</a:t>
+              <a:t>We’re on</a:t>
             </a:r>
             <a:r>
               <a:rPr lang="en-GB" baseline="0" dirty="0" smtClean="0"/>
-              <a:t> </a:t>
-            </a:r>
-            <a:r>
-              <a:rPr lang="en-GB" dirty="0" smtClean="0"/>
-              <a:t>concurrency SETTINGS &gt;1 </a:t>
-            </a:r>
-          </a:p>
-          <a:p>
-            <a:endParaRPr lang="en-GB" dirty="0" smtClean="0"/>
-          </a:p>
-          <a:p>
-            <a:r>
-              <a:rPr lang="en-GB" dirty="0" smtClean="0"/>
-              <a:t>will the default in v6</a:t>
-            </a:r>
-          </a:p>
-          <a:p>
-            <a:pPr marL="0" indent="0">
-              <a:buFont typeface="Arial" panose="020B0604020202020204" pitchFamily="34" charset="0"/>
-              <a:buNone/>
-            </a:pPr>
+              <a:t> a transport + storage combo that supports MSDTC</a:t>
+            </a:r>
+          </a:p>
+          <a:p>
             <a:endParaRPr lang="sv-SE" dirty="0"/>
           </a:p>
         </p:txBody>
@@ -981,7 +1002,7 @@
           <a:p>
             <a:fld id="{D5BB19A3-B3B6-4398-9889-160C3A008821}" type="slidenum">
               <a:rPr lang="sv-SE" smtClean="0"/>
-              <a:t>24</a:t>
+              <a:t>23</a:t>
             </a:fld>
             <a:endParaRPr lang="sv-SE"/>
           </a:p>
@@ -990,7 +1011,7 @@
     </p:spTree>
     <p:extLst>
       <p:ext uri="{BB962C8B-B14F-4D97-AF65-F5344CB8AC3E}">
-        <p14:creationId xmlns:p14="http://schemas.microsoft.com/office/powerpoint/2010/main" val="3550659935"/>
+        <p14:creationId xmlns:p14="http://schemas.microsoft.com/office/powerpoint/2010/main" val="3588285247"/>
       </p:ext>
     </p:extLst>
   </p:cSld>
@@ -1046,12 +1067,31 @@
           <a:p>
             <a:r>
               <a:rPr lang="en-GB" dirty="0" smtClean="0"/>
-              <a:t>This is the exercise</a:t>
+              <a:t>You are exposed to concurrency when</a:t>
             </a:r>
             <a:r>
               <a:rPr lang="en-GB" baseline="0" dirty="0" smtClean="0"/>
-              <a:t> they just coded</a:t>
-            </a:r>
+              <a:t> </a:t>
+            </a:r>
+            <a:r>
+              <a:rPr lang="en-GB" dirty="0" smtClean="0"/>
+              <a:t>concurrency SETTINGS &gt;1 </a:t>
+            </a:r>
+          </a:p>
+          <a:p>
+            <a:endParaRPr lang="en-GB" dirty="0" smtClean="0"/>
+          </a:p>
+          <a:p>
+            <a:r>
+              <a:rPr lang="en-GB" dirty="0" smtClean="0"/>
+              <a:t>will the default in v6</a:t>
+            </a:r>
+          </a:p>
+          <a:p>
+            <a:pPr marL="0" indent="0">
+              <a:buFont typeface="Arial" panose="020B0604020202020204" pitchFamily="34" charset="0"/>
+              <a:buNone/>
+            </a:pPr>
             <a:endParaRPr lang="sv-SE" dirty="0"/>
           </a:p>
         </p:txBody>
@@ -1073,7 +1113,7 @@
           <a:p>
             <a:fld id="{D5BB19A3-B3B6-4398-9889-160C3A008821}" type="slidenum">
               <a:rPr lang="sv-SE" smtClean="0"/>
-              <a:t>25</a:t>
+              <a:t>24</a:t>
             </a:fld>
             <a:endParaRPr lang="sv-SE"/>
           </a:p>
@@ -1082,7 +1122,7 @@
     </p:spTree>
     <p:extLst>
       <p:ext uri="{BB962C8B-B14F-4D97-AF65-F5344CB8AC3E}">
-        <p14:creationId xmlns:p14="http://schemas.microsoft.com/office/powerpoint/2010/main" val="3704050602"/>
+        <p14:creationId xmlns:p14="http://schemas.microsoft.com/office/powerpoint/2010/main" val="3550659935"/>
       </p:ext>
     </p:extLst>
   </p:cSld>
@@ -1136,244 +1176,14 @@
           <a:bodyPr/>
           <a:lstStyle/>
           <a:p>
-            <a:pPr marL="0" marR="0" indent="0" algn="l" defTabSz="914400" rtl="0" eaLnBrk="1" fontAlgn="auto" latinLnBrk="0" hangingPunct="1">
-              <a:lnSpc>
-                <a:spcPct val="100000"/>
-              </a:lnSpc>
-              <a:spcBef>
-                <a:spcPts val="0"/>
-              </a:spcBef>
-              <a:spcAft>
-                <a:spcPts val="0"/>
-              </a:spcAft>
-              <a:buClrTx/>
-              <a:buSzTx/>
-              <a:buFontTx/>
-              <a:buNone/>
-              <a:tabLst/>
-              <a:defRPr/>
-            </a:pPr>
-            <a:r>
-              <a:rPr lang="en-US" dirty="0" smtClean="0"/>
-              <a:t>exec </a:t>
-            </a:r>
-            <a:r>
-              <a:rPr lang="en-US" dirty="0" err="1" smtClean="0"/>
-              <a:t>sp_executesql</a:t>
-            </a:r>
-            <a:r>
-              <a:rPr lang="en-US" dirty="0" smtClean="0"/>
-              <a:t> N'UPDATE </a:t>
-            </a:r>
-            <a:r>
-              <a:rPr lang="en-US" dirty="0" err="1" smtClean="0"/>
-              <a:t>ShippingPolicy</a:t>
-            </a:r>
-            <a:r>
-              <a:rPr lang="en-US" dirty="0" smtClean="0"/>
-              <a:t> SET Billed = @p0 </a:t>
-            </a:r>
-            <a:r>
-              <a:rPr lang="en-US" sz="1600" dirty="0" smtClean="0"/>
-              <a:t>WHERE</a:t>
-            </a:r>
-            <a:r>
-              <a:rPr lang="en-US" dirty="0" smtClean="0"/>
-              <a:t> Id = @p1 AND Originator = @p2 AND </a:t>
-            </a:r>
-            <a:r>
-              <a:rPr lang="en-US" dirty="0" err="1" smtClean="0"/>
-              <a:t>OriginalMessageId</a:t>
-            </a:r>
-            <a:r>
-              <a:rPr lang="en-US" dirty="0" smtClean="0"/>
-              <a:t> = @p3 AND </a:t>
-            </a:r>
-            <a:r>
-              <a:rPr lang="en-US" dirty="0" err="1" smtClean="0"/>
-              <a:t>OrderId</a:t>
-            </a:r>
-            <a:r>
-              <a:rPr lang="en-US" dirty="0" smtClean="0"/>
-              <a:t> = @p4 AND Placed = @p5 AND Billed = @p6',N'@p0 bit,@p1 uniqueidentifier,@p2 </a:t>
-            </a:r>
-            <a:r>
-              <a:rPr lang="en-US" dirty="0" err="1" smtClean="0"/>
-              <a:t>nvarchar</a:t>
-            </a:r>
-            <a:r>
-              <a:rPr lang="en-US" dirty="0" smtClean="0"/>
-              <a:t>(4000),@p3 </a:t>
-            </a:r>
-            <a:r>
-              <a:rPr lang="en-US" dirty="0" err="1" smtClean="0"/>
-              <a:t>nvarchar</a:t>
-            </a:r>
-            <a:r>
-              <a:rPr lang="en-US" dirty="0" smtClean="0"/>
-              <a:t>(4000),@p4 </a:t>
-            </a:r>
-            <a:r>
-              <a:rPr lang="en-US" dirty="0" err="1" smtClean="0"/>
-              <a:t>nvarchar</a:t>
-            </a:r>
-            <a:r>
-              <a:rPr lang="en-US" dirty="0" smtClean="0"/>
-              <a:t>(4000),@p5 bit,@p6 bit',@p0=1,@p1='870D112B-44D1-4206-A4DB-A55B015DA80A',@p2=N'Sales@ANDREAS2015',@p3=N'baf9b6bb-a0da-41b9-8a81-a55b015d7a05',@p4=N'a23a2438-3af6-4c0a-a108-7f8e72d12083',@p5=1,@p6=0</a:t>
-            </a:r>
-          </a:p>
-          <a:p>
-            <a:pPr marL="0" marR="0" indent="0" algn="l" defTabSz="914400" rtl="0" eaLnBrk="1" fontAlgn="auto" latinLnBrk="0" hangingPunct="1">
-              <a:lnSpc>
-                <a:spcPct val="100000"/>
-              </a:lnSpc>
-              <a:spcBef>
-                <a:spcPts val="0"/>
-              </a:spcBef>
-              <a:spcAft>
-                <a:spcPts val="0"/>
-              </a:spcAft>
-              <a:buClrTx/>
-              <a:buSzTx/>
-              <a:buFontTx/>
-              <a:buNone/>
-              <a:tabLst/>
-              <a:defRPr/>
-            </a:pPr>
-            <a:endParaRPr lang="en-US" dirty="0" smtClean="0"/>
-          </a:p>
-          <a:p>
-            <a:pPr marL="0" marR="0" indent="0" algn="l" defTabSz="914400" rtl="0" eaLnBrk="1" fontAlgn="auto" latinLnBrk="0" hangingPunct="1">
-              <a:lnSpc>
-                <a:spcPct val="100000"/>
-              </a:lnSpc>
-              <a:spcBef>
-                <a:spcPts val="0"/>
-              </a:spcBef>
-              <a:spcAft>
-                <a:spcPts val="0"/>
-              </a:spcAft>
-              <a:buClrTx/>
-              <a:buSzTx/>
-              <a:buFontTx/>
-              <a:buNone/>
-              <a:tabLst/>
-              <a:defRPr/>
-            </a:pPr>
-            <a:r>
-              <a:rPr lang="en-US" dirty="0" smtClean="0"/>
-              <a:t>After </a:t>
-            </a:r>
-            <a:r>
-              <a:rPr lang="en-US" dirty="0" err="1" smtClean="0"/>
-              <a:t>rowversion</a:t>
-            </a:r>
-            <a:r>
-              <a:rPr lang="en-US" dirty="0" smtClean="0"/>
-              <a:t> trick:</a:t>
-            </a:r>
-          </a:p>
-          <a:p>
-            <a:pPr marL="0" marR="0" indent="0" algn="l" defTabSz="914400" rtl="0" eaLnBrk="1" fontAlgn="auto" latinLnBrk="0" hangingPunct="1">
-              <a:lnSpc>
-                <a:spcPct val="100000"/>
-              </a:lnSpc>
-              <a:spcBef>
-                <a:spcPts val="0"/>
-              </a:spcBef>
-              <a:spcAft>
-                <a:spcPts val="0"/>
-              </a:spcAft>
-              <a:buClrTx/>
-              <a:buSzTx/>
-              <a:buFontTx/>
-              <a:buNone/>
-              <a:tabLst/>
-              <a:defRPr/>
-            </a:pPr>
-            <a:endParaRPr lang="en-US" dirty="0" smtClean="0"/>
-          </a:p>
-          <a:p>
-            <a:pPr marL="0" marR="0" indent="0" algn="l" defTabSz="914400" rtl="0" eaLnBrk="1" fontAlgn="auto" latinLnBrk="0" hangingPunct="1">
-              <a:lnSpc>
-                <a:spcPct val="100000"/>
-              </a:lnSpc>
-              <a:spcBef>
-                <a:spcPts val="0"/>
-              </a:spcBef>
-              <a:spcAft>
-                <a:spcPts val="0"/>
-              </a:spcAft>
-              <a:buClrTx/>
-              <a:buSzTx/>
-              <a:buFontTx/>
-              <a:buNone/>
-              <a:tabLst/>
-              <a:defRPr/>
-            </a:pPr>
-            <a:r>
-              <a:rPr lang="en-US" dirty="0" smtClean="0"/>
-              <a:t>exec </a:t>
-            </a:r>
-            <a:r>
-              <a:rPr lang="en-US" dirty="0" err="1" smtClean="0"/>
-              <a:t>sp_executesql</a:t>
-            </a:r>
-            <a:r>
-              <a:rPr lang="en-US" dirty="0" smtClean="0"/>
-              <a:t> N'UPDATE </a:t>
-            </a:r>
-            <a:r>
-              <a:rPr lang="en-US" dirty="0" err="1" smtClean="0"/>
-              <a:t>ShippingPolicy</a:t>
-            </a:r>
-            <a:r>
-              <a:rPr lang="en-US" dirty="0" smtClean="0"/>
-              <a:t> SET Version = @p0, </a:t>
-            </a:r>
-            <a:r>
-              <a:rPr lang="en-US" dirty="0" err="1" smtClean="0"/>
-              <a:t>OrderId</a:t>
-            </a:r>
-            <a:r>
-              <a:rPr lang="en-US" dirty="0" smtClean="0"/>
-              <a:t> = @p1, Placed = @p2, Billed = @p3, Originator = @p4, </a:t>
-            </a:r>
-            <a:r>
-              <a:rPr lang="en-US" dirty="0" err="1" smtClean="0"/>
-              <a:t>OriginalMessageId</a:t>
-            </a:r>
-            <a:r>
-              <a:rPr lang="en-US" dirty="0" smtClean="0"/>
-              <a:t> = @p5 WHERE Id = @p6 AND Version = @p7',N'@p0 int,@p1 </a:t>
-            </a:r>
-            <a:r>
-              <a:rPr lang="en-US" dirty="0" err="1" smtClean="0"/>
-              <a:t>nvarchar</a:t>
-            </a:r>
-            <a:r>
-              <a:rPr lang="en-US" dirty="0" smtClean="0"/>
-              <a:t>(4000),@p2 bit,@p3 bit,@p4 </a:t>
-            </a:r>
-            <a:r>
-              <a:rPr lang="en-US" dirty="0" err="1" smtClean="0"/>
-              <a:t>nvarchar</a:t>
-            </a:r>
-            <a:r>
-              <a:rPr lang="en-US" dirty="0" smtClean="0"/>
-              <a:t>(4000),@p5 </a:t>
-            </a:r>
-            <a:r>
-              <a:rPr lang="en-US" dirty="0" err="1" smtClean="0"/>
-              <a:t>nvarchar</a:t>
-            </a:r>
-            <a:r>
-              <a:rPr lang="en-US" dirty="0" smtClean="0"/>
-              <a:t>(4000),@p6 uniqueidentifier,@p7 int',@p0=2,@p1=N'86427be3-59a5-453d-9c75-aab2a4b466be',@p2=1,@p3=1,@p4=N'Sales@ANDREAS2015',@p5=N'b5e51adb-9d18-40b9-bcea-a55c01356c38',@p6='3FAD8522-46EE-4C0E-B18D-A55C01356DA4',@p7=1</a:t>
-            </a:r>
-            <a:endParaRPr lang="en-GB" dirty="0" smtClean="0"/>
-          </a:p>
-          <a:p>
+            <a:r>
+              <a:rPr lang="en-GB" dirty="0" smtClean="0"/>
+              <a:t>This is the exercise</a:t>
+            </a:r>
+            <a:r>
+              <a:rPr lang="en-GB" baseline="0" dirty="0" smtClean="0"/>
+              <a:t> they just coded</a:t>
+            </a:r>
             <a:endParaRPr lang="sv-SE" dirty="0"/>
           </a:p>
         </p:txBody>
@@ -1395,7 +1205,7 @@
           <a:p>
             <a:fld id="{D5BB19A3-B3B6-4398-9889-160C3A008821}" type="slidenum">
               <a:rPr lang="sv-SE" smtClean="0"/>
-              <a:t>26</a:t>
+              <a:t>25</a:t>
             </a:fld>
             <a:endParaRPr lang="sv-SE"/>
           </a:p>
@@ -1404,7 +1214,7 @@
     </p:spTree>
     <p:extLst>
       <p:ext uri="{BB962C8B-B14F-4D97-AF65-F5344CB8AC3E}">
-        <p14:creationId xmlns:p14="http://schemas.microsoft.com/office/powerpoint/2010/main" val="3287629598"/>
+        <p14:creationId xmlns:p14="http://schemas.microsoft.com/office/powerpoint/2010/main" val="3704050602"/>
       </p:ext>
     </p:extLst>
   </p:cSld>
@@ -1485,23 +1295,23 @@
             </a:r>
             <a:r>
               <a:rPr lang="en-US" dirty="0" smtClean="0"/>
-              <a:t> N'SELECT </a:t>
+              <a:t> N'UPDATE </a:t>
             </a:r>
             <a:r>
               <a:rPr lang="en-US" dirty="0" err="1" smtClean="0"/>
-              <a:t>this_.Id</a:t>
+              <a:t>ShippingPolicy</a:t>
             </a:r>
             <a:r>
               <a:rPr lang="en-US" dirty="0" smtClean="0"/>
-              <a:t> as Id0_0_, </a:t>
-            </a:r>
-            <a:r>
-              <a:rPr lang="en-US" dirty="0" err="1" smtClean="0"/>
-              <a:t>this_.Originator</a:t>
+              <a:t> SET Billed = @p0 </a:t>
+            </a:r>
+            <a:r>
+              <a:rPr lang="en-US" sz="1600" dirty="0" smtClean="0"/>
+              <a:t>WHERE</a:t>
             </a:r>
             <a:r>
               <a:rPr lang="en-US" dirty="0" smtClean="0"/>
-              <a:t> as Originator0_0_, this_.</a:t>
+              <a:t> Id = @p1 AND Originator = @p2 AND </a:t>
             </a:r>
             <a:r>
               <a:rPr lang="en-US" dirty="0" err="1" smtClean="0"/>
@@ -1509,7 +1319,7 @@
             </a:r>
             <a:r>
               <a:rPr lang="en-US" dirty="0" smtClean="0"/>
-              <a:t> as Original3_0_0_, this_.</a:t>
+              <a:t> = @p3 AND </a:t>
             </a:r>
             <a:r>
               <a:rPr lang="en-US" dirty="0" err="1" smtClean="0"/>
@@ -1517,39 +1327,141 @@
             </a:r>
             <a:r>
               <a:rPr lang="en-US" dirty="0" smtClean="0"/>
-              <a:t> as OrderId1_0_, this_.</a:t>
+              <a:t> = @p4 AND Placed = @p5 AND Billed = @p6',N'@p0 bit,@p1 uniqueidentifier,@p2 </a:t>
             </a:r>
             <a:r>
               <a:rPr lang="en-US" dirty="0" err="1" smtClean="0"/>
-              <a:t>SentToFedex</a:t>
+              <a:t>nvarchar</a:t>
             </a:r>
             <a:r>
               <a:rPr lang="en-US" dirty="0" smtClean="0"/>
-              <a:t> as SentToFe2_1_0_ FROM </a:t>
+              <a:t>(4000),@p3 </a:t>
             </a:r>
             <a:r>
               <a:rPr lang="en-US" dirty="0" err="1" smtClean="0"/>
-              <a:t>ShipOrderPolicy</a:t>
+              <a:t>nvarchar</a:t>
             </a:r>
             <a:r>
               <a:rPr lang="en-US" dirty="0" smtClean="0"/>
-              <a:t> this_ </a:t>
-            </a:r>
-            <a:r>
-              <a:rPr lang="en-US" sz="3600" dirty="0" smtClean="0"/>
-              <a:t>with (</a:t>
-            </a:r>
-            <a:r>
-              <a:rPr lang="en-US" sz="3600" dirty="0" err="1" smtClean="0"/>
-              <a:t>updlock</a:t>
-            </a:r>
-            <a:r>
-              <a:rPr lang="en-US" sz="3600" dirty="0" smtClean="0"/>
-              <a:t>, rowlock) </a:t>
+              <a:t>(4000),@p4 </a:t>
+            </a:r>
+            <a:r>
+              <a:rPr lang="en-US" dirty="0" err="1" smtClean="0"/>
+              <a:t>nvarchar</a:t>
             </a:r>
             <a:r>
               <a:rPr lang="en-US" dirty="0" smtClean="0"/>
-              <a:t>WHERE this_.</a:t>
+              <a:t>(4000),@p5 bit,@p6 bit',@p0=1,@p1='870D112B-44D1-4206-A4DB-A55B015DA80A',@p2=N'Sales@ANDREAS2015',@p3=N'baf9b6bb-a0da-41b9-8a81-a55b015d7a05',@p4=N'a23a2438-3af6-4c0a-a108-7f8e72d12083',@p5=1,@p6=0</a:t>
+            </a:r>
+          </a:p>
+          <a:p>
+            <a:pPr marL="0" marR="0" indent="0" algn="l" defTabSz="914400" rtl="0" eaLnBrk="1" fontAlgn="auto" latinLnBrk="0" hangingPunct="1">
+              <a:lnSpc>
+                <a:spcPct val="100000"/>
+              </a:lnSpc>
+              <a:spcBef>
+                <a:spcPts val="0"/>
+              </a:spcBef>
+              <a:spcAft>
+                <a:spcPts val="0"/>
+              </a:spcAft>
+              <a:buClrTx/>
+              <a:buSzTx/>
+              <a:buFontTx/>
+              <a:buNone/>
+              <a:tabLst/>
+              <a:defRPr/>
+            </a:pPr>
+            <a:endParaRPr lang="en-US" dirty="0" smtClean="0"/>
+          </a:p>
+          <a:p>
+            <a:pPr marL="0" marR="0" indent="0" algn="l" defTabSz="914400" rtl="0" eaLnBrk="1" fontAlgn="auto" latinLnBrk="0" hangingPunct="1">
+              <a:lnSpc>
+                <a:spcPct val="100000"/>
+              </a:lnSpc>
+              <a:spcBef>
+                <a:spcPts val="0"/>
+              </a:spcBef>
+              <a:spcAft>
+                <a:spcPts val="0"/>
+              </a:spcAft>
+              <a:buClrTx/>
+              <a:buSzTx/>
+              <a:buFontTx/>
+              <a:buNone/>
+              <a:tabLst/>
+              <a:defRPr/>
+            </a:pPr>
+            <a:r>
+              <a:rPr lang="en-US" dirty="0" smtClean="0"/>
+              <a:t>After </a:t>
+            </a:r>
+            <a:r>
+              <a:rPr lang="en-US" dirty="0" err="1" smtClean="0"/>
+              <a:t>rowversion</a:t>
+            </a:r>
+            <a:r>
+              <a:rPr lang="en-US" dirty="0" smtClean="0"/>
+              <a:t> trick:</a:t>
+            </a:r>
+          </a:p>
+          <a:p>
+            <a:pPr marL="0" marR="0" indent="0" algn="l" defTabSz="914400" rtl="0" eaLnBrk="1" fontAlgn="auto" latinLnBrk="0" hangingPunct="1">
+              <a:lnSpc>
+                <a:spcPct val="100000"/>
+              </a:lnSpc>
+              <a:spcBef>
+                <a:spcPts val="0"/>
+              </a:spcBef>
+              <a:spcAft>
+                <a:spcPts val="0"/>
+              </a:spcAft>
+              <a:buClrTx/>
+              <a:buSzTx/>
+              <a:buFontTx/>
+              <a:buNone/>
+              <a:tabLst/>
+              <a:defRPr/>
+            </a:pPr>
+            <a:endParaRPr lang="en-US" dirty="0" smtClean="0"/>
+          </a:p>
+          <a:p>
+            <a:pPr marL="0" marR="0" indent="0" algn="l" defTabSz="914400" rtl="0" eaLnBrk="1" fontAlgn="auto" latinLnBrk="0" hangingPunct="1">
+              <a:lnSpc>
+                <a:spcPct val="100000"/>
+              </a:lnSpc>
+              <a:spcBef>
+                <a:spcPts val="0"/>
+              </a:spcBef>
+              <a:spcAft>
+                <a:spcPts val="0"/>
+              </a:spcAft>
+              <a:buClrTx/>
+              <a:buSzTx/>
+              <a:buFontTx/>
+              <a:buNone/>
+              <a:tabLst/>
+              <a:defRPr/>
+            </a:pPr>
+            <a:r>
+              <a:rPr lang="en-US" dirty="0" smtClean="0"/>
+              <a:t>exec </a:t>
+            </a:r>
+            <a:r>
+              <a:rPr lang="en-US" dirty="0" err="1" smtClean="0"/>
+              <a:t>sp_executesql</a:t>
+            </a:r>
+            <a:r>
+              <a:rPr lang="en-US" dirty="0" smtClean="0"/>
+              <a:t> N'UPDATE </a:t>
+            </a:r>
+            <a:r>
+              <a:rPr lang="en-US" dirty="0" err="1" smtClean="0"/>
+              <a:t>ShippingPolicy</a:t>
+            </a:r>
+            <a:r>
+              <a:rPr lang="en-US" dirty="0" smtClean="0"/>
+              <a:t> SET Version = @p0, </a:t>
             </a:r>
             <a:r>
               <a:rPr lang="en-US" dirty="0" err="1" smtClean="0"/>
@@ -1557,7 +1469,15 @@
             </a:r>
             <a:r>
               <a:rPr lang="en-US" dirty="0" smtClean="0"/>
-              <a:t> = @p0',N'@p0 </a:t>
+              <a:t> = @p1, Placed = @p2, Billed = @p3, Originator = @p4, </a:t>
+            </a:r>
+            <a:r>
+              <a:rPr lang="en-US" dirty="0" err="1" smtClean="0"/>
+              <a:t>OriginalMessageId</a:t>
+            </a:r>
+            <a:r>
+              <a:rPr lang="en-US" dirty="0" smtClean="0"/>
+              <a:t> = @p5 WHERE Id = @p6 AND Version = @p7',N'@p0 int,@p1 </a:t>
             </a:r>
             <a:r>
               <a:rPr lang="en-US" dirty="0" err="1" smtClean="0"/>
@@ -1565,9 +1485,25 @@
             </a:r>
             <a:r>
               <a:rPr lang="en-US" dirty="0" smtClean="0"/>
-              <a:t>(4000)',@p0=N'ac9598f9-79cc-4d1c-bea2-32d8b73675b4'</a:t>
-            </a:r>
-            <a:endParaRPr lang="sv-SE" dirty="0" smtClean="0"/>
+              <a:t>(4000),@p2 bit,@p3 bit,@p4 </a:t>
+            </a:r>
+            <a:r>
+              <a:rPr lang="en-US" dirty="0" err="1" smtClean="0"/>
+              <a:t>nvarchar</a:t>
+            </a:r>
+            <a:r>
+              <a:rPr lang="en-US" dirty="0" smtClean="0"/>
+              <a:t>(4000),@p5 </a:t>
+            </a:r>
+            <a:r>
+              <a:rPr lang="en-US" dirty="0" err="1" smtClean="0"/>
+              <a:t>nvarchar</a:t>
+            </a:r>
+            <a:r>
+              <a:rPr lang="en-US" dirty="0" smtClean="0"/>
+              <a:t>(4000),@p6 uniqueidentifier,@p7 int',@p0=2,@p1=N'86427be3-59a5-453d-9c75-aab2a4b466be',@p2=1,@p3=1,@p4=N'Sales@ANDREAS2015',@p5=N'b5e51adb-9d18-40b9-bcea-a55c01356c38',@p6='3FAD8522-46EE-4C0E-B18D-A55C01356DA4',@p7=1</a:t>
+            </a:r>
+            <a:endParaRPr lang="en-GB" dirty="0" smtClean="0"/>
           </a:p>
           <a:p>
             <a:endParaRPr lang="sv-SE" dirty="0"/>
@@ -1591,7 +1527,7 @@
           <a:p>
             <a:fld id="{D5BB19A3-B3B6-4398-9889-160C3A008821}" type="slidenum">
               <a:rPr lang="sv-SE" smtClean="0"/>
-              <a:t>28</a:t>
+              <a:t>26</a:t>
             </a:fld>
             <a:endParaRPr lang="sv-SE"/>
           </a:p>
@@ -1600,7 +1536,7 @@
     </p:spTree>
     <p:extLst>
       <p:ext uri="{BB962C8B-B14F-4D97-AF65-F5344CB8AC3E}">
-        <p14:creationId xmlns:p14="http://schemas.microsoft.com/office/powerpoint/2010/main" val="1433424628"/>
+        <p14:creationId xmlns:p14="http://schemas.microsoft.com/office/powerpoint/2010/main" val="3287629598"/>
       </p:ext>
     </p:extLst>
   </p:cSld>
@@ -1654,6 +1590,118 @@
           <a:bodyPr/>
           <a:lstStyle/>
           <a:p>
+            <a:pPr marL="0" marR="0" indent="0" algn="l" defTabSz="914400" rtl="0" eaLnBrk="1" fontAlgn="auto" latinLnBrk="0" hangingPunct="1">
+              <a:lnSpc>
+                <a:spcPct val="100000"/>
+              </a:lnSpc>
+              <a:spcBef>
+                <a:spcPts val="0"/>
+              </a:spcBef>
+              <a:spcAft>
+                <a:spcPts val="0"/>
+              </a:spcAft>
+              <a:buClrTx/>
+              <a:buSzTx/>
+              <a:buFontTx/>
+              <a:buNone/>
+              <a:tabLst/>
+              <a:defRPr/>
+            </a:pPr>
+            <a:r>
+              <a:rPr lang="en-US" dirty="0" smtClean="0"/>
+              <a:t>exec </a:t>
+            </a:r>
+            <a:r>
+              <a:rPr lang="en-US" dirty="0" err="1" smtClean="0"/>
+              <a:t>sp_executesql</a:t>
+            </a:r>
+            <a:r>
+              <a:rPr lang="en-US" dirty="0" smtClean="0"/>
+              <a:t> N'SELECT </a:t>
+            </a:r>
+            <a:r>
+              <a:rPr lang="en-US" dirty="0" err="1" smtClean="0"/>
+              <a:t>this_.Id</a:t>
+            </a:r>
+            <a:r>
+              <a:rPr lang="en-US" dirty="0" smtClean="0"/>
+              <a:t> as Id0_0_, </a:t>
+            </a:r>
+            <a:r>
+              <a:rPr lang="en-US" dirty="0" err="1" smtClean="0"/>
+              <a:t>this_.Originator</a:t>
+            </a:r>
+            <a:r>
+              <a:rPr lang="en-US" dirty="0" smtClean="0"/>
+              <a:t> as Originator0_0_, this_.</a:t>
+            </a:r>
+            <a:r>
+              <a:rPr lang="en-US" dirty="0" err="1" smtClean="0"/>
+              <a:t>OriginalMessageId</a:t>
+            </a:r>
+            <a:r>
+              <a:rPr lang="en-US" dirty="0" smtClean="0"/>
+              <a:t> as Original3_0_0_, this_.</a:t>
+            </a:r>
+            <a:r>
+              <a:rPr lang="en-US" dirty="0" err="1" smtClean="0"/>
+              <a:t>OrderId</a:t>
+            </a:r>
+            <a:r>
+              <a:rPr lang="en-US" dirty="0" smtClean="0"/>
+              <a:t> as OrderId1_0_, this_.</a:t>
+            </a:r>
+            <a:r>
+              <a:rPr lang="en-US" dirty="0" err="1" smtClean="0"/>
+              <a:t>SentToFedex</a:t>
+            </a:r>
+            <a:r>
+              <a:rPr lang="en-US" dirty="0" smtClean="0"/>
+              <a:t> as SentToFe2_1_0_ FROM </a:t>
+            </a:r>
+            <a:r>
+              <a:rPr lang="en-US" dirty="0" err="1" smtClean="0"/>
+              <a:t>ShipOrderPolicy</a:t>
+            </a:r>
+            <a:r>
+              <a:rPr lang="en-US" dirty="0" smtClean="0"/>
+              <a:t> this_ </a:t>
+            </a:r>
+            <a:r>
+              <a:rPr lang="en-US" sz="3600" dirty="0" smtClean="0"/>
+              <a:t>with (</a:t>
+            </a:r>
+            <a:r>
+              <a:rPr lang="en-US" sz="3600" dirty="0" err="1" smtClean="0"/>
+              <a:t>updlock</a:t>
+            </a:r>
+            <a:r>
+              <a:rPr lang="en-US" sz="3600" dirty="0" smtClean="0"/>
+              <a:t>, rowlock) </a:t>
+            </a:r>
+            <a:r>
+              <a:rPr lang="en-US" dirty="0" smtClean="0"/>
+              <a:t>WHERE this_.</a:t>
+            </a:r>
+            <a:r>
+              <a:rPr lang="en-US" dirty="0" err="1" smtClean="0"/>
+              <a:t>OrderId</a:t>
+            </a:r>
+            <a:r>
+              <a:rPr lang="en-US" dirty="0" smtClean="0"/>
+              <a:t> = @p0',N'@p0 </a:t>
+            </a:r>
+            <a:r>
+              <a:rPr lang="en-US" dirty="0" err="1" smtClean="0"/>
+              <a:t>nvarchar</a:t>
+            </a:r>
+            <a:r>
+              <a:rPr lang="en-US" dirty="0" smtClean="0"/>
+              <a:t>(4000)',@p0=N'ac9598f9-79cc-4d1c-bea2-32d8b73675b4'</a:t>
+            </a:r>
+            <a:endParaRPr lang="sv-SE" dirty="0" smtClean="0"/>
+          </a:p>
+          <a:p>
             <a:endParaRPr lang="sv-SE" dirty="0"/>
           </a:p>
         </p:txBody>
@@ -1675,7 +1723,7 @@
           <a:p>
             <a:fld id="{D5BB19A3-B3B6-4398-9889-160C3A008821}" type="slidenum">
               <a:rPr lang="sv-SE" smtClean="0"/>
-              <a:t>30</a:t>
+              <a:t>28</a:t>
             </a:fld>
             <a:endParaRPr lang="sv-SE"/>
           </a:p>
@@ -1684,7 +1732,7 @@
     </p:spTree>
     <p:extLst>
       <p:ext uri="{BB962C8B-B14F-4D97-AF65-F5344CB8AC3E}">
-        <p14:creationId xmlns:p14="http://schemas.microsoft.com/office/powerpoint/2010/main" val="2250360170"/>
+        <p14:creationId xmlns:p14="http://schemas.microsoft.com/office/powerpoint/2010/main" val="1433424628"/>
       </p:ext>
     </p:extLst>
   </p:cSld>
@@ -1738,15 +1786,7 @@
           <a:bodyPr/>
           <a:lstStyle/>
           <a:p>
-            <a:r>
-              <a:rPr lang="de-CH" dirty="0" smtClean="0"/>
-              <a:t>Wichtig: Saga</a:t>
-            </a:r>
-            <a:r>
-              <a:rPr lang="de-CH" baseline="0" dirty="0" smtClean="0"/>
-              <a:t> erhält Korrelationsschlüssel, jede Nachricht die von einer Saga weg geht beinhaltet diesen</a:t>
-            </a:r>
-            <a:endParaRPr lang="de-CH" dirty="0"/>
+            <a:endParaRPr lang="sv-SE" dirty="0"/>
           </a:p>
         </p:txBody>
       </p:sp>
@@ -1765,18 +1805,18 @@
           <a:bodyPr/>
           <a:lstStyle/>
           <a:p>
-            <a:fld id="{F4C83ACB-D749-4CD6-B969-202298D6FED6}" type="slidenum">
-              <a:rPr lang="de-CH" smtClean="0"/>
-              <a:t>32</a:t>
+            <a:fld id="{D5BB19A3-B3B6-4398-9889-160C3A008821}" type="slidenum">
+              <a:rPr lang="sv-SE" smtClean="0"/>
+              <a:t>30</a:t>
             </a:fld>
-            <a:endParaRPr lang="de-CH"/>
+            <a:endParaRPr lang="sv-SE"/>
           </a:p>
         </p:txBody>
       </p:sp>
     </p:spTree>
     <p:extLst>
       <p:ext uri="{BB962C8B-B14F-4D97-AF65-F5344CB8AC3E}">
-        <p14:creationId xmlns:p14="http://schemas.microsoft.com/office/powerpoint/2010/main" val="1553877967"/>
+        <p14:creationId xmlns:p14="http://schemas.microsoft.com/office/powerpoint/2010/main" val="2250360170"/>
       </p:ext>
     </p:extLst>
   </p:cSld>
@@ -1832,36 +1872,13 @@
           <a:p>
             <a:r>
               <a:rPr lang="de-CH" dirty="0" smtClean="0"/>
-              <a:t>Verarbeitun</a:t>
+              <a:t>Wichtig: Saga</a:t>
             </a:r>
             <a:r>
               <a:rPr lang="de-CH" baseline="0" dirty="0" smtClean="0"/>
-              <a:t>g kann auf mehreren Prozessen / Maschinen gleichzeitig erfolgen</a:t>
-            </a:r>
-          </a:p>
-          <a:p>
-            <a:r>
-              <a:rPr lang="de-CH" baseline="0" dirty="0" smtClean="0"/>
-              <a:t>Saga-Eindeutigkeit muss definiert werden, Infrastruktur handhabt dann das Rollback</a:t>
-            </a:r>
-          </a:p>
-          <a:p>
-            <a:r>
-              <a:rPr lang="de-CH" baseline="0" dirty="0" smtClean="0"/>
-              <a:t>Sonst läuft der Systemzustand aus dem Ruder!</a:t>
-            </a:r>
-          </a:p>
-          <a:p>
-            <a:endParaRPr lang="de-CH" baseline="0" dirty="0" smtClean="0"/>
-          </a:p>
-          <a:p>
-            <a:r>
-              <a:rPr lang="de-CH" baseline="0" dirty="0" smtClean="0"/>
-              <a:t>Schwierigkeit: Sagas zu modellieren (Einzelschritte etc.), Viel Kommunikation mit dem BA notwendig., auch für Legacysysteme geeignet</a:t>
-            </a:r>
-          </a:p>
-          <a:p>
-            <a:endParaRPr lang="de-CH" baseline="0" dirty="0" smtClean="0"/>
+              <a:t> erhält Korrelationsschlüssel, jede Nachricht die von einer Saga weg geht beinhaltet diesen</a:t>
+            </a:r>
+            <a:endParaRPr lang="de-CH" dirty="0"/>
           </a:p>
         </p:txBody>
       </p:sp>
@@ -1882,7 +1899,7 @@
           <a:p>
             <a:fld id="{F4C83ACB-D749-4CD6-B969-202298D6FED6}" type="slidenum">
               <a:rPr lang="de-CH" smtClean="0"/>
-              <a:t>33</a:t>
+              <a:t>32</a:t>
             </a:fld>
             <a:endParaRPr lang="de-CH"/>
           </a:p>
@@ -1891,7 +1908,7 @@
     </p:spTree>
     <p:extLst>
       <p:ext uri="{BB962C8B-B14F-4D97-AF65-F5344CB8AC3E}">
-        <p14:creationId xmlns:p14="http://schemas.microsoft.com/office/powerpoint/2010/main" val="1768624293"/>
+        <p14:creationId xmlns:p14="http://schemas.microsoft.com/office/powerpoint/2010/main" val="1553877967"/>
       </p:ext>
     </p:extLst>
   </p:cSld>
@@ -1947,31 +1964,36 @@
           <a:p>
             <a:r>
               <a:rPr lang="de-CH" dirty="0" smtClean="0"/>
-              <a:t>Important to note here is that the Timeout Data doesn’t have to be a message type. It can be any poco.</a:t>
-            </a:r>
-          </a:p>
-          <a:p>
-            <a:r>
-              <a:rPr lang="de-CH" dirty="0" smtClean="0"/>
-              <a:t>Why is there no virtual since the TM persister will serialize it to a </a:t>
-            </a:r>
-            <a:r>
-              <a:rPr lang="de-CH" dirty="0" err="1" smtClean="0"/>
-              <a:t>string</a:t>
-            </a:r>
-            <a:r>
-              <a:rPr lang="de-CH" dirty="0" smtClean="0"/>
-              <a:t> </a:t>
-            </a:r>
-            <a:r>
-              <a:rPr lang="de-CH" dirty="0" err="1" smtClean="0"/>
-              <a:t>format</a:t>
-            </a:r>
-            <a:r>
-              <a:rPr lang="de-CH" dirty="0" smtClean="0"/>
-              <a:t> (JSON)</a:t>
-            </a:r>
-            <a:endParaRPr lang="de-CH" dirty="0"/>
+              <a:t>Verarbeitun</a:t>
+            </a:r>
+            <a:r>
+              <a:rPr lang="de-CH" baseline="0" dirty="0" smtClean="0"/>
+              <a:t>g kann auf mehreren Prozessen / Maschinen gleichzeitig erfolgen</a:t>
+            </a:r>
+          </a:p>
+          <a:p>
+            <a:r>
+              <a:rPr lang="de-CH" baseline="0" dirty="0" smtClean="0"/>
+              <a:t>Saga-Eindeutigkeit muss definiert werden, Infrastruktur handhabt dann das Rollback</a:t>
+            </a:r>
+          </a:p>
+          <a:p>
+            <a:r>
+              <a:rPr lang="de-CH" baseline="0" dirty="0" smtClean="0"/>
+              <a:t>Sonst läuft der Systemzustand aus dem Ruder!</a:t>
+            </a:r>
+          </a:p>
+          <a:p>
+            <a:endParaRPr lang="de-CH" baseline="0" dirty="0" smtClean="0"/>
+          </a:p>
+          <a:p>
+            <a:r>
+              <a:rPr lang="de-CH" baseline="0" dirty="0" smtClean="0"/>
+              <a:t>Schwierigkeit: Sagas zu modellieren (Einzelschritte etc.), Viel Kommunikation mit dem BA notwendig., auch für Legacysysteme geeignet</a:t>
+            </a:r>
+          </a:p>
+          <a:p>
+            <a:endParaRPr lang="de-CH" baseline="0" dirty="0" smtClean="0"/>
           </a:p>
         </p:txBody>
       </p:sp>
@@ -1982,7 +2004,7 @@
             <a:spLocks noGrp="1"/>
           </p:cNvSpPr>
           <p:nvPr>
-            <p:ph type="sldNum" idx="10"/>
+            <p:ph type="sldNum" sz="quarter" idx="10"/>
           </p:nvPr>
         </p:nvSpPr>
         <p:spPr/>
@@ -1990,19 +2012,18 @@
           <a:bodyPr/>
           <a:lstStyle/>
           <a:p>
-            <a:fld id="{7ACA2796-6D5E-4AAD-9D66-AE6CE657D5C0}" type="slidenum">
-              <a:rPr lang="en-GB" smtClean="0"/>
-              <a:pPr/>
-              <a:t>37</a:t>
+            <a:fld id="{F4C83ACB-D749-4CD6-B969-202298D6FED6}" type="slidenum">
+              <a:rPr lang="de-CH" smtClean="0"/>
+              <a:t>33</a:t>
             </a:fld>
-            <a:endParaRPr lang="en-GB"/>
+            <a:endParaRPr lang="de-CH"/>
           </a:p>
         </p:txBody>
       </p:sp>
     </p:spTree>
     <p:extLst>
       <p:ext uri="{BB962C8B-B14F-4D97-AF65-F5344CB8AC3E}">
-        <p14:creationId xmlns:p14="http://schemas.microsoft.com/office/powerpoint/2010/main" val="3241142037"/>
+        <p14:creationId xmlns:p14="http://schemas.microsoft.com/office/powerpoint/2010/main" val="1768624293"/>
       </p:ext>
     </p:extLst>
   </p:cSld>
@@ -2053,30 +2074,36 @@
         </p:nvSpPr>
         <p:spPr/>
         <p:txBody>
-          <a:bodyPr>
-            <a:normAutofit/>
-          </a:bodyPr>
+          <a:bodyPr/>
           <a:lstStyle/>
           <a:p>
             <a:r>
-              <a:rPr lang="en-US" dirty="0" smtClean="0"/>
-              <a:t>Talk about </a:t>
-            </a:r>
-            <a:r>
-              <a:rPr lang="en-US" dirty="0" err="1" smtClean="0"/>
-              <a:t>idempotency</a:t>
-            </a:r>
-            <a:r>
-              <a:rPr lang="en-US" dirty="0" smtClean="0"/>
-              <a:t> so that duplicate calls due to retries will</a:t>
-            </a:r>
-            <a:r>
-              <a:rPr lang="en-US" baseline="0" dirty="0" smtClean="0"/>
-              <a:t> be OK – use of the message ID as a correlation ID in the web service</a:t>
-            </a:r>
-          </a:p>
-          <a:p>
-            <a:endParaRPr lang="en-US" dirty="0"/>
+              <a:rPr lang="de-CH" dirty="0" smtClean="0"/>
+              <a:t>Important to note here is that the Timeout Data doesn’t have to be a message type. It can be any poco.</a:t>
+            </a:r>
+          </a:p>
+          <a:p>
+            <a:r>
+              <a:rPr lang="de-CH" dirty="0" smtClean="0"/>
+              <a:t>Why is there no virtual since the TM persister will serialize it to a </a:t>
+            </a:r>
+            <a:r>
+              <a:rPr lang="de-CH" dirty="0" err="1" smtClean="0"/>
+              <a:t>string</a:t>
+            </a:r>
+            <a:r>
+              <a:rPr lang="de-CH" dirty="0" smtClean="0"/>
+              <a:t> </a:t>
+            </a:r>
+            <a:r>
+              <a:rPr lang="de-CH" dirty="0" err="1" smtClean="0"/>
+              <a:t>format</a:t>
+            </a:r>
+            <a:r>
+              <a:rPr lang="de-CH" dirty="0" smtClean="0"/>
+              <a:t> (JSON)</a:t>
+            </a:r>
+            <a:endParaRPr lang="de-CH" dirty="0"/>
           </a:p>
         </p:txBody>
       </p:sp>
@@ -2098,7 +2125,7 @@
             <a:fld id="{7ACA2796-6D5E-4AAD-9D66-AE6CE657D5C0}" type="slidenum">
               <a:rPr lang="en-GB" smtClean="0"/>
               <a:pPr/>
-              <a:t>41</a:t>
+              <a:t>37</a:t>
             </a:fld>
             <a:endParaRPr lang="en-GB"/>
           </a:p>
@@ -2107,7 +2134,7 @@
     </p:spTree>
     <p:extLst>
       <p:ext uri="{BB962C8B-B14F-4D97-AF65-F5344CB8AC3E}">
-        <p14:creationId xmlns:p14="http://schemas.microsoft.com/office/powerpoint/2010/main" val="2393542536"/>
+        <p14:creationId xmlns:p14="http://schemas.microsoft.com/office/powerpoint/2010/main" val="3241142037"/>
       </p:ext>
     </p:extLst>
   </p:cSld>
@@ -2167,7 +2194,28 @@
             </a:r>
             <a:r>
               <a:rPr lang="en-GB" baseline="0" dirty="0" smtClean="0"/>
-              <a:t> database guys from the 80’ies needed to break up long business process into shorter parts to avoid massive locking</a:t>
+              <a:t> database guys from the 80’ies needed to break up long business process into shorter parts to avoid massive </a:t>
+            </a:r>
+            <a:r>
+              <a:rPr lang="en-GB" baseline="0" dirty="0" smtClean="0"/>
+              <a:t>locking</a:t>
+            </a:r>
+          </a:p>
+          <a:p>
+            <a:endParaRPr lang="en-GB" baseline="0" dirty="0" smtClean="0"/>
+          </a:p>
+          <a:p>
+            <a:r>
+              <a:rPr lang="en-GB" baseline="0" dirty="0" smtClean="0"/>
+              <a:t>Yes there is some </a:t>
+            </a:r>
+            <a:r>
+              <a:rPr lang="en-GB" baseline="0" dirty="0" err="1" smtClean="0"/>
+              <a:t>debat</a:t>
+            </a:r>
+            <a:r>
+              <a:rPr lang="en-GB" baseline="0" dirty="0" smtClean="0"/>
+              <a:t> on what a saga really is, some call it process managers, we call it sagas</a:t>
             </a:r>
             <a:endParaRPr lang="sv-SE" dirty="0"/>
           </a:p>
@@ -2257,33 +2305,22 @@
           <a:p>
             <a:r>
               <a:rPr lang="en-US" dirty="0" smtClean="0"/>
-              <a:t>Fed Ex is our</a:t>
+              <a:t>Talk about </a:t>
+            </a:r>
+            <a:r>
+              <a:rPr lang="en-US" dirty="0" err="1" smtClean="0"/>
+              <a:t>idempotency</a:t>
+            </a:r>
+            <a:r>
+              <a:rPr lang="en-US" dirty="0" smtClean="0"/>
+              <a:t> so that duplicate calls due to retries will</a:t>
             </a:r>
             <a:r>
               <a:rPr lang="en-US" baseline="0" dirty="0" smtClean="0"/>
-              <a:t> preferred shipping provider, but if they don’t answer in a timely manner, we’ll turn to other shipping providers like UPS</a:t>
-            </a:r>
-          </a:p>
-          <a:p>
-            <a:endParaRPr lang="en-US" baseline="0" dirty="0" smtClean="0"/>
-          </a:p>
-          <a:p>
-            <a:r>
-              <a:rPr lang="en-US" baseline="0" dirty="0" smtClean="0"/>
-              <a:t>What happens if we shutdown part of the system, the </a:t>
-            </a:r>
-            <a:r>
-              <a:rPr lang="en-US" baseline="0" dirty="0" err="1" smtClean="0"/>
-              <a:t>fedex</a:t>
-            </a:r>
-            <a:r>
-              <a:rPr lang="en-US" baseline="0" dirty="0" smtClean="0"/>
-              <a:t> proxy is still running, succeeds and we restart shipping while the timeout is </a:t>
-            </a:r>
-            <a:r>
-              <a:rPr lang="en-US" baseline="0" smtClean="0"/>
-              <a:t>over?</a:t>
-            </a:r>
+              <a:t> be OK – use of the message ID as a correlation ID in the web service</a:t>
+            </a:r>
+          </a:p>
+          <a:p>
             <a:endParaRPr lang="en-US" dirty="0"/>
           </a:p>
         </p:txBody>
@@ -2306,7 +2343,7 @@
             <a:fld id="{7ACA2796-6D5E-4AAD-9D66-AE6CE657D5C0}" type="slidenum">
               <a:rPr lang="en-GB" smtClean="0"/>
               <a:pPr/>
-              <a:t>42</a:t>
+              <a:t>41</a:t>
             </a:fld>
             <a:endParaRPr lang="en-GB"/>
           </a:p>
@@ -2315,7 +2352,7 @@
     </p:spTree>
     <p:extLst>
       <p:ext uri="{BB962C8B-B14F-4D97-AF65-F5344CB8AC3E}">
-        <p14:creationId xmlns:p14="http://schemas.microsoft.com/office/powerpoint/2010/main" val="990345126"/>
+        <p14:creationId xmlns:p14="http://schemas.microsoft.com/office/powerpoint/2010/main" val="2393542536"/>
       </p:ext>
     </p:extLst>
   </p:cSld>
@@ -2366,90 +2403,41 @@
         </p:nvSpPr>
         <p:spPr/>
         <p:txBody>
-          <a:bodyPr/>
+          <a:bodyPr>
+            <a:normAutofit/>
+          </a:bodyPr>
           <a:lstStyle/>
           <a:p>
-            <a:pPr marL="342900" indent="-342900"/>
             <a:r>
               <a:rPr lang="en-US" dirty="0" smtClean="0"/>
-              <a:t>Similar to Onion or Hexagonal architecture.</a:t>
+              <a:t>Fed Ex is our</a:t>
             </a:r>
             <a:r>
               <a:rPr lang="en-US" baseline="0" dirty="0" smtClean="0"/>
-              <a:t> We have rings of </a:t>
+              <a:t> preferred shipping provider, but if they don’t answer in a timely manner, we’ll turn to other shipping providers like UPS</a:t>
+            </a:r>
+          </a:p>
+          <a:p>
+            <a:endParaRPr lang="en-US" baseline="0" dirty="0" smtClean="0"/>
+          </a:p>
+          <a:p>
+            <a:r>
+              <a:rPr lang="en-US" baseline="0" dirty="0" smtClean="0"/>
+              <a:t>What happens if we shutdown part of the system, the </a:t>
             </a:r>
             <a:r>
               <a:rPr lang="en-US" baseline="0" dirty="0" err="1" smtClean="0"/>
-              <a:t>prozess</a:t>
+              <a:t>fedex</a:t>
             </a:r>
             <a:r>
               <a:rPr lang="en-US" baseline="0" dirty="0" smtClean="0"/>
-              <a:t> managers/sagas</a:t>
-            </a:r>
-          </a:p>
-          <a:p>
-            <a:pPr marL="342900" indent="-342900"/>
-            <a:r>
-              <a:rPr lang="en-US" baseline="0" dirty="0" smtClean="0"/>
-              <a:t>When you integrate with Legacy Systems you usually have one process manager for the overall flow and one adapter for each integration point</a:t>
-            </a:r>
-            <a:endParaRPr lang="en-US" dirty="0" smtClean="0"/>
-          </a:p>
-          <a:p>
-            <a:pPr marL="342900" indent="-342900"/>
-            <a:endParaRPr lang="en-US" dirty="0" smtClean="0"/>
-          </a:p>
-          <a:p>
-            <a:pPr marL="342900" indent="-342900"/>
-            <a:r>
-              <a:rPr lang="en-US" b="1" dirty="0" smtClean="0"/>
-              <a:t>Orchestration is not a thing by itself.</a:t>
-            </a:r>
-          </a:p>
-          <a:p>
-            <a:pPr marL="342900" indent="-342900"/>
-            <a:endParaRPr lang="en-US" dirty="0" smtClean="0"/>
-          </a:p>
-          <a:p>
-            <a:pPr marL="342900" indent="-342900"/>
-            <a:r>
-              <a:rPr lang="en-US" dirty="0" smtClean="0"/>
-              <a:t>Divide up workflows/orchestrations along service boundaries</a:t>
-            </a:r>
-          </a:p>
-          <a:p>
-            <a:pPr marL="738188" lvl="1" indent="-342900"/>
-            <a:r>
-              <a:rPr lang="en-US" dirty="0" smtClean="0"/>
-              <a:t>Events are published at the end of the sub-flow in a service</a:t>
-            </a:r>
-          </a:p>
-          <a:p>
-            <a:pPr marL="738188" lvl="1" indent="-342900"/>
-            <a:r>
-              <a:rPr lang="en-US" dirty="0" smtClean="0"/>
-              <a:t>Events trigger a sub-flow in other services</a:t>
-            </a:r>
-          </a:p>
-          <a:p>
-            <a:pPr marL="342900" indent="-342900"/>
-            <a:endParaRPr lang="en-US" dirty="0" smtClean="0"/>
-          </a:p>
-          <a:p>
-            <a:pPr marL="342900" indent="-342900"/>
-            <a:r>
-              <a:rPr lang="en-US" dirty="0" smtClean="0"/>
-              <a:t>Sagas can be used for CEP/ESP:</a:t>
-            </a:r>
-          </a:p>
-          <a:p>
-            <a:pPr marL="342900" indent="-342900">
-              <a:buNone/>
-            </a:pPr>
-            <a:r>
-              <a:rPr lang="en-US" dirty="0" smtClean="0"/>
-              <a:t>	complex event processing, event-stream proc.</a:t>
-            </a:r>
+              <a:t> proxy is still running, succeeds and we restart shipping while the timeout is </a:t>
+            </a:r>
+            <a:r>
+              <a:rPr lang="en-US" baseline="0" smtClean="0"/>
+              <a:t>over?</a:t>
+            </a:r>
+            <a:endParaRPr lang="en-US" dirty="0"/>
           </a:p>
         </p:txBody>
       </p:sp>
@@ -2460,7 +2448,7 @@
             <a:spLocks noGrp="1"/>
           </p:cNvSpPr>
           <p:nvPr>
-            <p:ph type="sldNum" sz="quarter" idx="10"/>
+            <p:ph type="sldNum" idx="10"/>
           </p:nvPr>
         </p:nvSpPr>
         <p:spPr/>
@@ -2468,18 +2456,19 @@
           <a:bodyPr/>
           <a:lstStyle/>
           <a:p>
-            <a:fld id="{3993D047-D8B4-43AA-8641-D9CCF4EC54F4}" type="slidenum">
-              <a:rPr lang="de-CH" smtClean="0"/>
-              <a:t>43</a:t>
+            <a:fld id="{7ACA2796-6D5E-4AAD-9D66-AE6CE657D5C0}" type="slidenum">
+              <a:rPr lang="en-GB" smtClean="0"/>
+              <a:pPr/>
+              <a:t>42</a:t>
             </a:fld>
-            <a:endParaRPr lang="de-CH"/>
+            <a:endParaRPr lang="en-GB"/>
           </a:p>
         </p:txBody>
       </p:sp>
     </p:spTree>
     <p:extLst>
       <p:ext uri="{BB962C8B-B14F-4D97-AF65-F5344CB8AC3E}">
-        <p14:creationId xmlns:p14="http://schemas.microsoft.com/office/powerpoint/2010/main" val="783631915"/>
+        <p14:creationId xmlns:p14="http://schemas.microsoft.com/office/powerpoint/2010/main" val="990345126"/>
       </p:ext>
     </p:extLst>
   </p:cSld>
@@ -2530,28 +2519,90 @@
         </p:nvSpPr>
         <p:spPr/>
         <p:txBody>
-          <a:bodyPr>
-            <a:normAutofit/>
-          </a:bodyPr>
+          <a:bodyPr/>
           <a:lstStyle/>
           <a:p>
+            <a:pPr marL="342900" indent="-342900"/>
             <a:r>
               <a:rPr lang="en-US" dirty="0" smtClean="0"/>
-              <a:t>Demonstrate</a:t>
+              <a:t>Similar to Onion or Hexagonal architecture.</a:t>
             </a:r>
             <a:r>
               <a:rPr lang="en-US" baseline="0" dirty="0" smtClean="0"/>
-              <a:t> sample: </a:t>
+              <a:t> We have rings of </a:t>
             </a:r>
             <a:r>
               <a:rPr lang="en-US" baseline="0" dirty="0" err="1" smtClean="0"/>
-              <a:t>WcfIntegration</a:t>
+              <a:t>prozess</a:t>
             </a:r>
             <a:r>
               <a:rPr lang="en-US" baseline="0" dirty="0" smtClean="0"/>
-              <a:t> (NServiceBus Main Repo Integration Tests)</a:t>
-            </a:r>
-            <a:endParaRPr lang="en-US" dirty="0"/>
+              <a:t> managers/sagas</a:t>
+            </a:r>
+          </a:p>
+          <a:p>
+            <a:pPr marL="342900" indent="-342900"/>
+            <a:r>
+              <a:rPr lang="en-US" baseline="0" dirty="0" smtClean="0"/>
+              <a:t>When you integrate with Legacy Systems you usually have one process manager for the overall flow and one adapter for each integration point</a:t>
+            </a:r>
+            <a:endParaRPr lang="en-US" dirty="0" smtClean="0"/>
+          </a:p>
+          <a:p>
+            <a:pPr marL="342900" indent="-342900"/>
+            <a:endParaRPr lang="en-US" dirty="0" smtClean="0"/>
+          </a:p>
+          <a:p>
+            <a:pPr marL="342900" indent="-342900"/>
+            <a:r>
+              <a:rPr lang="en-US" b="1" dirty="0" smtClean="0"/>
+              <a:t>Orchestration is not a thing by itself.</a:t>
+            </a:r>
+          </a:p>
+          <a:p>
+            <a:pPr marL="342900" indent="-342900"/>
+            <a:endParaRPr lang="en-US" dirty="0" smtClean="0"/>
+          </a:p>
+          <a:p>
+            <a:pPr marL="342900" indent="-342900"/>
+            <a:r>
+              <a:rPr lang="en-US" dirty="0" smtClean="0"/>
+              <a:t>Divide up workflows/orchestrations along service boundaries</a:t>
+            </a:r>
+          </a:p>
+          <a:p>
+            <a:pPr marL="738188" lvl="1" indent="-342900"/>
+            <a:r>
+              <a:rPr lang="en-US" dirty="0" smtClean="0"/>
+              <a:t>Events are published at the end of the sub-flow in a service</a:t>
+            </a:r>
+          </a:p>
+          <a:p>
+            <a:pPr marL="738188" lvl="1" indent="-342900"/>
+            <a:r>
+              <a:rPr lang="en-US" dirty="0" smtClean="0"/>
+              <a:t>Events trigger a sub-flow in other services</a:t>
+            </a:r>
+          </a:p>
+          <a:p>
+            <a:pPr marL="342900" indent="-342900"/>
+            <a:endParaRPr lang="en-US" dirty="0" smtClean="0"/>
+          </a:p>
+          <a:p>
+            <a:pPr marL="342900" indent="-342900"/>
+            <a:r>
+              <a:rPr lang="en-US" dirty="0" smtClean="0"/>
+              <a:t>Sagas can be used for CEP/ESP:</a:t>
+            </a:r>
+          </a:p>
+          <a:p>
+            <a:pPr marL="342900" indent="-342900">
+              <a:buNone/>
+            </a:pPr>
+            <a:r>
+              <a:rPr lang="en-US" dirty="0" smtClean="0"/>
+              <a:t>	complex event processing, event-stream proc.</a:t>
+            </a:r>
           </a:p>
         </p:txBody>
       </p:sp>
@@ -2562,7 +2613,7 @@
             <a:spLocks noGrp="1"/>
           </p:cNvSpPr>
           <p:nvPr>
-            <p:ph type="sldNum" idx="10"/>
+            <p:ph type="sldNum" sz="quarter" idx="10"/>
           </p:nvPr>
         </p:nvSpPr>
         <p:spPr/>
@@ -2570,19 +2621,18 @@
           <a:bodyPr/>
           <a:lstStyle/>
           <a:p>
-            <a:fld id="{7ACA2796-6D5E-4AAD-9D66-AE6CE657D5C0}" type="slidenum">
-              <a:rPr lang="en-GB" smtClean="0"/>
-              <a:pPr/>
-              <a:t>48</a:t>
+            <a:fld id="{3993D047-D8B4-43AA-8641-D9CCF4EC54F4}" type="slidenum">
+              <a:rPr lang="de-CH" smtClean="0"/>
+              <a:t>43</a:t>
             </a:fld>
-            <a:endParaRPr lang="en-GB"/>
+            <a:endParaRPr lang="de-CH"/>
           </a:p>
         </p:txBody>
       </p:sp>
     </p:spTree>
     <p:extLst>
       <p:ext uri="{BB962C8B-B14F-4D97-AF65-F5344CB8AC3E}">
-        <p14:creationId xmlns:p14="http://schemas.microsoft.com/office/powerpoint/2010/main" val="58117029"/>
+        <p14:creationId xmlns:p14="http://schemas.microsoft.com/office/powerpoint/2010/main" val="783631915"/>
       </p:ext>
     </p:extLst>
   </p:cSld>
@@ -2633,24 +2683,28 @@
         </p:nvSpPr>
         <p:spPr/>
         <p:txBody>
-          <a:bodyPr/>
+          <a:bodyPr>
+            <a:normAutofit/>
+          </a:bodyPr>
           <a:lstStyle/>
           <a:p>
             <a:r>
-              <a:rPr lang="en-GB" dirty="0" smtClean="0"/>
-              <a:t>Observer</a:t>
-            </a:r>
-            <a:r>
-              <a:rPr lang="en-GB" baseline="0" dirty="0" smtClean="0"/>
-              <a:t> sagas live fro ever</a:t>
-            </a:r>
-          </a:p>
-          <a:p>
-            <a:r>
-              <a:rPr lang="en-GB" baseline="0" dirty="0" smtClean="0"/>
-              <a:t>Command sagas complete when done</a:t>
-            </a:r>
-            <a:endParaRPr lang="sv-SE" dirty="0"/>
+              <a:rPr lang="en-US" dirty="0" smtClean="0"/>
+              <a:t>Demonstrate</a:t>
+            </a:r>
+            <a:r>
+              <a:rPr lang="en-US" baseline="0" dirty="0" smtClean="0"/>
+              <a:t> sample: </a:t>
+            </a:r>
+            <a:r>
+              <a:rPr lang="en-US" baseline="0" dirty="0" err="1" smtClean="0"/>
+              <a:t>WcfIntegration</a:t>
+            </a:r>
+            <a:r>
+              <a:rPr lang="en-US" baseline="0" dirty="0" smtClean="0"/>
+              <a:t> (NServiceBus Main Repo Integration Tests)</a:t>
+            </a:r>
+            <a:endParaRPr lang="en-US" dirty="0"/>
           </a:p>
         </p:txBody>
       </p:sp>
@@ -2661,7 +2715,7 @@
             <a:spLocks noGrp="1"/>
           </p:cNvSpPr>
           <p:nvPr>
-            <p:ph type="sldNum" sz="quarter" idx="10"/>
+            <p:ph type="sldNum" idx="10"/>
           </p:nvPr>
         </p:nvSpPr>
         <p:spPr/>
@@ -2669,18 +2723,19 @@
           <a:bodyPr/>
           <a:lstStyle/>
           <a:p>
-            <a:fld id="{D5BB19A3-B3B6-4398-9889-160C3A008821}" type="slidenum">
-              <a:rPr lang="sv-SE" smtClean="0"/>
-              <a:t>50</a:t>
+            <a:fld id="{7ACA2796-6D5E-4AAD-9D66-AE6CE657D5C0}" type="slidenum">
+              <a:rPr lang="en-GB" smtClean="0"/>
+              <a:pPr/>
+              <a:t>48</a:t>
             </a:fld>
-            <a:endParaRPr lang="sv-SE"/>
+            <a:endParaRPr lang="en-GB"/>
           </a:p>
         </p:txBody>
       </p:sp>
     </p:spTree>
     <p:extLst>
       <p:ext uri="{BB962C8B-B14F-4D97-AF65-F5344CB8AC3E}">
-        <p14:creationId xmlns:p14="http://schemas.microsoft.com/office/powerpoint/2010/main" val="4076966085"/>
+        <p14:creationId xmlns:p14="http://schemas.microsoft.com/office/powerpoint/2010/main" val="58117029"/>
       </p:ext>
     </p:extLst>
   </p:cSld>
@@ -2735,14 +2790,20 @@
           <a:lstStyle/>
           <a:p>
             <a:r>
-              <a:rPr lang="de-CH" dirty="0" smtClean="0"/>
-              <a:t>Klassisches Integration</a:t>
-            </a:r>
-            <a:r>
-              <a:rPr lang="de-CH" baseline="0" dirty="0" smtClean="0"/>
-              <a:t> Beispiel</a:t>
-            </a:r>
-            <a:endParaRPr lang="de-CH" dirty="0"/>
+              <a:rPr lang="en-GB" dirty="0" smtClean="0"/>
+              <a:t>Observer</a:t>
+            </a:r>
+            <a:r>
+              <a:rPr lang="en-GB" baseline="0" dirty="0" smtClean="0"/>
+              <a:t> sagas live fro ever</a:t>
+            </a:r>
+          </a:p>
+          <a:p>
+            <a:r>
+              <a:rPr lang="en-GB" baseline="0" dirty="0" smtClean="0"/>
+              <a:t>Command sagas complete when done</a:t>
+            </a:r>
+            <a:endParaRPr lang="sv-SE" dirty="0"/>
           </a:p>
         </p:txBody>
       </p:sp>
@@ -2761,18 +2822,18 @@
           <a:bodyPr/>
           <a:lstStyle/>
           <a:p>
-            <a:fld id="{3993D047-D8B4-43AA-8641-D9CCF4EC54F4}" type="slidenum">
-              <a:rPr lang="de-CH" smtClean="0"/>
-              <a:t>51</a:t>
+            <a:fld id="{D5BB19A3-B3B6-4398-9889-160C3A008821}" type="slidenum">
+              <a:rPr lang="sv-SE" smtClean="0"/>
+              <a:t>50</a:t>
             </a:fld>
-            <a:endParaRPr lang="de-CH"/>
+            <a:endParaRPr lang="sv-SE"/>
           </a:p>
         </p:txBody>
       </p:sp>
     </p:spTree>
     <p:extLst>
       <p:ext uri="{BB962C8B-B14F-4D97-AF65-F5344CB8AC3E}">
-        <p14:creationId xmlns:p14="http://schemas.microsoft.com/office/powerpoint/2010/main" val="3142864389"/>
+        <p14:creationId xmlns:p14="http://schemas.microsoft.com/office/powerpoint/2010/main" val="4076966085"/>
       </p:ext>
     </p:extLst>
   </p:cSld>
@@ -2855,7 +2916,7 @@
           <a:p>
             <a:fld id="{3993D047-D8B4-43AA-8641-D9CCF4EC54F4}" type="slidenum">
               <a:rPr lang="de-CH" smtClean="0"/>
-              <a:t>52</a:t>
+              <a:t>51</a:t>
             </a:fld>
             <a:endParaRPr lang="de-CH"/>
           </a:p>
@@ -2864,7 +2925,7 @@
     </p:spTree>
     <p:extLst>
       <p:ext uri="{BB962C8B-B14F-4D97-AF65-F5344CB8AC3E}">
-        <p14:creationId xmlns:p14="http://schemas.microsoft.com/office/powerpoint/2010/main" val="1763752134"/>
+        <p14:creationId xmlns:p14="http://schemas.microsoft.com/office/powerpoint/2010/main" val="3142864389"/>
       </p:ext>
     </p:extLst>
   </p:cSld>
@@ -2920,7 +2981,11 @@
           <a:p>
             <a:r>
               <a:rPr lang="de-CH" dirty="0" smtClean="0"/>
-              <a:t>Prozesshandling wie es aussehen könnte</a:t>
+              <a:t>Klassisches Integration</a:t>
+            </a:r>
+            <a:r>
+              <a:rPr lang="de-CH" baseline="0" dirty="0" smtClean="0"/>
+              <a:t> Beispiel</a:t>
             </a:r>
             <a:endParaRPr lang="de-CH" dirty="0"/>
           </a:p>
@@ -2943,7 +3008,7 @@
           <a:p>
             <a:fld id="{3993D047-D8B4-43AA-8641-D9CCF4EC54F4}" type="slidenum">
               <a:rPr lang="de-CH" smtClean="0"/>
-              <a:t>53</a:t>
+              <a:t>52</a:t>
             </a:fld>
             <a:endParaRPr lang="de-CH"/>
           </a:p>
@@ -2952,7 +3017,7 @@
     </p:spTree>
     <p:extLst>
       <p:ext uri="{BB962C8B-B14F-4D97-AF65-F5344CB8AC3E}">
-        <p14:creationId xmlns:p14="http://schemas.microsoft.com/office/powerpoint/2010/main" val="1697730364"/>
+        <p14:creationId xmlns:p14="http://schemas.microsoft.com/office/powerpoint/2010/main" val="1763752134"/>
       </p:ext>
     </p:extLst>
   </p:cSld>
@@ -3007,32 +3072,10 @@
           <a:lstStyle/>
           <a:p>
             <a:r>
-              <a:rPr lang="sv-SE" dirty="0" smtClean="0"/>
-              <a:t>Domain</a:t>
-            </a:r>
-            <a:r>
-              <a:rPr lang="sv-SE" baseline="0" dirty="0" smtClean="0"/>
-              <a:t>model</a:t>
-            </a:r>
-          </a:p>
-          <a:p>
-            <a:r>
-              <a:rPr lang="sv-SE" baseline="0" dirty="0" smtClean="0"/>
-              <a:t>Select n+1</a:t>
-            </a:r>
-          </a:p>
-          <a:p>
-            <a:r>
-              <a:rPr lang="sv-SE" baseline="0" dirty="0" smtClean="0"/>
-              <a:t>Fetching strategies</a:t>
-            </a:r>
-          </a:p>
-          <a:p>
-            <a:r>
-              <a:rPr lang="sv-SE" baseline="0" dirty="0" smtClean="0"/>
-              <a:t>Lets run them during the night</a:t>
-            </a:r>
-            <a:endParaRPr lang="sv-SE" dirty="0"/>
+              <a:rPr lang="de-CH" dirty="0" smtClean="0"/>
+              <a:t>Prozesshandling wie es aussehen könnte</a:t>
+            </a:r>
+            <a:endParaRPr lang="de-CH" dirty="0"/>
           </a:p>
         </p:txBody>
       </p:sp>
@@ -3051,18 +3094,18 @@
           <a:bodyPr/>
           <a:lstStyle/>
           <a:p>
-            <a:fld id="{A905A5AB-8DC5-4B60-A895-8FAC0E3D9A22}" type="slidenum">
-              <a:rPr lang="sv-SE" smtClean="0"/>
-              <a:t>56</a:t>
+            <a:fld id="{3993D047-D8B4-43AA-8641-D9CCF4EC54F4}" type="slidenum">
+              <a:rPr lang="de-CH" smtClean="0"/>
+              <a:t>53</a:t>
             </a:fld>
-            <a:endParaRPr lang="sv-SE"/>
+            <a:endParaRPr lang="de-CH"/>
           </a:p>
         </p:txBody>
       </p:sp>
     </p:spTree>
     <p:extLst>
       <p:ext uri="{BB962C8B-B14F-4D97-AF65-F5344CB8AC3E}">
-        <p14:creationId xmlns:p14="http://schemas.microsoft.com/office/powerpoint/2010/main" val="1202191226"/>
+        <p14:creationId xmlns:p14="http://schemas.microsoft.com/office/powerpoint/2010/main" val="1697730364"/>
       </p:ext>
     </p:extLst>
   </p:cSld>
@@ -3116,6 +3159,32 @@
           <a:bodyPr/>
           <a:lstStyle/>
           <a:p>
+            <a:r>
+              <a:rPr lang="sv-SE" dirty="0" smtClean="0"/>
+              <a:t>Domain</a:t>
+            </a:r>
+            <a:r>
+              <a:rPr lang="sv-SE" baseline="0" dirty="0" smtClean="0"/>
+              <a:t>model</a:t>
+            </a:r>
+          </a:p>
+          <a:p>
+            <a:r>
+              <a:rPr lang="sv-SE" baseline="0" dirty="0" smtClean="0"/>
+              <a:t>Select n+1</a:t>
+            </a:r>
+          </a:p>
+          <a:p>
+            <a:r>
+              <a:rPr lang="sv-SE" baseline="0" dirty="0" smtClean="0"/>
+              <a:t>Fetching strategies</a:t>
+            </a:r>
+          </a:p>
+          <a:p>
+            <a:r>
+              <a:rPr lang="sv-SE" baseline="0" dirty="0" smtClean="0"/>
+              <a:t>Lets run them during the night</a:t>
+            </a:r>
             <a:endParaRPr lang="sv-SE" dirty="0"/>
           </a:p>
         </p:txBody>
@@ -3135,9 +3204,9 @@
           <a:bodyPr/>
           <a:lstStyle/>
           <a:p>
-            <a:fld id="{D5BB19A3-B3B6-4398-9889-160C3A008821}" type="slidenum">
+            <a:fld id="{A905A5AB-8DC5-4B60-A895-8FAC0E3D9A22}" type="slidenum">
               <a:rPr lang="sv-SE" smtClean="0"/>
-              <a:t>57</a:t>
+              <a:t>56</a:t>
             </a:fld>
             <a:endParaRPr lang="sv-SE"/>
           </a:p>
@@ -3146,7 +3215,7 @@
     </p:spTree>
     <p:extLst>
       <p:ext uri="{BB962C8B-B14F-4D97-AF65-F5344CB8AC3E}">
-        <p14:creationId xmlns:p14="http://schemas.microsoft.com/office/powerpoint/2010/main" val="3204655635"/>
+        <p14:creationId xmlns:p14="http://schemas.microsoft.com/office/powerpoint/2010/main" val="1202191226"/>
       </p:ext>
     </p:extLst>
   </p:cSld>
@@ -3200,18 +3269,6 @@
           <a:bodyPr/>
           <a:lstStyle/>
           <a:p>
-            <a:r>
-              <a:rPr lang="en-GB" dirty="0" err="1" smtClean="0"/>
-              <a:t>parseJson</a:t>
-            </a:r>
-            <a:r>
-              <a:rPr lang="en-GB" baseline="0" dirty="0" smtClean="0"/>
-              <a:t> is a custom </a:t>
-            </a:r>
-            <a:r>
-              <a:rPr lang="en-GB" baseline="0" dirty="0" err="1" smtClean="0"/>
-              <a:t>func</a:t>
-            </a:r>
             <a:endParaRPr lang="sv-SE" dirty="0"/>
           </a:p>
         </p:txBody>
@@ -3233,7 +3290,7 @@
           <a:p>
             <a:fld id="{D5BB19A3-B3B6-4398-9889-160C3A008821}" type="slidenum">
               <a:rPr lang="sv-SE" smtClean="0"/>
-              <a:t>62</a:t>
+              <a:t>57</a:t>
             </a:fld>
             <a:endParaRPr lang="sv-SE"/>
           </a:p>
@@ -3242,7 +3299,7 @@
     </p:spTree>
     <p:extLst>
       <p:ext uri="{BB962C8B-B14F-4D97-AF65-F5344CB8AC3E}">
-        <p14:creationId xmlns:p14="http://schemas.microsoft.com/office/powerpoint/2010/main" val="4029256152"/>
+        <p14:creationId xmlns:p14="http://schemas.microsoft.com/office/powerpoint/2010/main" val="3204655635"/>
       </p:ext>
     </p:extLst>
   </p:cSld>
@@ -3411,16 +3468,22 @@
         </p:nvSpPr>
         <p:spPr/>
         <p:txBody>
-          <a:bodyPr>
-            <a:normAutofit/>
-          </a:bodyPr>
+          <a:bodyPr/>
           <a:lstStyle/>
           <a:p>
             <a:r>
-              <a:rPr lang="en-US" dirty="0" smtClean="0"/>
-              <a:t>Use the “explain it to me like I was 5 years old” business analysis technique.</a:t>
-            </a:r>
-            <a:endParaRPr lang="en-US" dirty="0"/>
+              <a:rPr lang="en-GB" dirty="0" err="1" smtClean="0"/>
+              <a:t>parseJson</a:t>
+            </a:r>
+            <a:r>
+              <a:rPr lang="en-GB" baseline="0" dirty="0" smtClean="0"/>
+              <a:t> is a custom </a:t>
+            </a:r>
+            <a:r>
+              <a:rPr lang="en-GB" baseline="0" dirty="0" err="1" smtClean="0"/>
+              <a:t>func</a:t>
+            </a:r>
+            <a:endParaRPr lang="sv-SE" dirty="0"/>
           </a:p>
         </p:txBody>
       </p:sp>
@@ -3431,7 +3494,7 @@
             <a:spLocks noGrp="1"/>
           </p:cNvSpPr>
           <p:nvPr>
-            <p:ph type="sldNum" idx="10"/>
+            <p:ph type="sldNum" sz="quarter" idx="10"/>
           </p:nvPr>
         </p:nvSpPr>
         <p:spPr/>
@@ -3439,19 +3502,18 @@
           <a:bodyPr/>
           <a:lstStyle/>
           <a:p>
-            <a:fld id="{7ACA2796-6D5E-4AAD-9D66-AE6CE657D5C0}" type="slidenum">
-              <a:rPr lang="en-GB" smtClean="0"/>
-              <a:pPr/>
-              <a:t>69</a:t>
+            <a:fld id="{D5BB19A3-B3B6-4398-9889-160C3A008821}" type="slidenum">
+              <a:rPr lang="sv-SE" smtClean="0"/>
+              <a:t>62</a:t>
             </a:fld>
-            <a:endParaRPr lang="en-GB"/>
+            <a:endParaRPr lang="sv-SE"/>
           </a:p>
         </p:txBody>
       </p:sp>
     </p:spTree>
     <p:extLst>
       <p:ext uri="{BB962C8B-B14F-4D97-AF65-F5344CB8AC3E}">
-        <p14:creationId xmlns:p14="http://schemas.microsoft.com/office/powerpoint/2010/main" val="152178608"/>
+        <p14:creationId xmlns:p14="http://schemas.microsoft.com/office/powerpoint/2010/main" val="4029256152"/>
       </p:ext>
     </p:extLst>
   </p:cSld>
@@ -3509,7 +3571,7 @@
           <a:p>
             <a:r>
               <a:rPr lang="en-US" dirty="0" smtClean="0"/>
-              <a:t>So, no real race condition – we have the time and space to run business logic later.</a:t>
+              <a:t>Use the “explain it to me like I was 5 years old” business analysis technique.</a:t>
             </a:r>
             <a:endParaRPr lang="en-US" dirty="0"/>
           </a:p>
@@ -3533,7 +3595,7 @@
             <a:fld id="{7ACA2796-6D5E-4AAD-9D66-AE6CE657D5C0}" type="slidenum">
               <a:rPr lang="en-GB" smtClean="0"/>
               <a:pPr/>
-              <a:t>70</a:t>
+              <a:t>69</a:t>
             </a:fld>
             <a:endParaRPr lang="en-GB"/>
           </a:p>
@@ -3542,7 +3604,7 @@
     </p:spTree>
     <p:extLst>
       <p:ext uri="{BB962C8B-B14F-4D97-AF65-F5344CB8AC3E}">
-        <p14:creationId xmlns:p14="http://schemas.microsoft.com/office/powerpoint/2010/main" val="345938652"/>
+        <p14:creationId xmlns:p14="http://schemas.microsoft.com/office/powerpoint/2010/main" val="152178608"/>
       </p:ext>
     </p:extLst>
   </p:cSld>
@@ -3600,27 +3662,7 @@
           <a:p>
             <a:r>
               <a:rPr lang="en-US" dirty="0" smtClean="0"/>
-              <a:t>Products returned in 30 days – full refund (less shipping and handling)</a:t>
-            </a:r>
-          </a:p>
-          <a:p>
-            <a:r>
-              <a:rPr lang="en-US" dirty="0" smtClean="0"/>
-              <a:t>Products returned in 60</a:t>
-            </a:r>
-            <a:r>
-              <a:rPr lang="en-US" baseline="0" dirty="0" smtClean="0"/>
-              <a:t> days – 50% refund </a:t>
-            </a:r>
-            <a:r>
-              <a:rPr lang="en-US" dirty="0" smtClean="0"/>
-              <a:t>(less shipping and handling)</a:t>
-            </a:r>
-          </a:p>
-          <a:p>
-            <a:r>
-              <a:rPr lang="en-US" dirty="0" smtClean="0"/>
-              <a:t>Later than 60 days – no refund</a:t>
+              <a:t>So, no real race condition – we have the time and space to run business logic later.</a:t>
             </a:r>
             <a:endParaRPr lang="en-US" dirty="0"/>
           </a:p>
@@ -3644,7 +3686,7 @@
             <a:fld id="{7ACA2796-6D5E-4AAD-9D66-AE6CE657D5C0}" type="slidenum">
               <a:rPr lang="en-GB" smtClean="0"/>
               <a:pPr/>
-              <a:t>72</a:t>
+              <a:t>70</a:t>
             </a:fld>
             <a:endParaRPr lang="en-GB"/>
           </a:p>
@@ -3653,7 +3695,7 @@
     </p:spTree>
     <p:extLst>
       <p:ext uri="{BB962C8B-B14F-4D97-AF65-F5344CB8AC3E}">
-        <p14:creationId xmlns:p14="http://schemas.microsoft.com/office/powerpoint/2010/main" val="2617882635"/>
+        <p14:creationId xmlns:p14="http://schemas.microsoft.com/office/powerpoint/2010/main" val="345938652"/>
       </p:ext>
     </p:extLst>
   </p:cSld>
@@ -3704,6 +3746,117 @@
         </p:nvSpPr>
         <p:spPr/>
         <p:txBody>
+          <a:bodyPr>
+            <a:normAutofit/>
+          </a:bodyPr>
+          <a:lstStyle/>
+          <a:p>
+            <a:r>
+              <a:rPr lang="en-US" dirty="0" smtClean="0"/>
+              <a:t>Products returned in 30 days – full refund (less shipping and handling)</a:t>
+            </a:r>
+          </a:p>
+          <a:p>
+            <a:r>
+              <a:rPr lang="en-US" dirty="0" smtClean="0"/>
+              <a:t>Products returned in 60</a:t>
+            </a:r>
+            <a:r>
+              <a:rPr lang="en-US" baseline="0" dirty="0" smtClean="0"/>
+              <a:t> days – 50% refund </a:t>
+            </a:r>
+            <a:r>
+              <a:rPr lang="en-US" dirty="0" smtClean="0"/>
+              <a:t>(less shipping and handling)</a:t>
+            </a:r>
+          </a:p>
+          <a:p>
+            <a:r>
+              <a:rPr lang="en-US" dirty="0" smtClean="0"/>
+              <a:t>Later than 60 days – no refund</a:t>
+            </a:r>
+            <a:endParaRPr lang="en-US" dirty="0"/>
+          </a:p>
+        </p:txBody>
+      </p:sp>
+      <p:sp>
+        <p:nvSpPr>
+          <p:cNvPr id="4" name="Slide Number Placeholder 3"/>
+          <p:cNvSpPr>
+            <a:spLocks noGrp="1"/>
+          </p:cNvSpPr>
+          <p:nvPr>
+            <p:ph type="sldNum" idx="10"/>
+          </p:nvPr>
+        </p:nvSpPr>
+        <p:spPr/>
+        <p:txBody>
+          <a:bodyPr/>
+          <a:lstStyle/>
+          <a:p>
+            <a:fld id="{7ACA2796-6D5E-4AAD-9D66-AE6CE657D5C0}" type="slidenum">
+              <a:rPr lang="en-GB" smtClean="0"/>
+              <a:pPr/>
+              <a:t>72</a:t>
+            </a:fld>
+            <a:endParaRPr lang="en-GB"/>
+          </a:p>
+        </p:txBody>
+      </p:sp>
+    </p:spTree>
+    <p:extLst>
+      <p:ext uri="{BB962C8B-B14F-4D97-AF65-F5344CB8AC3E}">
+        <p14:creationId xmlns:p14="http://schemas.microsoft.com/office/powerpoint/2010/main" val="2617882635"/>
+      </p:ext>
+    </p:extLst>
+  </p:cSld>
+  <p:clrMapOvr>
+    <a:masterClrMapping/>
+  </p:clrMapOvr>
+</p:notes>
+</file>
+
+<file path=ppt/notesSlides/notesSlide34.xml><?xml version="1.0" encoding="utf-8"?>
+<p:notes xmlns:a="http://schemas.openxmlformats.org/drawingml/2006/main" xmlns:r="http://schemas.openxmlformats.org/officeDocument/2006/relationships" xmlns:p="http://schemas.openxmlformats.org/presentationml/2006/main">
+  <p:cSld>
+    <p:spTree>
+      <p:nvGrpSpPr>
+        <p:cNvPr id="1" name=""/>
+        <p:cNvGrpSpPr/>
+        <p:nvPr/>
+      </p:nvGrpSpPr>
+      <p:grpSpPr>
+        <a:xfrm>
+          <a:off x="0" y="0"/>
+          <a:ext cx="0" cy="0"/>
+          <a:chOff x="0" y="0"/>
+          <a:chExt cx="0" cy="0"/>
+        </a:xfrm>
+      </p:grpSpPr>
+      <p:sp>
+        <p:nvSpPr>
+          <p:cNvPr id="2" name="Slide Image Placeholder 1"/>
+          <p:cNvSpPr>
+            <a:spLocks noGrp="1" noRot="1" noChangeAspect="1"/>
+          </p:cNvSpPr>
+          <p:nvPr>
+            <p:ph type="sldImg"/>
+          </p:nvPr>
+        </p:nvSpPr>
+        <p:spPr/>
+      </p:sp>
+      <p:sp>
+        <p:nvSpPr>
+          <p:cNvPr id="3" name="Notes Placeholder 2"/>
+          <p:cNvSpPr>
+            <a:spLocks noGrp="1"/>
+          </p:cNvSpPr>
+          <p:nvPr>
+            <p:ph type="body" idx="1"/>
+          </p:nvPr>
+        </p:nvSpPr>
+        <p:spPr/>
+        <p:txBody>
           <a:bodyPr/>
           <a:lstStyle/>
           <a:p>
@@ -3751,7 +3904,7 @@
 </p:notes>
 </file>
 
-<file path=ppt/notesSlides/notesSlide34.xml><?xml version="1.0" encoding="utf-8"?>
+<file path=ppt/notesSlides/notesSlide35.xml><?xml version="1.0" encoding="utf-8"?>
 <p:notes xmlns:a="http://schemas.openxmlformats.org/drawingml/2006/main" xmlns:r="http://schemas.openxmlformats.org/officeDocument/2006/relationships" xmlns:p="http://schemas.openxmlformats.org/presentationml/2006/main">
   <p:cSld>
     <p:spTree>
@@ -7323,7 +7476,12 @@
             <p:ph type="ctrTitle"/>
           </p:nvPr>
         </p:nvSpPr>
-        <p:spPr/>
+        <p:spPr>
+          <a:xfrm>
+            <a:off x="1524000" y="753194"/>
+            <a:ext cx="9144000" cy="2387600"/>
+          </a:xfrm>
+        </p:spPr>
         <p:txBody>
           <a:bodyPr/>
           <a:lstStyle/>
@@ -7346,7 +7504,12 @@
             <p:ph type="subTitle" idx="1"/>
           </p:nvPr>
         </p:nvSpPr>
-        <p:spPr/>
+        <p:spPr>
+          <a:xfrm>
+            <a:off x="1524000" y="3232869"/>
+            <a:ext cx="9144000" cy="1655762"/>
+          </a:xfrm>
+        </p:spPr>
         <p:txBody>
           <a:bodyPr/>
           <a:lstStyle/>
@@ -7359,6 +7522,36 @@
           </a:p>
         </p:txBody>
       </p:sp>
+      <p:pic>
+        <p:nvPicPr>
+          <p:cNvPr id="4" name="Picture 3"/>
+          <p:cNvPicPr>
+            <a:picLocks noChangeAspect="1"/>
+          </p:cNvPicPr>
+          <p:nvPr/>
+        </p:nvPicPr>
+        <p:blipFill>
+          <a:blip r:embed="rId3" cstate="print">
+            <a:extLst>
+              <a:ext uri="{28A0092B-C50C-407E-A947-70E740481C1C}">
+                <a14:useLocalDpi xmlns:a14="http://schemas.microsoft.com/office/drawing/2010/main" val="0"/>
+              </a:ext>
+            </a:extLst>
+          </a:blip>
+          <a:stretch>
+            <a:fillRect/>
+          </a:stretch>
+        </p:blipFill>
+        <p:spPr>
+          <a:xfrm>
+            <a:off x="5302631" y="4122624"/>
+            <a:ext cx="1433259" cy="1416972"/>
+          </a:xfrm>
+          <a:prstGeom prst="rect">
+            <a:avLst/>
+          </a:prstGeom>
+        </p:spPr>
+      </p:pic>
     </p:spTree>
     <p:extLst>
       <p:ext uri="{BB962C8B-B14F-4D97-AF65-F5344CB8AC3E}">
@@ -8674,7 +8867,7 @@
         </p:nvSpPr>
         <p:spPr bwMode="auto">
           <a:xfrm>
-            <a:off x="3744912" y="2027237"/>
+            <a:off x="5102330" y="1334329"/>
             <a:ext cx="1715784" cy="1058238"/>
           </a:xfrm>
           <a:prstGeom prst="roundRect">
@@ -8748,7 +8941,7 @@
         </p:nvCxnSpPr>
         <p:spPr>
           <a:xfrm rot="5400000">
-            <a:off x="2020996" y="3686941"/>
+            <a:off x="3378414" y="2994033"/>
             <a:ext cx="2438400" cy="1447800"/>
           </a:xfrm>
           <a:prstGeom prst="straightConnector1">
@@ -8775,7 +8968,7 @@
         </p:nvSpPr>
         <p:spPr>
           <a:xfrm>
-            <a:off x="611295" y="3633605"/>
+            <a:off x="1968713" y="2940697"/>
             <a:ext cx="3275215" cy="990600"/>
           </a:xfrm>
           <a:prstGeom prst="rect">
@@ -8862,7 +9055,7 @@
         </p:nvCxnSpPr>
         <p:spPr>
           <a:xfrm rot="5400000" flipH="1" flipV="1">
-            <a:off x="1982896" y="3877441"/>
+            <a:off x="3340314" y="3184533"/>
             <a:ext cx="2667000" cy="1600200"/>
           </a:xfrm>
           <a:prstGeom prst="straightConnector1">
@@ -8889,7 +9082,7 @@
         </p:nvSpPr>
         <p:spPr>
           <a:xfrm>
-            <a:off x="3037221" y="5401441"/>
+            <a:off x="4394639" y="4708533"/>
             <a:ext cx="3409604" cy="990600"/>
           </a:xfrm>
           <a:prstGeom prst="rect">
@@ -8990,7 +9183,7 @@
         </p:nvSpPr>
         <p:spPr bwMode="auto">
           <a:xfrm flipH="1">
-            <a:off x="3168702" y="2505841"/>
+            <a:off x="4526120" y="1812933"/>
             <a:ext cx="508000" cy="304799"/>
           </a:xfrm>
           <a:custGeom>
@@ -9101,7 +9294,7 @@
         </p:nvSpPr>
         <p:spPr>
           <a:xfrm>
-            <a:off x="603593" y="2429641"/>
+            <a:off x="1961011" y="1736733"/>
             <a:ext cx="2709805" cy="457200"/>
           </a:xfrm>
           <a:prstGeom prst="rect">
@@ -9156,7 +9349,7 @@
         </p:nvCxnSpPr>
         <p:spPr>
           <a:xfrm rot="16200000" flipH="1">
-            <a:off x="5335696" y="3115441"/>
+            <a:off x="6693114" y="2422533"/>
             <a:ext cx="2514600" cy="2514600"/>
           </a:xfrm>
           <a:prstGeom prst="straightConnector1">
@@ -9183,7 +9376,7 @@
         </p:nvSpPr>
         <p:spPr>
           <a:xfrm>
-            <a:off x="6108576" y="3428949"/>
+            <a:off x="7465994" y="2736041"/>
             <a:ext cx="3124200" cy="990600"/>
           </a:xfrm>
           <a:prstGeom prst="rect">
@@ -9270,7 +9463,7 @@
         </p:nvCxnSpPr>
         <p:spPr>
           <a:xfrm rot="16200000" flipV="1">
-            <a:off x="5221396" y="3382141"/>
+            <a:off x="6578814" y="2689233"/>
             <a:ext cx="2590800" cy="2514600"/>
           </a:xfrm>
           <a:prstGeom prst="straightConnector1">
@@ -9297,7 +9490,7 @@
         </p:nvSpPr>
         <p:spPr>
           <a:xfrm>
-            <a:off x="3621896" y="4567391"/>
+            <a:off x="4979314" y="3874483"/>
             <a:ext cx="3124200" cy="990600"/>
           </a:xfrm>
           <a:prstGeom prst="rect">
@@ -9398,7 +9591,7 @@
         </p:nvSpPr>
         <p:spPr bwMode="auto">
           <a:xfrm>
-            <a:off x="5494088" y="2505841"/>
+            <a:off x="6851506" y="1812933"/>
             <a:ext cx="508000" cy="304799"/>
           </a:xfrm>
           <a:custGeom>
@@ -9509,7 +9702,7 @@
         </p:nvSpPr>
         <p:spPr>
           <a:xfrm>
-            <a:off x="6021495" y="2429641"/>
+            <a:off x="7378913" y="1736733"/>
             <a:ext cx="2919153" cy="457200"/>
           </a:xfrm>
           <a:prstGeom prst="rect">
@@ -9573,7 +9766,7 @@
         </p:blipFill>
         <p:spPr bwMode="auto">
           <a:xfrm flipH="1">
-            <a:off x="8393112" y="1742117"/>
+            <a:off x="9750530" y="1049209"/>
             <a:ext cx="1371600" cy="1371600"/>
           </a:xfrm>
           <a:prstGeom prst="rect">
@@ -9597,7 +9790,7 @@
         </p:nvCxnSpPr>
         <p:spPr>
           <a:xfrm rot="10800000" flipV="1">
-            <a:off x="5560358" y="2217307"/>
+            <a:off x="6917776" y="1524399"/>
             <a:ext cx="2468880" cy="0"/>
           </a:xfrm>
           <a:prstGeom prst="straightConnector1">
@@ -9624,7 +9817,7 @@
         </p:nvSpPr>
         <p:spPr>
           <a:xfrm>
-            <a:off x="6326295" y="1802913"/>
+            <a:off x="7683713" y="1110005"/>
             <a:ext cx="1749829" cy="401782"/>
           </a:xfrm>
           <a:prstGeom prst="rect">
@@ -9682,7 +9875,7 @@
         </p:nvSpPr>
         <p:spPr>
           <a:xfrm>
-            <a:off x="4773498" y="2715605"/>
+            <a:off x="6130916" y="2022697"/>
             <a:ext cx="245409" cy="333061"/>
           </a:xfrm>
           <a:prstGeom prst="curvedLeftArrow">
@@ -9747,7 +9940,7 @@
         </p:nvSpPr>
         <p:spPr>
           <a:xfrm flipV="1">
-            <a:off x="4315984" y="2678739"/>
+            <a:off x="5673402" y="1985831"/>
             <a:ext cx="294491" cy="363281"/>
           </a:xfrm>
           <a:prstGeom prst="curvedRightArrow">
@@ -9812,7 +10005,7 @@
         </p:nvCxnSpPr>
         <p:spPr>
           <a:xfrm rot="16200000" flipH="1">
-            <a:off x="5107096" y="3648841"/>
+            <a:off x="6464514" y="2955933"/>
             <a:ext cx="2819400" cy="2667000"/>
           </a:xfrm>
           <a:prstGeom prst="straightConnector1">
@@ -9837,7 +10030,7 @@
         </p:nvCxnSpPr>
         <p:spPr>
           <a:xfrm rot="5400000">
-            <a:off x="2020996" y="4144141"/>
+            <a:off x="3378414" y="3451233"/>
             <a:ext cx="2743200" cy="1752600"/>
           </a:xfrm>
           <a:prstGeom prst="straightConnector1">
@@ -9864,7 +10057,7 @@
         </p:nvSpPr>
         <p:spPr>
           <a:xfrm>
-            <a:off x="3811696" y="6392041"/>
+            <a:off x="5169114" y="5699133"/>
             <a:ext cx="3124200" cy="533400"/>
           </a:xfrm>
           <a:prstGeom prst="rect">
@@ -9942,7 +10135,7 @@
         </p:nvCxnSpPr>
         <p:spPr>
           <a:xfrm rot="5400000" flipH="1" flipV="1">
-            <a:off x="2093744" y="5152069"/>
+            <a:off x="3451162" y="4459161"/>
             <a:ext cx="838201" cy="120517"/>
           </a:xfrm>
           <a:prstGeom prst="straightConnector1">
@@ -9967,7 +10160,7 @@
         </p:nvCxnSpPr>
         <p:spPr>
           <a:xfrm rot="16200000" flipV="1">
-            <a:off x="1644855" y="5089705"/>
+            <a:off x="3002273" y="4396797"/>
             <a:ext cx="824347" cy="331144"/>
           </a:xfrm>
           <a:prstGeom prst="straightConnector1">
@@ -9992,7 +10185,7 @@
         </p:nvCxnSpPr>
         <p:spPr>
           <a:xfrm rot="5400000" flipH="1" flipV="1">
-            <a:off x="7948675" y="5104963"/>
+            <a:off x="9306093" y="4412055"/>
             <a:ext cx="838201" cy="120517"/>
           </a:xfrm>
           <a:prstGeom prst="straightConnector1">
@@ -10017,7 +10210,7 @@
         </p:nvCxnSpPr>
         <p:spPr>
           <a:xfrm rot="16200000" flipV="1">
-            <a:off x="7499786" y="5042599"/>
+            <a:off x="8857204" y="4349691"/>
             <a:ext cx="824347" cy="331144"/>
           </a:xfrm>
           <a:prstGeom prst="straightConnector1">
@@ -10042,7 +10235,7 @@
         </p:nvCxnSpPr>
         <p:spPr>
           <a:xfrm rot="16200000" flipH="1">
-            <a:off x="4668842" y="3866499"/>
+            <a:off x="6026260" y="3173591"/>
             <a:ext cx="964277" cy="498763"/>
           </a:xfrm>
           <a:prstGeom prst="straightConnector1">
@@ -10067,7 +10260,7 @@
         </p:nvCxnSpPr>
         <p:spPr>
           <a:xfrm rot="5400000">
-            <a:off x="3936387" y="4058160"/>
+            <a:off x="5293805" y="3365252"/>
             <a:ext cx="947651" cy="182880"/>
           </a:xfrm>
           <a:prstGeom prst="straightConnector1">
@@ -10092,7 +10285,7 @@
         </p:nvSpPr>
         <p:spPr bwMode="auto">
           <a:xfrm>
-            <a:off x="7883687" y="5703673"/>
+            <a:off x="9241105" y="5010765"/>
             <a:ext cx="1715784" cy="1058238"/>
           </a:xfrm>
           <a:prstGeom prst="roundRect">
@@ -10165,7 +10358,7 @@
         </p:nvSpPr>
         <p:spPr bwMode="auto">
           <a:xfrm>
-            <a:off x="722600" y="5713947"/>
+            <a:off x="2080018" y="5021039"/>
             <a:ext cx="1715784" cy="1058238"/>
           </a:xfrm>
           <a:prstGeom prst="roundRect">
@@ -10239,6 +10432,10 @@
           </p:nvPr>
         </p:nvSpPr>
         <p:spPr>
+          <a:xfrm>
+            <a:off x="368514" y="-15791"/>
+            <a:ext cx="10515600" cy="1325563"/>
+          </a:xfrm>
           <a:prstGeom prst="rect">
             <a:avLst/>
           </a:prstGeom>
@@ -12087,7 +12284,7 @@
         </p:nvSpPr>
         <p:spPr bwMode="auto">
           <a:xfrm>
-            <a:off x="1343328" y="1874837"/>
+            <a:off x="2404580" y="1198970"/>
             <a:ext cx="1715784" cy="1058238"/>
           </a:xfrm>
           <a:prstGeom prst="roundRect">
@@ -12163,7 +12360,7 @@
         </p:nvSpPr>
         <p:spPr>
           <a:xfrm>
-            <a:off x="7021513" y="4084637"/>
+            <a:off x="8082765" y="3408770"/>
             <a:ext cx="1600200" cy="457200"/>
           </a:xfrm>
           <a:prstGeom prst="rect">
@@ -12220,7 +12417,7 @@
         </p:nvCxnSpPr>
         <p:spPr>
           <a:xfrm>
-            <a:off x="2201220" y="2933075"/>
+            <a:off x="3262472" y="2257208"/>
             <a:ext cx="2266308" cy="2714690"/>
           </a:xfrm>
           <a:prstGeom prst="straightConnector1">
@@ -12247,7 +12444,7 @@
         </p:nvCxnSpPr>
         <p:spPr>
           <a:xfrm flipH="1">
-            <a:off x="5494763" y="2933075"/>
+            <a:off x="6556015" y="2257208"/>
             <a:ext cx="2269057" cy="2714690"/>
           </a:xfrm>
           <a:prstGeom prst="straightConnector1">
@@ -12272,7 +12469,7 @@
         </p:nvSpPr>
         <p:spPr bwMode="auto">
           <a:xfrm>
-            <a:off x="6905928" y="1874837"/>
+            <a:off x="7967180" y="1198970"/>
             <a:ext cx="1715784" cy="1058238"/>
           </a:xfrm>
           <a:prstGeom prst="roundRect">
@@ -12345,7 +12542,7 @@
         </p:nvSpPr>
         <p:spPr bwMode="auto">
           <a:xfrm>
-            <a:off x="3973512" y="5714422"/>
+            <a:off x="5034764" y="5038555"/>
             <a:ext cx="2122472" cy="1058238"/>
           </a:xfrm>
           <a:prstGeom prst="roundRect">
@@ -12418,7 +12615,7 @@
         </p:nvSpPr>
         <p:spPr>
           <a:xfrm>
-            <a:off x="2982912" y="2865437"/>
+            <a:off x="4044164" y="2189570"/>
             <a:ext cx="1981200" cy="457200"/>
           </a:xfrm>
           <a:prstGeom prst="rect">
@@ -12476,7 +12673,7 @@
         </p:nvCxnSpPr>
         <p:spPr>
           <a:xfrm>
-            <a:off x="3059112" y="2403956"/>
+            <a:off x="4120364" y="1728089"/>
             <a:ext cx="3846816" cy="1588"/>
           </a:xfrm>
           <a:prstGeom prst="straightConnector1">
@@ -12501,7 +12698,7 @@
         </p:nvGrpSpPr>
         <p:grpSpPr>
           <a:xfrm>
-            <a:off x="6132512" y="5866822"/>
+            <a:off x="7193764" y="5190955"/>
             <a:ext cx="3632200" cy="609600"/>
             <a:chOff x="6132512" y="6065837"/>
             <a:chExt cx="3632200" cy="609600"/>
@@ -12684,7 +12881,7 @@
         </p:nvGrpSpPr>
         <p:grpSpPr>
           <a:xfrm>
-            <a:off x="165207" y="5743426"/>
+            <a:off x="1226459" y="5067559"/>
             <a:ext cx="3689972" cy="911445"/>
             <a:chOff x="597125" y="4396335"/>
             <a:chExt cx="3689972" cy="911445"/>
@@ -12770,6 +12967,10 @@
           </p:nvPr>
         </p:nvSpPr>
         <p:spPr>
+          <a:xfrm>
+            <a:off x="439819" y="-39592"/>
+            <a:ext cx="10515600" cy="1325563"/>
+          </a:xfrm>
           <a:prstGeom prst="rect">
             <a:avLst/>
           </a:prstGeom>
@@ -13777,11 +13978,7 @@
             <a:pPr lvl="1"/>
             <a:r>
               <a:rPr lang="sv-SE" dirty="0" smtClean="0"/>
-              <a:t>Including Management </a:t>
-            </a:r>
-            <a:r>
-              <a:rPr lang="sv-SE" dirty="0" smtClean="0"/>
-              <a:t>tools</a:t>
+              <a:t>Including Management tools</a:t>
             </a:r>
           </a:p>
           <a:p>
@@ -15497,7 +15694,7 @@
         </p:nvSpPr>
         <p:spPr bwMode="auto">
           <a:xfrm>
-            <a:off x="7755054" y="2184710"/>
+            <a:off x="6852013" y="1699811"/>
             <a:ext cx="691273" cy="1451672"/>
           </a:xfrm>
           <a:prstGeom prst="upDownArrow">
@@ -15555,7 +15752,7 @@
         </p:nvSpPr>
         <p:spPr>
           <a:xfrm>
-            <a:off x="8653709" y="2253837"/>
+            <a:off x="7653081" y="1604329"/>
             <a:ext cx="968535" cy="343620"/>
           </a:xfrm>
           <a:prstGeom prst="rect">
@@ -15584,7 +15781,7 @@
         </p:nvSpPr>
         <p:spPr>
           <a:xfrm>
-            <a:off x="8653709" y="3249770"/>
+            <a:off x="7653081" y="2807863"/>
             <a:ext cx="1127553" cy="343620"/>
           </a:xfrm>
           <a:prstGeom prst="rect">
@@ -15613,7 +15810,7 @@
         </p:nvSpPr>
         <p:spPr bwMode="auto">
           <a:xfrm>
-            <a:off x="2363128" y="6055836"/>
+            <a:off x="2266577" y="5908169"/>
             <a:ext cx="6705344" cy="345636"/>
           </a:xfrm>
           <a:prstGeom prst="roundRect">
@@ -15750,7 +15947,7 @@
           <p:nvPr/>
         </p:nvPicPr>
         <p:blipFill>
-          <a:blip r:embed="rId2" cstate="print"/>
+          <a:blip r:embed="rId3" cstate="print"/>
           <a:srcRect/>
           <a:stretch>
             <a:fillRect/>
@@ -15789,7 +15986,7 @@
           <p:nvPr/>
         </p:nvPicPr>
         <p:blipFill>
-          <a:blip r:embed="rId2" cstate="print"/>
+          <a:blip r:embed="rId3" cstate="print"/>
           <a:srcRect/>
           <a:stretch>
             <a:fillRect/>
@@ -16894,7 +17091,7 @@
             <p:nvPr/>
           </p:nvPicPr>
           <p:blipFill>
-            <a:blip r:embed="rId3" cstate="print">
+            <a:blip r:embed="rId4" cstate="print">
               <a:clrChange>
                 <a:clrFrom>
                   <a:srgbClr val="000000"/>
@@ -17174,7 +17371,7 @@
             <p:nvPr/>
           </p:nvPicPr>
           <p:blipFill>
-            <a:blip r:embed="rId3" cstate="print">
+            <a:blip r:embed="rId4" cstate="print">
               <a:clrChange>
                 <a:clrFrom>
                   <a:srgbClr val="000000"/>
@@ -45369,14 +45566,7 @@
                 <a:latin typeface="Consolas" panose="020B0609020204030204" pitchFamily="49" charset="0"/>
                 <a:cs typeface="Consolas" panose="020B0609020204030204" pitchFamily="49" charset="0"/>
               </a:rPr>
-              <a:t>: </a:t>
-            </a:r>
-            <a:r>
-              <a:rPr lang="en-GB" dirty="0" smtClean="0">
-                <a:latin typeface="Consolas" panose="020B0609020204030204" pitchFamily="49" charset="0"/>
-                <a:cs typeface="Consolas" panose="020B0609020204030204" pitchFamily="49" charset="0"/>
-              </a:rPr>
-              <a:t>Saga&lt;</a:t>
+              <a:t>: Saga&lt;</a:t>
             </a:r>
             <a:r>
               <a:rPr lang="en-GB" b="1" dirty="0" err="1" smtClean="0">
@@ -50167,6 +50357,13 @@
   <p:clrMapOvr>
     <a:masterClrMapping/>
   </p:clrMapOvr>
+  <p:timing>
+    <p:tnLst>
+      <p:par>
+        <p:cTn id="1" dur="indefinite" restart="never" nodeType="tmRoot"/>
+      </p:par>
+    </p:tnLst>
+  </p:timing>
 </p:sld>
 </file>
 
@@ -50331,6 +50528,13 @@
   <p:clrMapOvr>
     <a:masterClrMapping/>
   </p:clrMapOvr>
+  <p:timing>
+    <p:tnLst>
+      <p:par>
+        <p:cTn id="1" dur="indefinite" restart="never" nodeType="tmRoot"/>
+      </p:par>
+    </p:tnLst>
+  </p:timing>
 </p:sld>
 </file>
 

</xml_diff>